<commit_message>
Wprowadzenie zmian w prezentacji
</commit_message>
<xml_diff>
--- a/Prezentacja_29.04.pptx
+++ b/Prezentacja_29.04.pptx
@@ -7,34 +7,36 @@
   <p:sldIdLst>
     <p:sldId id="256" r:id="rId2"/>
     <p:sldId id="258" r:id="rId3"/>
-    <p:sldId id="275" r:id="rId4"/>
-    <p:sldId id="276" r:id="rId5"/>
-    <p:sldId id="257" r:id="rId6"/>
-    <p:sldId id="259" r:id="rId7"/>
-    <p:sldId id="260" r:id="rId8"/>
-    <p:sldId id="261" r:id="rId9"/>
-    <p:sldId id="262" r:id="rId10"/>
-    <p:sldId id="263" r:id="rId11"/>
-    <p:sldId id="264" r:id="rId12"/>
-    <p:sldId id="267" r:id="rId13"/>
-    <p:sldId id="269" r:id="rId14"/>
-    <p:sldId id="270" r:id="rId15"/>
-    <p:sldId id="266" r:id="rId16"/>
-    <p:sldId id="271" r:id="rId17"/>
-    <p:sldId id="272" r:id="rId18"/>
-    <p:sldId id="273" r:id="rId19"/>
-    <p:sldId id="274" r:id="rId20"/>
-    <p:sldId id="277" r:id="rId21"/>
-    <p:sldId id="278" r:id="rId22"/>
-    <p:sldId id="279" r:id="rId23"/>
-    <p:sldId id="280" r:id="rId24"/>
-    <p:sldId id="281" r:id="rId25"/>
-    <p:sldId id="282" r:id="rId26"/>
-    <p:sldId id="283" r:id="rId27"/>
-    <p:sldId id="284" r:id="rId28"/>
-    <p:sldId id="285" r:id="rId29"/>
-    <p:sldId id="286" r:id="rId30"/>
-    <p:sldId id="287" r:id="rId31"/>
+    <p:sldId id="288" r:id="rId4"/>
+    <p:sldId id="289" r:id="rId5"/>
+    <p:sldId id="275" r:id="rId6"/>
+    <p:sldId id="276" r:id="rId7"/>
+    <p:sldId id="257" r:id="rId8"/>
+    <p:sldId id="259" r:id="rId9"/>
+    <p:sldId id="260" r:id="rId10"/>
+    <p:sldId id="261" r:id="rId11"/>
+    <p:sldId id="262" r:id="rId12"/>
+    <p:sldId id="263" r:id="rId13"/>
+    <p:sldId id="264" r:id="rId14"/>
+    <p:sldId id="267" r:id="rId15"/>
+    <p:sldId id="269" r:id="rId16"/>
+    <p:sldId id="270" r:id="rId17"/>
+    <p:sldId id="266" r:id="rId18"/>
+    <p:sldId id="271" r:id="rId19"/>
+    <p:sldId id="272" r:id="rId20"/>
+    <p:sldId id="273" r:id="rId21"/>
+    <p:sldId id="274" r:id="rId22"/>
+    <p:sldId id="277" r:id="rId23"/>
+    <p:sldId id="278" r:id="rId24"/>
+    <p:sldId id="279" r:id="rId25"/>
+    <p:sldId id="280" r:id="rId26"/>
+    <p:sldId id="281" r:id="rId27"/>
+    <p:sldId id="282" r:id="rId28"/>
+    <p:sldId id="283" r:id="rId29"/>
+    <p:sldId id="284" r:id="rId30"/>
+    <p:sldId id="285" r:id="rId31"/>
+    <p:sldId id="286" r:id="rId32"/>
+    <p:sldId id="287" r:id="rId33"/>
   </p:sldIdLst>
   <p:sldSz cx="12192000" cy="6858000"/>
   <p:notesSz cx="6858000" cy="9144000"/>
@@ -144,8 +146,7 @@
 <file path=ppt/revisionInfo.xml><?xml version="1.0" encoding="utf-8"?>
 <p1510:revInfo xmlns:a="http://schemas.openxmlformats.org/drawingml/2006/main" xmlns:r="http://schemas.openxmlformats.org/officeDocument/2006/relationships" xmlns:p1510="http://schemas.microsoft.com/office/powerpoint/2015/10/main">
   <p1510:revLst>
-    <p1510:client id="{C900D725-2AA0-49DC-B631-139C5D10CA41}" v="2" dt="2021-04-13T19:47:23.647"/>
-    <p1510:client id="{EBD94B68-F2D6-4FBB-935A-C838932B453A}" v="587" dt="2021-04-01T07:44:18.826"/>
+    <p1510:client id="{717E9E4F-AA6D-4C42-960B-762624E6208B}" v="2" dt="2021-04-28T12:55:18.924"/>
   </p1510:revLst>
 </p1510:revInfo>
 </file>
@@ -13516,6 +13517,193 @@
           <p:cNvPr id="2" name="Tytuł 1">
             <a:extLst>
               <a:ext uri="{FF2B5EF4-FFF2-40B4-BE49-F238E27FC236}">
+                <a16:creationId xmlns:a16="http://schemas.microsoft.com/office/drawing/2014/main" id="{276E0BDA-CFCE-4FCC-9462-7ABD12218273}"/>
+              </a:ext>
+            </a:extLst>
+          </p:cNvPr>
+          <p:cNvSpPr>
+            <a:spLocks noGrp="1"/>
+          </p:cNvSpPr>
+          <p:nvPr>
+            <p:ph type="title"/>
+          </p:nvPr>
+        </p:nvSpPr>
+        <p:spPr/>
+        <p:txBody>
+          <a:bodyPr/>
+          <a:lstStyle/>
+          <a:p>
+            <a:r>
+              <a:rPr lang="pl-PL"/>
+              <a:t>Mapa myśli</a:t>
+            </a:r>
+          </a:p>
+        </p:txBody>
+      </p:sp>
+      <p:graphicFrame>
+        <p:nvGraphicFramePr>
+          <p:cNvPr id="4" name="Symbol zastępczy zawartości 3">
+            <a:extLst>
+              <a:ext uri="{FF2B5EF4-FFF2-40B4-BE49-F238E27FC236}">
+                <a16:creationId xmlns:a16="http://schemas.microsoft.com/office/drawing/2014/main" id="{13A4F842-1CB8-436D-952D-AC3D8A2DFCA5}"/>
+              </a:ext>
+            </a:extLst>
+          </p:cNvPr>
+          <p:cNvGraphicFramePr>
+            <a:graphicFrameLocks noGrp="1"/>
+          </p:cNvGraphicFramePr>
+          <p:nvPr>
+            <p:ph idx="1"/>
+            <p:extLst>
+              <p:ext uri="{D42A27DB-BD31-4B8C-83A1-F6EECF244321}">
+                <p14:modId xmlns:p14="http://schemas.microsoft.com/office/powerpoint/2010/main" val="1244398296"/>
+              </p:ext>
+            </p:extLst>
+          </p:nvPr>
+        </p:nvGraphicFramePr>
+        <p:xfrm>
+          <a:off x="0" y="855677"/>
+          <a:ext cx="10427516" cy="5855516"/>
+        </p:xfrm>
+        <a:graphic>
+          <a:graphicData uri="http://schemas.openxmlformats.org/drawingml/2006/diagram">
+            <dgm:relIds xmlns:dgm="http://schemas.openxmlformats.org/drawingml/2006/diagram" xmlns:r="http://schemas.openxmlformats.org/officeDocument/2006/relationships" r:dm="rId2" r:lo="rId3" r:qs="rId4" r:cs="rId5"/>
+          </a:graphicData>
+        </a:graphic>
+      </p:graphicFrame>
+    </p:spTree>
+    <p:extLst>
+      <p:ext uri="{BB962C8B-B14F-4D97-AF65-F5344CB8AC3E}">
+        <p14:creationId xmlns:p14="http://schemas.microsoft.com/office/powerpoint/2010/main" val="2644152362"/>
+      </p:ext>
+    </p:extLst>
+  </p:cSld>
+  <p:clrMapOvr>
+    <a:masterClrMapping/>
+  </p:clrMapOvr>
+</p:sld>
+</file>
+
+<file path=ppt/slides/slide11.xml><?xml version="1.0" encoding="utf-8"?>
+<p:sld xmlns:a="http://schemas.openxmlformats.org/drawingml/2006/main" xmlns:r="http://schemas.openxmlformats.org/officeDocument/2006/relationships" xmlns:p="http://schemas.openxmlformats.org/presentationml/2006/main">
+  <p:cSld>
+    <p:spTree>
+      <p:nvGrpSpPr>
+        <p:cNvPr id="1" name=""/>
+        <p:cNvGrpSpPr/>
+        <p:nvPr/>
+      </p:nvGrpSpPr>
+      <p:grpSpPr>
+        <a:xfrm>
+          <a:off x="0" y="0"/>
+          <a:ext cx="0" cy="0"/>
+          <a:chOff x="0" y="0"/>
+          <a:chExt cx="0" cy="0"/>
+        </a:xfrm>
+      </p:grpSpPr>
+      <p:sp>
+        <p:nvSpPr>
+          <p:cNvPr id="2" name="Tytuł 1">
+            <a:extLst>
+              <a:ext uri="{FF2B5EF4-FFF2-40B4-BE49-F238E27FC236}">
+                <a16:creationId xmlns:a16="http://schemas.microsoft.com/office/drawing/2014/main" id="{05FE9B8C-BCC8-491A-9A40-09796781C6C5}"/>
+              </a:ext>
+            </a:extLst>
+          </p:cNvPr>
+          <p:cNvSpPr>
+            <a:spLocks noGrp="1"/>
+          </p:cNvSpPr>
+          <p:nvPr>
+            <p:ph type="title"/>
+          </p:nvPr>
+        </p:nvSpPr>
+        <p:spPr/>
+        <p:txBody>
+          <a:bodyPr/>
+          <a:lstStyle/>
+          <a:p>
+            <a:r>
+              <a:rPr lang="pl-PL"/>
+              <a:t>Serwisowanie</a:t>
+            </a:r>
+          </a:p>
+        </p:txBody>
+      </p:sp>
+      <p:sp>
+        <p:nvSpPr>
+          <p:cNvPr id="3" name="Symbol zastępczy zawartości 2">
+            <a:extLst>
+              <a:ext uri="{FF2B5EF4-FFF2-40B4-BE49-F238E27FC236}">
+                <a16:creationId xmlns:a16="http://schemas.microsoft.com/office/drawing/2014/main" id="{390CC1DD-0AF3-4FE1-8E9E-B299C34769A8}"/>
+              </a:ext>
+            </a:extLst>
+          </p:cNvPr>
+          <p:cNvSpPr>
+            <a:spLocks noGrp="1"/>
+          </p:cNvSpPr>
+          <p:nvPr>
+            <p:ph idx="1"/>
+          </p:nvPr>
+        </p:nvSpPr>
+        <p:spPr/>
+        <p:txBody>
+          <a:bodyPr/>
+          <a:lstStyle/>
+          <a:p>
+            <a:pPr algn="just"/>
+            <a:r>
+              <a:rPr lang="pl-PL" dirty="0"/>
+              <a:t>Eksploatacja prowadzona jest według planowanej profilaktyki. Obsługa (przegląd) profilaktyczny maszyn wykonywany jest przez zewnętrzną firmę, okresowe i bieżące przeglądy wykonywane są w naszym przedsiębiorstwie. Obsługa bieżąca – raz w tygodniu, okresowa – raz na trzy miesiące, przegląd profilaktyczny – raz na rok.</a:t>
+            </a:r>
+          </a:p>
+          <a:p>
+            <a:pPr algn="just"/>
+            <a:endParaRPr lang="pl-PL" dirty="0"/>
+          </a:p>
+          <a:p>
+            <a:pPr algn="just"/>
+            <a:r>
+              <a:rPr lang="pl-PL" dirty="0"/>
+              <a:t>Dodanie odniesienia w jaki sposób jest prowadzone serwisowanie</a:t>
+            </a:r>
+          </a:p>
+        </p:txBody>
+      </p:sp>
+    </p:spTree>
+    <p:extLst>
+      <p:ext uri="{BB962C8B-B14F-4D97-AF65-F5344CB8AC3E}">
+        <p14:creationId xmlns:p14="http://schemas.microsoft.com/office/powerpoint/2010/main" val="4285159381"/>
+      </p:ext>
+    </p:extLst>
+  </p:cSld>
+  <p:clrMapOvr>
+    <a:masterClrMapping/>
+  </p:clrMapOvr>
+</p:sld>
+</file>
+
+<file path=ppt/slides/slide12.xml><?xml version="1.0" encoding="utf-8"?>
+<p:sld xmlns:a="http://schemas.openxmlformats.org/drawingml/2006/main" xmlns:r="http://schemas.openxmlformats.org/officeDocument/2006/relationships" xmlns:p="http://schemas.openxmlformats.org/presentationml/2006/main" show="0">
+  <p:cSld>
+    <p:spTree>
+      <p:nvGrpSpPr>
+        <p:cNvPr id="1" name=""/>
+        <p:cNvGrpSpPr/>
+        <p:nvPr/>
+      </p:nvGrpSpPr>
+      <p:grpSpPr>
+        <a:xfrm>
+          <a:off x="0" y="0"/>
+          <a:ext cx="0" cy="0"/>
+          <a:chOff x="0" y="0"/>
+          <a:chExt cx="0" cy="0"/>
+        </a:xfrm>
+      </p:grpSpPr>
+      <p:sp>
+        <p:nvSpPr>
+          <p:cNvPr id="2" name="Tytuł 1">
+            <a:extLst>
+              <a:ext uri="{FF2B5EF4-FFF2-40B4-BE49-F238E27FC236}">
                 <a16:creationId xmlns:a16="http://schemas.microsoft.com/office/drawing/2014/main" id="{9668A663-06A6-400A-AD15-383579BDB3DE}"/>
               </a:ext>
             </a:extLst>
@@ -13583,7 +13771,7 @@
 </p:sld>
 </file>
 
-<file path=ppt/slides/slide11.xml><?xml version="1.0" encoding="utf-8"?>
+<file path=ppt/slides/slide13.xml><?xml version="1.0" encoding="utf-8"?>
 <p:sld xmlns:a="http://schemas.openxmlformats.org/drawingml/2006/main" xmlns:r="http://schemas.openxmlformats.org/officeDocument/2006/relationships" xmlns:p="http://schemas.openxmlformats.org/presentationml/2006/main" show="0">
   <p:cSld>
     <p:spTree>
@@ -15033,7 +15221,7 @@
 </p:sld>
 </file>
 
-<file path=ppt/slides/slide12.xml><?xml version="1.0" encoding="utf-8"?>
+<file path=ppt/slides/slide14.xml><?xml version="1.0" encoding="utf-8"?>
 <p:sld xmlns:a="http://schemas.openxmlformats.org/drawingml/2006/main" xmlns:r="http://schemas.openxmlformats.org/officeDocument/2006/relationships" xmlns:p="http://schemas.openxmlformats.org/presentationml/2006/main" show="0">
   <p:cSld>
     <p:spTree>
@@ -15486,7 +15674,7 @@
 </p:sld>
 </file>
 
-<file path=ppt/slides/slide13.xml><?xml version="1.0" encoding="utf-8"?>
+<file path=ppt/slides/slide15.xml><?xml version="1.0" encoding="utf-8"?>
 <p:sld xmlns:a="http://schemas.openxmlformats.org/drawingml/2006/main" xmlns:r="http://schemas.openxmlformats.org/officeDocument/2006/relationships" xmlns:p="http://schemas.openxmlformats.org/presentationml/2006/main" show="0">
   <p:cSld>
     <p:spTree>
@@ -16060,7 +16248,7 @@
 </p:sld>
 </file>
 
-<file path=ppt/slides/slide14.xml><?xml version="1.0" encoding="utf-8"?>
+<file path=ppt/slides/slide16.xml><?xml version="1.0" encoding="utf-8"?>
 <p:sld xmlns:a="http://schemas.openxmlformats.org/drawingml/2006/main" xmlns:r="http://schemas.openxmlformats.org/officeDocument/2006/relationships" xmlns:p="http://schemas.openxmlformats.org/presentationml/2006/main" show="0">
   <p:cSld>
     <p:spTree>
@@ -16549,7 +16737,7 @@
 </p:sld>
 </file>
 
-<file path=ppt/slides/slide15.xml><?xml version="1.0" encoding="utf-8"?>
+<file path=ppt/slides/slide17.xml><?xml version="1.0" encoding="utf-8"?>
 <p:sld xmlns:a="http://schemas.openxmlformats.org/drawingml/2006/main" xmlns:r="http://schemas.openxmlformats.org/officeDocument/2006/relationships" xmlns:p="http://schemas.openxmlformats.org/presentationml/2006/main">
   <p:cSld>
     <p:spTree>
@@ -16616,12 +16804,3186 @@
           <a:lstStyle/>
           <a:p>
             <a:r>
-              <a:rPr lang="pl-PL"/>
+              <a:rPr lang="pl-PL" dirty="0"/>
               <a:t>W naszym projekcie wykorzystujemy architekturę dwuwarstwową klient-serwer.</a:t>
             </a:r>
+          </a:p>
+          <a:p>
+            <a:endParaRPr lang="pl-PL" dirty="0"/>
+          </a:p>
+          <a:p>
+            <a:endParaRPr lang="pl-PL" dirty="0"/>
           </a:p>
         </p:txBody>
       </p:sp>
+      <p:grpSp>
+        <p:nvGrpSpPr>
+          <p:cNvPr id="4" name="Grupa 3">
+            <a:extLst>
+              <a:ext uri="{FF2B5EF4-FFF2-40B4-BE49-F238E27FC236}">
+                <a16:creationId xmlns:a16="http://schemas.microsoft.com/office/drawing/2014/main" id="{E0E238D8-DCAD-4F3B-B3C0-6B7B5BE131A3}"/>
+              </a:ext>
+            </a:extLst>
+          </p:cNvPr>
+          <p:cNvGrpSpPr/>
+          <p:nvPr/>
+        </p:nvGrpSpPr>
+        <p:grpSpPr>
+          <a:xfrm>
+            <a:off x="3608113" y="3573989"/>
+            <a:ext cx="4191001" cy="2362200"/>
+            <a:chOff x="2339752" y="3760537"/>
+            <a:chExt cx="4191001" cy="2362200"/>
+          </a:xfrm>
+        </p:grpSpPr>
+        <p:grpSp>
+          <p:nvGrpSpPr>
+            <p:cNvPr id="5" name="Group 11">
+              <a:extLst>
+                <a:ext uri="{FF2B5EF4-FFF2-40B4-BE49-F238E27FC236}">
+                  <a16:creationId xmlns:a16="http://schemas.microsoft.com/office/drawing/2014/main" id="{20881B34-37DC-4743-A8AD-38313C1453E5}"/>
+                </a:ext>
+              </a:extLst>
+            </p:cNvPr>
+            <p:cNvGrpSpPr>
+              <a:grpSpLocks/>
+            </p:cNvGrpSpPr>
+            <p:nvPr/>
+          </p:nvGrpSpPr>
+          <p:grpSpPr bwMode="auto">
+            <a:xfrm>
+              <a:off x="2339752" y="3760537"/>
+              <a:ext cx="4191001" cy="2362200"/>
+              <a:chOff x="336" y="1248"/>
+              <a:chExt cx="5124" cy="2394"/>
+            </a:xfrm>
+          </p:grpSpPr>
+          <p:sp>
+            <p:nvSpPr>
+              <p:cNvPr id="7" name="laptop">
+                <a:extLst>
+                  <a:ext uri="{FF2B5EF4-FFF2-40B4-BE49-F238E27FC236}">
+                    <a16:creationId xmlns:a16="http://schemas.microsoft.com/office/drawing/2014/main" id="{0B749EE0-B7FF-4E3D-AAE3-3991A3DF7A3D}"/>
+                  </a:ext>
+                </a:extLst>
+              </p:cNvPr>
+              <p:cNvSpPr>
+                <a:spLocks noEditPoints="1" noChangeArrowheads="1"/>
+              </p:cNvSpPr>
+              <p:nvPr/>
+            </p:nvSpPr>
+            <p:spPr bwMode="auto">
+              <a:xfrm>
+                <a:off x="336" y="1344"/>
+                <a:ext cx="1140" cy="858"/>
+              </a:xfrm>
+              <a:custGeom>
+                <a:avLst/>
+                <a:gdLst>
+                  <a:gd name="T0" fmla="*/ 3362 w 21600"/>
+                  <a:gd name="T1" fmla="*/ 0 h 21600"/>
+                  <a:gd name="T2" fmla="*/ 3362 w 21600"/>
+                  <a:gd name="T3" fmla="*/ 7173 h 21600"/>
+                  <a:gd name="T4" fmla="*/ 18327 w 21600"/>
+                  <a:gd name="T5" fmla="*/ 0 h 21600"/>
+                  <a:gd name="T6" fmla="*/ 18327 w 21600"/>
+                  <a:gd name="T7" fmla="*/ 7173 h 21600"/>
+                  <a:gd name="T8" fmla="*/ 10800 w 21600"/>
+                  <a:gd name="T9" fmla="*/ 0 h 21600"/>
+                  <a:gd name="T10" fmla="*/ 10800 w 21600"/>
+                  <a:gd name="T11" fmla="*/ 21600 h 21600"/>
+                  <a:gd name="T12" fmla="*/ 0 w 21600"/>
+                  <a:gd name="T13" fmla="*/ 21600 h 21600"/>
+                  <a:gd name="T14" fmla="*/ 21600 w 21600"/>
+                  <a:gd name="T15" fmla="*/ 21600 h 21600"/>
+                  <a:gd name="T16" fmla="*/ 4445 w 21600"/>
+                  <a:gd name="T17" fmla="*/ 1858 h 21600"/>
+                  <a:gd name="T18" fmla="*/ 17311 w 21600"/>
+                  <a:gd name="T19" fmla="*/ 12323 h 21600"/>
+                </a:gdLst>
+                <a:ahLst/>
+                <a:cxnLst>
+                  <a:cxn ang="0">
+                    <a:pos x="T0" y="T1"/>
+                  </a:cxn>
+                  <a:cxn ang="0">
+                    <a:pos x="T2" y="T3"/>
+                  </a:cxn>
+                  <a:cxn ang="0">
+                    <a:pos x="T4" y="T5"/>
+                  </a:cxn>
+                  <a:cxn ang="0">
+                    <a:pos x="T6" y="T7"/>
+                  </a:cxn>
+                  <a:cxn ang="0">
+                    <a:pos x="T8" y="T9"/>
+                  </a:cxn>
+                  <a:cxn ang="0">
+                    <a:pos x="T10" y="T11"/>
+                  </a:cxn>
+                  <a:cxn ang="0">
+                    <a:pos x="T12" y="T13"/>
+                  </a:cxn>
+                  <a:cxn ang="0">
+                    <a:pos x="T14" y="T15"/>
+                  </a:cxn>
+                </a:cxnLst>
+                <a:rect l="T16" t="T17" r="T18" b="T19"/>
+                <a:pathLst>
+                  <a:path w="21600" h="21600" extrusionOk="0">
+                    <a:moveTo>
+                      <a:pt x="3362" y="0"/>
+                    </a:moveTo>
+                    <a:lnTo>
+                      <a:pt x="18327" y="0"/>
+                    </a:lnTo>
+                    <a:lnTo>
+                      <a:pt x="18327" y="14347"/>
+                    </a:lnTo>
+                    <a:lnTo>
+                      <a:pt x="3362" y="14347"/>
+                    </a:lnTo>
+                    <a:lnTo>
+                      <a:pt x="3362" y="0"/>
+                    </a:lnTo>
+                    <a:close/>
+                  </a:path>
+                  <a:path w="21600" h="21600" extrusionOk="0">
+                    <a:moveTo>
+                      <a:pt x="3340" y="15068"/>
+                    </a:moveTo>
+                    <a:lnTo>
+                      <a:pt x="0" y="19877"/>
+                    </a:lnTo>
+                    <a:lnTo>
+                      <a:pt x="21600" y="19877"/>
+                    </a:lnTo>
+                    <a:lnTo>
+                      <a:pt x="18327" y="15068"/>
+                    </a:lnTo>
+                    <a:lnTo>
+                      <a:pt x="3340" y="15068"/>
+                    </a:lnTo>
+                    <a:close/>
+                  </a:path>
+                  <a:path w="21600" h="21600" extrusionOk="0">
+                    <a:moveTo>
+                      <a:pt x="0" y="19877"/>
+                    </a:moveTo>
+                    <a:lnTo>
+                      <a:pt x="0" y="21600"/>
+                    </a:lnTo>
+                    <a:lnTo>
+                      <a:pt x="21600" y="21600"/>
+                    </a:lnTo>
+                    <a:lnTo>
+                      <a:pt x="21600" y="19877"/>
+                    </a:lnTo>
+                    <a:lnTo>
+                      <a:pt x="0" y="19877"/>
+                    </a:lnTo>
+                    <a:close/>
+                  </a:path>
+                  <a:path w="21600" h="21600" extrusionOk="0">
+                    <a:moveTo>
+                      <a:pt x="4186" y="1523"/>
+                    </a:moveTo>
+                    <a:lnTo>
+                      <a:pt x="17547" y="1523"/>
+                    </a:lnTo>
+                    <a:lnTo>
+                      <a:pt x="17547" y="12744"/>
+                    </a:lnTo>
+                    <a:lnTo>
+                      <a:pt x="4186" y="12744"/>
+                    </a:lnTo>
+                    <a:lnTo>
+                      <a:pt x="4186" y="1523"/>
+                    </a:lnTo>
+                    <a:close/>
+                  </a:path>
+                  <a:path w="21600" h="21600" extrusionOk="0">
+                    <a:moveTo>
+                      <a:pt x="3318" y="15549"/>
+                    </a:moveTo>
+                    <a:lnTo>
+                      <a:pt x="2917" y="16110"/>
+                    </a:lnTo>
+                    <a:lnTo>
+                      <a:pt x="18727" y="16110"/>
+                    </a:lnTo>
+                    <a:lnTo>
+                      <a:pt x="18327" y="15549"/>
+                    </a:lnTo>
+                    <a:lnTo>
+                      <a:pt x="3318" y="15549"/>
+                    </a:lnTo>
+                    <a:close/>
+                  </a:path>
+                  <a:path w="21600" h="21600" extrusionOk="0">
+                    <a:moveTo>
+                      <a:pt x="6213" y="18314"/>
+                    </a:moveTo>
+                    <a:lnTo>
+                      <a:pt x="5946" y="18875"/>
+                    </a:lnTo>
+                    <a:lnTo>
+                      <a:pt x="15766" y="18875"/>
+                    </a:lnTo>
+                    <a:lnTo>
+                      <a:pt x="15499" y="18314"/>
+                    </a:lnTo>
+                    <a:lnTo>
+                      <a:pt x="6213" y="18314"/>
+                    </a:lnTo>
+                    <a:close/>
+                  </a:path>
+                  <a:path w="21600" h="21600" extrusionOk="0">
+                    <a:moveTo>
+                      <a:pt x="2828" y="16471"/>
+                    </a:moveTo>
+                    <a:lnTo>
+                      <a:pt x="2405" y="17072"/>
+                    </a:lnTo>
+                    <a:lnTo>
+                      <a:pt x="19284" y="17072"/>
+                    </a:lnTo>
+                    <a:lnTo>
+                      <a:pt x="18839" y="16471"/>
+                    </a:lnTo>
+                    <a:lnTo>
+                      <a:pt x="2828" y="16471"/>
+                    </a:lnTo>
+                    <a:close/>
+                  </a:path>
+                  <a:path w="21600" h="21600" extrusionOk="0">
+                    <a:moveTo>
+                      <a:pt x="2316" y="17352"/>
+                    </a:moveTo>
+                    <a:lnTo>
+                      <a:pt x="1871" y="17953"/>
+                    </a:lnTo>
+                    <a:lnTo>
+                      <a:pt x="19863" y="17953"/>
+                    </a:lnTo>
+                    <a:lnTo>
+                      <a:pt x="19395" y="17352"/>
+                    </a:lnTo>
+                    <a:lnTo>
+                      <a:pt x="2316" y="17352"/>
+                    </a:lnTo>
+                    <a:close/>
+                  </a:path>
+                </a:pathLst>
+              </a:custGeom>
+              <a:solidFill>
+                <a:srgbClr val="C0C0C0"/>
+              </a:solidFill>
+              <a:ln w="9525">
+                <a:solidFill>
+                  <a:srgbClr val="000000"/>
+                </a:solidFill>
+                <a:miter lim="800000"/>
+                <a:headEnd/>
+                <a:tailEnd/>
+              </a:ln>
+            </p:spPr>
+            <p:txBody>
+              <a:bodyPr/>
+              <a:lstStyle>
+                <a:defPPr>
+                  <a:defRPr lang="pl-PL"/>
+                </a:defPPr>
+                <a:lvl1pPr algn="l" rtl="0" fontAlgn="base">
+                  <a:spcBef>
+                    <a:spcPct val="0"/>
+                  </a:spcBef>
+                  <a:spcAft>
+                    <a:spcPct val="0"/>
+                  </a:spcAft>
+                  <a:defRPr sz="2400" kern="1200">
+                    <a:solidFill>
+                      <a:schemeClr val="tx1"/>
+                    </a:solidFill>
+                    <a:latin typeface="Times New Roman" pitchFamily="18" charset="0"/>
+                    <a:ea typeface="+mn-ea"/>
+                    <a:cs typeface="+mn-cs"/>
+                  </a:defRPr>
+                </a:lvl1pPr>
+                <a:lvl2pPr marL="457200" algn="l" rtl="0" fontAlgn="base">
+                  <a:spcBef>
+                    <a:spcPct val="0"/>
+                  </a:spcBef>
+                  <a:spcAft>
+                    <a:spcPct val="0"/>
+                  </a:spcAft>
+                  <a:defRPr sz="2400" kern="1200">
+                    <a:solidFill>
+                      <a:schemeClr val="tx1"/>
+                    </a:solidFill>
+                    <a:latin typeface="Times New Roman" pitchFamily="18" charset="0"/>
+                    <a:ea typeface="+mn-ea"/>
+                    <a:cs typeface="+mn-cs"/>
+                  </a:defRPr>
+                </a:lvl2pPr>
+                <a:lvl3pPr marL="914400" algn="l" rtl="0" fontAlgn="base">
+                  <a:spcBef>
+                    <a:spcPct val="0"/>
+                  </a:spcBef>
+                  <a:spcAft>
+                    <a:spcPct val="0"/>
+                  </a:spcAft>
+                  <a:defRPr sz="2400" kern="1200">
+                    <a:solidFill>
+                      <a:schemeClr val="tx1"/>
+                    </a:solidFill>
+                    <a:latin typeface="Times New Roman" pitchFamily="18" charset="0"/>
+                    <a:ea typeface="+mn-ea"/>
+                    <a:cs typeface="+mn-cs"/>
+                  </a:defRPr>
+                </a:lvl3pPr>
+                <a:lvl4pPr marL="1371600" algn="l" rtl="0" fontAlgn="base">
+                  <a:spcBef>
+                    <a:spcPct val="0"/>
+                  </a:spcBef>
+                  <a:spcAft>
+                    <a:spcPct val="0"/>
+                  </a:spcAft>
+                  <a:defRPr sz="2400" kern="1200">
+                    <a:solidFill>
+                      <a:schemeClr val="tx1"/>
+                    </a:solidFill>
+                    <a:latin typeface="Times New Roman" pitchFamily="18" charset="0"/>
+                    <a:ea typeface="+mn-ea"/>
+                    <a:cs typeface="+mn-cs"/>
+                  </a:defRPr>
+                </a:lvl4pPr>
+                <a:lvl5pPr marL="1828800" algn="l" rtl="0" fontAlgn="base">
+                  <a:spcBef>
+                    <a:spcPct val="0"/>
+                  </a:spcBef>
+                  <a:spcAft>
+                    <a:spcPct val="0"/>
+                  </a:spcAft>
+                  <a:defRPr sz="2400" kern="1200">
+                    <a:solidFill>
+                      <a:schemeClr val="tx1"/>
+                    </a:solidFill>
+                    <a:latin typeface="Times New Roman" pitchFamily="18" charset="0"/>
+                    <a:ea typeface="+mn-ea"/>
+                    <a:cs typeface="+mn-cs"/>
+                  </a:defRPr>
+                </a:lvl5pPr>
+                <a:lvl6pPr marL="2286000" algn="l" defTabSz="914400" rtl="0" eaLnBrk="1" latinLnBrk="0" hangingPunct="1">
+                  <a:defRPr sz="2400" kern="1200">
+                    <a:solidFill>
+                      <a:schemeClr val="tx1"/>
+                    </a:solidFill>
+                    <a:latin typeface="Times New Roman" pitchFamily="18" charset="0"/>
+                    <a:ea typeface="+mn-ea"/>
+                    <a:cs typeface="+mn-cs"/>
+                  </a:defRPr>
+                </a:lvl6pPr>
+                <a:lvl7pPr marL="2743200" algn="l" defTabSz="914400" rtl="0" eaLnBrk="1" latinLnBrk="0" hangingPunct="1">
+                  <a:defRPr sz="2400" kern="1200">
+                    <a:solidFill>
+                      <a:schemeClr val="tx1"/>
+                    </a:solidFill>
+                    <a:latin typeface="Times New Roman" pitchFamily="18" charset="0"/>
+                    <a:ea typeface="+mn-ea"/>
+                    <a:cs typeface="+mn-cs"/>
+                  </a:defRPr>
+                </a:lvl7pPr>
+                <a:lvl8pPr marL="3200400" algn="l" defTabSz="914400" rtl="0" eaLnBrk="1" latinLnBrk="0" hangingPunct="1">
+                  <a:defRPr sz="2400" kern="1200">
+                    <a:solidFill>
+                      <a:schemeClr val="tx1"/>
+                    </a:solidFill>
+                    <a:latin typeface="Times New Roman" pitchFamily="18" charset="0"/>
+                    <a:ea typeface="+mn-ea"/>
+                    <a:cs typeface="+mn-cs"/>
+                  </a:defRPr>
+                </a:lvl8pPr>
+                <a:lvl9pPr marL="3657600" algn="l" defTabSz="914400" rtl="0" eaLnBrk="1" latinLnBrk="0" hangingPunct="1">
+                  <a:defRPr sz="2400" kern="1200">
+                    <a:solidFill>
+                      <a:schemeClr val="tx1"/>
+                    </a:solidFill>
+                    <a:latin typeface="Times New Roman" pitchFamily="18" charset="0"/>
+                    <a:ea typeface="+mn-ea"/>
+                    <a:cs typeface="+mn-cs"/>
+                  </a:defRPr>
+                </a:lvl9pPr>
+              </a:lstStyle>
+              <a:p>
+                <a:endParaRPr lang="pl-PL"/>
+              </a:p>
+            </p:txBody>
+          </p:sp>
+          <p:sp>
+            <p:nvSpPr>
+              <p:cNvPr id="8" name="laptop">
+                <a:extLst>
+                  <a:ext uri="{FF2B5EF4-FFF2-40B4-BE49-F238E27FC236}">
+                    <a16:creationId xmlns:a16="http://schemas.microsoft.com/office/drawing/2014/main" id="{9E1E1E66-6A7B-402D-98A9-7C76B45A6512}"/>
+                  </a:ext>
+                </a:extLst>
+              </p:cNvPr>
+              <p:cNvSpPr>
+                <a:spLocks noEditPoints="1" noChangeArrowheads="1"/>
+              </p:cNvSpPr>
+              <p:nvPr/>
+            </p:nvSpPr>
+            <p:spPr bwMode="auto">
+              <a:xfrm>
+                <a:off x="336" y="2688"/>
+                <a:ext cx="1140" cy="858"/>
+              </a:xfrm>
+              <a:custGeom>
+                <a:avLst/>
+                <a:gdLst>
+                  <a:gd name="T0" fmla="*/ 3362 w 21600"/>
+                  <a:gd name="T1" fmla="*/ 0 h 21600"/>
+                  <a:gd name="T2" fmla="*/ 3362 w 21600"/>
+                  <a:gd name="T3" fmla="*/ 7173 h 21600"/>
+                  <a:gd name="T4" fmla="*/ 18327 w 21600"/>
+                  <a:gd name="T5" fmla="*/ 0 h 21600"/>
+                  <a:gd name="T6" fmla="*/ 18327 w 21600"/>
+                  <a:gd name="T7" fmla="*/ 7173 h 21600"/>
+                  <a:gd name="T8" fmla="*/ 10800 w 21600"/>
+                  <a:gd name="T9" fmla="*/ 0 h 21600"/>
+                  <a:gd name="T10" fmla="*/ 10800 w 21600"/>
+                  <a:gd name="T11" fmla="*/ 21600 h 21600"/>
+                  <a:gd name="T12" fmla="*/ 0 w 21600"/>
+                  <a:gd name="T13" fmla="*/ 21600 h 21600"/>
+                  <a:gd name="T14" fmla="*/ 21600 w 21600"/>
+                  <a:gd name="T15" fmla="*/ 21600 h 21600"/>
+                  <a:gd name="T16" fmla="*/ 4445 w 21600"/>
+                  <a:gd name="T17" fmla="*/ 1858 h 21600"/>
+                  <a:gd name="T18" fmla="*/ 17311 w 21600"/>
+                  <a:gd name="T19" fmla="*/ 12323 h 21600"/>
+                </a:gdLst>
+                <a:ahLst/>
+                <a:cxnLst>
+                  <a:cxn ang="0">
+                    <a:pos x="T0" y="T1"/>
+                  </a:cxn>
+                  <a:cxn ang="0">
+                    <a:pos x="T2" y="T3"/>
+                  </a:cxn>
+                  <a:cxn ang="0">
+                    <a:pos x="T4" y="T5"/>
+                  </a:cxn>
+                  <a:cxn ang="0">
+                    <a:pos x="T6" y="T7"/>
+                  </a:cxn>
+                  <a:cxn ang="0">
+                    <a:pos x="T8" y="T9"/>
+                  </a:cxn>
+                  <a:cxn ang="0">
+                    <a:pos x="T10" y="T11"/>
+                  </a:cxn>
+                  <a:cxn ang="0">
+                    <a:pos x="T12" y="T13"/>
+                  </a:cxn>
+                  <a:cxn ang="0">
+                    <a:pos x="T14" y="T15"/>
+                  </a:cxn>
+                </a:cxnLst>
+                <a:rect l="T16" t="T17" r="T18" b="T19"/>
+                <a:pathLst>
+                  <a:path w="21600" h="21600" extrusionOk="0">
+                    <a:moveTo>
+                      <a:pt x="3362" y="0"/>
+                    </a:moveTo>
+                    <a:lnTo>
+                      <a:pt x="18327" y="0"/>
+                    </a:lnTo>
+                    <a:lnTo>
+                      <a:pt x="18327" y="14347"/>
+                    </a:lnTo>
+                    <a:lnTo>
+                      <a:pt x="3362" y="14347"/>
+                    </a:lnTo>
+                    <a:lnTo>
+                      <a:pt x="3362" y="0"/>
+                    </a:lnTo>
+                    <a:close/>
+                  </a:path>
+                  <a:path w="21600" h="21600" extrusionOk="0">
+                    <a:moveTo>
+                      <a:pt x="3340" y="15068"/>
+                    </a:moveTo>
+                    <a:lnTo>
+                      <a:pt x="0" y="19877"/>
+                    </a:lnTo>
+                    <a:lnTo>
+                      <a:pt x="21600" y="19877"/>
+                    </a:lnTo>
+                    <a:lnTo>
+                      <a:pt x="18327" y="15068"/>
+                    </a:lnTo>
+                    <a:lnTo>
+                      <a:pt x="3340" y="15068"/>
+                    </a:lnTo>
+                    <a:close/>
+                  </a:path>
+                  <a:path w="21600" h="21600" extrusionOk="0">
+                    <a:moveTo>
+                      <a:pt x="0" y="19877"/>
+                    </a:moveTo>
+                    <a:lnTo>
+                      <a:pt x="0" y="21600"/>
+                    </a:lnTo>
+                    <a:lnTo>
+                      <a:pt x="21600" y="21600"/>
+                    </a:lnTo>
+                    <a:lnTo>
+                      <a:pt x="21600" y="19877"/>
+                    </a:lnTo>
+                    <a:lnTo>
+                      <a:pt x="0" y="19877"/>
+                    </a:lnTo>
+                    <a:close/>
+                  </a:path>
+                  <a:path w="21600" h="21600" extrusionOk="0">
+                    <a:moveTo>
+                      <a:pt x="4186" y="1523"/>
+                    </a:moveTo>
+                    <a:lnTo>
+                      <a:pt x="17547" y="1523"/>
+                    </a:lnTo>
+                    <a:lnTo>
+                      <a:pt x="17547" y="12744"/>
+                    </a:lnTo>
+                    <a:lnTo>
+                      <a:pt x="4186" y="12744"/>
+                    </a:lnTo>
+                    <a:lnTo>
+                      <a:pt x="4186" y="1523"/>
+                    </a:lnTo>
+                    <a:close/>
+                  </a:path>
+                  <a:path w="21600" h="21600" extrusionOk="0">
+                    <a:moveTo>
+                      <a:pt x="3318" y="15549"/>
+                    </a:moveTo>
+                    <a:lnTo>
+                      <a:pt x="2917" y="16110"/>
+                    </a:lnTo>
+                    <a:lnTo>
+                      <a:pt x="18727" y="16110"/>
+                    </a:lnTo>
+                    <a:lnTo>
+                      <a:pt x="18327" y="15549"/>
+                    </a:lnTo>
+                    <a:lnTo>
+                      <a:pt x="3318" y="15549"/>
+                    </a:lnTo>
+                    <a:close/>
+                  </a:path>
+                  <a:path w="21600" h="21600" extrusionOk="0">
+                    <a:moveTo>
+                      <a:pt x="6213" y="18314"/>
+                    </a:moveTo>
+                    <a:lnTo>
+                      <a:pt x="5946" y="18875"/>
+                    </a:lnTo>
+                    <a:lnTo>
+                      <a:pt x="15766" y="18875"/>
+                    </a:lnTo>
+                    <a:lnTo>
+                      <a:pt x="15499" y="18314"/>
+                    </a:lnTo>
+                    <a:lnTo>
+                      <a:pt x="6213" y="18314"/>
+                    </a:lnTo>
+                    <a:close/>
+                  </a:path>
+                  <a:path w="21600" h="21600" extrusionOk="0">
+                    <a:moveTo>
+                      <a:pt x="2828" y="16471"/>
+                    </a:moveTo>
+                    <a:lnTo>
+                      <a:pt x="2405" y="17072"/>
+                    </a:lnTo>
+                    <a:lnTo>
+                      <a:pt x="19284" y="17072"/>
+                    </a:lnTo>
+                    <a:lnTo>
+                      <a:pt x="18839" y="16471"/>
+                    </a:lnTo>
+                    <a:lnTo>
+                      <a:pt x="2828" y="16471"/>
+                    </a:lnTo>
+                    <a:close/>
+                  </a:path>
+                  <a:path w="21600" h="21600" extrusionOk="0">
+                    <a:moveTo>
+                      <a:pt x="2316" y="17352"/>
+                    </a:moveTo>
+                    <a:lnTo>
+                      <a:pt x="1871" y="17953"/>
+                    </a:lnTo>
+                    <a:lnTo>
+                      <a:pt x="19863" y="17953"/>
+                    </a:lnTo>
+                    <a:lnTo>
+                      <a:pt x="19395" y="17352"/>
+                    </a:lnTo>
+                    <a:lnTo>
+                      <a:pt x="2316" y="17352"/>
+                    </a:lnTo>
+                    <a:close/>
+                  </a:path>
+                </a:pathLst>
+              </a:custGeom>
+              <a:solidFill>
+                <a:srgbClr val="C0C0C0"/>
+              </a:solidFill>
+              <a:ln w="9525">
+                <a:solidFill>
+                  <a:srgbClr val="000000"/>
+                </a:solidFill>
+                <a:miter lim="800000"/>
+                <a:headEnd/>
+                <a:tailEnd/>
+              </a:ln>
+            </p:spPr>
+            <p:txBody>
+              <a:bodyPr/>
+              <a:lstStyle>
+                <a:defPPr>
+                  <a:defRPr lang="pl-PL"/>
+                </a:defPPr>
+                <a:lvl1pPr algn="l" rtl="0" fontAlgn="base">
+                  <a:spcBef>
+                    <a:spcPct val="0"/>
+                  </a:spcBef>
+                  <a:spcAft>
+                    <a:spcPct val="0"/>
+                  </a:spcAft>
+                  <a:defRPr sz="2400" kern="1200">
+                    <a:solidFill>
+                      <a:schemeClr val="tx1"/>
+                    </a:solidFill>
+                    <a:latin typeface="Times New Roman" pitchFamily="18" charset="0"/>
+                    <a:ea typeface="+mn-ea"/>
+                    <a:cs typeface="+mn-cs"/>
+                  </a:defRPr>
+                </a:lvl1pPr>
+                <a:lvl2pPr marL="457200" algn="l" rtl="0" fontAlgn="base">
+                  <a:spcBef>
+                    <a:spcPct val="0"/>
+                  </a:spcBef>
+                  <a:spcAft>
+                    <a:spcPct val="0"/>
+                  </a:spcAft>
+                  <a:defRPr sz="2400" kern="1200">
+                    <a:solidFill>
+                      <a:schemeClr val="tx1"/>
+                    </a:solidFill>
+                    <a:latin typeface="Times New Roman" pitchFamily="18" charset="0"/>
+                    <a:ea typeface="+mn-ea"/>
+                    <a:cs typeface="+mn-cs"/>
+                  </a:defRPr>
+                </a:lvl2pPr>
+                <a:lvl3pPr marL="914400" algn="l" rtl="0" fontAlgn="base">
+                  <a:spcBef>
+                    <a:spcPct val="0"/>
+                  </a:spcBef>
+                  <a:spcAft>
+                    <a:spcPct val="0"/>
+                  </a:spcAft>
+                  <a:defRPr sz="2400" kern="1200">
+                    <a:solidFill>
+                      <a:schemeClr val="tx1"/>
+                    </a:solidFill>
+                    <a:latin typeface="Times New Roman" pitchFamily="18" charset="0"/>
+                    <a:ea typeface="+mn-ea"/>
+                    <a:cs typeface="+mn-cs"/>
+                  </a:defRPr>
+                </a:lvl3pPr>
+                <a:lvl4pPr marL="1371600" algn="l" rtl="0" fontAlgn="base">
+                  <a:spcBef>
+                    <a:spcPct val="0"/>
+                  </a:spcBef>
+                  <a:spcAft>
+                    <a:spcPct val="0"/>
+                  </a:spcAft>
+                  <a:defRPr sz="2400" kern="1200">
+                    <a:solidFill>
+                      <a:schemeClr val="tx1"/>
+                    </a:solidFill>
+                    <a:latin typeface="Times New Roman" pitchFamily="18" charset="0"/>
+                    <a:ea typeface="+mn-ea"/>
+                    <a:cs typeface="+mn-cs"/>
+                  </a:defRPr>
+                </a:lvl4pPr>
+                <a:lvl5pPr marL="1828800" algn="l" rtl="0" fontAlgn="base">
+                  <a:spcBef>
+                    <a:spcPct val="0"/>
+                  </a:spcBef>
+                  <a:spcAft>
+                    <a:spcPct val="0"/>
+                  </a:spcAft>
+                  <a:defRPr sz="2400" kern="1200">
+                    <a:solidFill>
+                      <a:schemeClr val="tx1"/>
+                    </a:solidFill>
+                    <a:latin typeface="Times New Roman" pitchFamily="18" charset="0"/>
+                    <a:ea typeface="+mn-ea"/>
+                    <a:cs typeface="+mn-cs"/>
+                  </a:defRPr>
+                </a:lvl5pPr>
+                <a:lvl6pPr marL="2286000" algn="l" defTabSz="914400" rtl="0" eaLnBrk="1" latinLnBrk="0" hangingPunct="1">
+                  <a:defRPr sz="2400" kern="1200">
+                    <a:solidFill>
+                      <a:schemeClr val="tx1"/>
+                    </a:solidFill>
+                    <a:latin typeface="Times New Roman" pitchFamily="18" charset="0"/>
+                    <a:ea typeface="+mn-ea"/>
+                    <a:cs typeface="+mn-cs"/>
+                  </a:defRPr>
+                </a:lvl6pPr>
+                <a:lvl7pPr marL="2743200" algn="l" defTabSz="914400" rtl="0" eaLnBrk="1" latinLnBrk="0" hangingPunct="1">
+                  <a:defRPr sz="2400" kern="1200">
+                    <a:solidFill>
+                      <a:schemeClr val="tx1"/>
+                    </a:solidFill>
+                    <a:latin typeface="Times New Roman" pitchFamily="18" charset="0"/>
+                    <a:ea typeface="+mn-ea"/>
+                    <a:cs typeface="+mn-cs"/>
+                  </a:defRPr>
+                </a:lvl7pPr>
+                <a:lvl8pPr marL="3200400" algn="l" defTabSz="914400" rtl="0" eaLnBrk="1" latinLnBrk="0" hangingPunct="1">
+                  <a:defRPr sz="2400" kern="1200">
+                    <a:solidFill>
+                      <a:schemeClr val="tx1"/>
+                    </a:solidFill>
+                    <a:latin typeface="Times New Roman" pitchFamily="18" charset="0"/>
+                    <a:ea typeface="+mn-ea"/>
+                    <a:cs typeface="+mn-cs"/>
+                  </a:defRPr>
+                </a:lvl8pPr>
+                <a:lvl9pPr marL="3657600" algn="l" defTabSz="914400" rtl="0" eaLnBrk="1" latinLnBrk="0" hangingPunct="1">
+                  <a:defRPr sz="2400" kern="1200">
+                    <a:solidFill>
+                      <a:schemeClr val="tx1"/>
+                    </a:solidFill>
+                    <a:latin typeface="Times New Roman" pitchFamily="18" charset="0"/>
+                    <a:ea typeface="+mn-ea"/>
+                    <a:cs typeface="+mn-cs"/>
+                  </a:defRPr>
+                </a:lvl9pPr>
+              </a:lstStyle>
+              <a:p>
+                <a:endParaRPr lang="pl-PL"/>
+              </a:p>
+            </p:txBody>
+          </p:sp>
+          <p:sp>
+            <p:nvSpPr>
+              <p:cNvPr id="9" name="laptop">
+                <a:extLst>
+                  <a:ext uri="{FF2B5EF4-FFF2-40B4-BE49-F238E27FC236}">
+                    <a16:creationId xmlns:a16="http://schemas.microsoft.com/office/drawing/2014/main" id="{26FFBFEC-5675-4E05-8739-EC3A33FB5AE3}"/>
+                  </a:ext>
+                </a:extLst>
+              </p:cNvPr>
+              <p:cNvSpPr>
+                <a:spLocks noEditPoints="1" noChangeArrowheads="1"/>
+              </p:cNvSpPr>
+              <p:nvPr/>
+            </p:nvSpPr>
+            <p:spPr bwMode="auto">
+              <a:xfrm>
+                <a:off x="4320" y="1248"/>
+                <a:ext cx="1140" cy="858"/>
+              </a:xfrm>
+              <a:custGeom>
+                <a:avLst/>
+                <a:gdLst>
+                  <a:gd name="T0" fmla="*/ 3362 w 21600"/>
+                  <a:gd name="T1" fmla="*/ 0 h 21600"/>
+                  <a:gd name="T2" fmla="*/ 3362 w 21600"/>
+                  <a:gd name="T3" fmla="*/ 7173 h 21600"/>
+                  <a:gd name="T4" fmla="*/ 18327 w 21600"/>
+                  <a:gd name="T5" fmla="*/ 0 h 21600"/>
+                  <a:gd name="T6" fmla="*/ 18327 w 21600"/>
+                  <a:gd name="T7" fmla="*/ 7173 h 21600"/>
+                  <a:gd name="T8" fmla="*/ 10800 w 21600"/>
+                  <a:gd name="T9" fmla="*/ 0 h 21600"/>
+                  <a:gd name="T10" fmla="*/ 10800 w 21600"/>
+                  <a:gd name="T11" fmla="*/ 21600 h 21600"/>
+                  <a:gd name="T12" fmla="*/ 0 w 21600"/>
+                  <a:gd name="T13" fmla="*/ 21600 h 21600"/>
+                  <a:gd name="T14" fmla="*/ 21600 w 21600"/>
+                  <a:gd name="T15" fmla="*/ 21600 h 21600"/>
+                  <a:gd name="T16" fmla="*/ 4445 w 21600"/>
+                  <a:gd name="T17" fmla="*/ 1858 h 21600"/>
+                  <a:gd name="T18" fmla="*/ 17311 w 21600"/>
+                  <a:gd name="T19" fmla="*/ 12323 h 21600"/>
+                </a:gdLst>
+                <a:ahLst/>
+                <a:cxnLst>
+                  <a:cxn ang="0">
+                    <a:pos x="T0" y="T1"/>
+                  </a:cxn>
+                  <a:cxn ang="0">
+                    <a:pos x="T2" y="T3"/>
+                  </a:cxn>
+                  <a:cxn ang="0">
+                    <a:pos x="T4" y="T5"/>
+                  </a:cxn>
+                  <a:cxn ang="0">
+                    <a:pos x="T6" y="T7"/>
+                  </a:cxn>
+                  <a:cxn ang="0">
+                    <a:pos x="T8" y="T9"/>
+                  </a:cxn>
+                  <a:cxn ang="0">
+                    <a:pos x="T10" y="T11"/>
+                  </a:cxn>
+                  <a:cxn ang="0">
+                    <a:pos x="T12" y="T13"/>
+                  </a:cxn>
+                  <a:cxn ang="0">
+                    <a:pos x="T14" y="T15"/>
+                  </a:cxn>
+                </a:cxnLst>
+                <a:rect l="T16" t="T17" r="T18" b="T19"/>
+                <a:pathLst>
+                  <a:path w="21600" h="21600" extrusionOk="0">
+                    <a:moveTo>
+                      <a:pt x="3362" y="0"/>
+                    </a:moveTo>
+                    <a:lnTo>
+                      <a:pt x="18327" y="0"/>
+                    </a:lnTo>
+                    <a:lnTo>
+                      <a:pt x="18327" y="14347"/>
+                    </a:lnTo>
+                    <a:lnTo>
+                      <a:pt x="3362" y="14347"/>
+                    </a:lnTo>
+                    <a:lnTo>
+                      <a:pt x="3362" y="0"/>
+                    </a:lnTo>
+                    <a:close/>
+                  </a:path>
+                  <a:path w="21600" h="21600" extrusionOk="0">
+                    <a:moveTo>
+                      <a:pt x="3340" y="15068"/>
+                    </a:moveTo>
+                    <a:lnTo>
+                      <a:pt x="0" y="19877"/>
+                    </a:lnTo>
+                    <a:lnTo>
+                      <a:pt x="21600" y="19877"/>
+                    </a:lnTo>
+                    <a:lnTo>
+                      <a:pt x="18327" y="15068"/>
+                    </a:lnTo>
+                    <a:lnTo>
+                      <a:pt x="3340" y="15068"/>
+                    </a:lnTo>
+                    <a:close/>
+                  </a:path>
+                  <a:path w="21600" h="21600" extrusionOk="0">
+                    <a:moveTo>
+                      <a:pt x="0" y="19877"/>
+                    </a:moveTo>
+                    <a:lnTo>
+                      <a:pt x="0" y="21600"/>
+                    </a:lnTo>
+                    <a:lnTo>
+                      <a:pt x="21600" y="21600"/>
+                    </a:lnTo>
+                    <a:lnTo>
+                      <a:pt x="21600" y="19877"/>
+                    </a:lnTo>
+                    <a:lnTo>
+                      <a:pt x="0" y="19877"/>
+                    </a:lnTo>
+                    <a:close/>
+                  </a:path>
+                  <a:path w="21600" h="21600" extrusionOk="0">
+                    <a:moveTo>
+                      <a:pt x="4186" y="1523"/>
+                    </a:moveTo>
+                    <a:lnTo>
+                      <a:pt x="17547" y="1523"/>
+                    </a:lnTo>
+                    <a:lnTo>
+                      <a:pt x="17547" y="12744"/>
+                    </a:lnTo>
+                    <a:lnTo>
+                      <a:pt x="4186" y="12744"/>
+                    </a:lnTo>
+                    <a:lnTo>
+                      <a:pt x="4186" y="1523"/>
+                    </a:lnTo>
+                    <a:close/>
+                  </a:path>
+                  <a:path w="21600" h="21600" extrusionOk="0">
+                    <a:moveTo>
+                      <a:pt x="3318" y="15549"/>
+                    </a:moveTo>
+                    <a:lnTo>
+                      <a:pt x="2917" y="16110"/>
+                    </a:lnTo>
+                    <a:lnTo>
+                      <a:pt x="18727" y="16110"/>
+                    </a:lnTo>
+                    <a:lnTo>
+                      <a:pt x="18327" y="15549"/>
+                    </a:lnTo>
+                    <a:lnTo>
+                      <a:pt x="3318" y="15549"/>
+                    </a:lnTo>
+                    <a:close/>
+                  </a:path>
+                  <a:path w="21600" h="21600" extrusionOk="0">
+                    <a:moveTo>
+                      <a:pt x="6213" y="18314"/>
+                    </a:moveTo>
+                    <a:lnTo>
+                      <a:pt x="5946" y="18875"/>
+                    </a:lnTo>
+                    <a:lnTo>
+                      <a:pt x="15766" y="18875"/>
+                    </a:lnTo>
+                    <a:lnTo>
+                      <a:pt x="15499" y="18314"/>
+                    </a:lnTo>
+                    <a:lnTo>
+                      <a:pt x="6213" y="18314"/>
+                    </a:lnTo>
+                    <a:close/>
+                  </a:path>
+                  <a:path w="21600" h="21600" extrusionOk="0">
+                    <a:moveTo>
+                      <a:pt x="2828" y="16471"/>
+                    </a:moveTo>
+                    <a:lnTo>
+                      <a:pt x="2405" y="17072"/>
+                    </a:lnTo>
+                    <a:lnTo>
+                      <a:pt x="19284" y="17072"/>
+                    </a:lnTo>
+                    <a:lnTo>
+                      <a:pt x="18839" y="16471"/>
+                    </a:lnTo>
+                    <a:lnTo>
+                      <a:pt x="2828" y="16471"/>
+                    </a:lnTo>
+                    <a:close/>
+                  </a:path>
+                  <a:path w="21600" h="21600" extrusionOk="0">
+                    <a:moveTo>
+                      <a:pt x="2316" y="17352"/>
+                    </a:moveTo>
+                    <a:lnTo>
+                      <a:pt x="1871" y="17953"/>
+                    </a:lnTo>
+                    <a:lnTo>
+                      <a:pt x="19863" y="17953"/>
+                    </a:lnTo>
+                    <a:lnTo>
+                      <a:pt x="19395" y="17352"/>
+                    </a:lnTo>
+                    <a:lnTo>
+                      <a:pt x="2316" y="17352"/>
+                    </a:lnTo>
+                    <a:close/>
+                  </a:path>
+                </a:pathLst>
+              </a:custGeom>
+              <a:solidFill>
+                <a:srgbClr val="C0C0C0"/>
+              </a:solidFill>
+              <a:ln w="9525">
+                <a:solidFill>
+                  <a:srgbClr val="000000"/>
+                </a:solidFill>
+                <a:miter lim="800000"/>
+                <a:headEnd/>
+                <a:tailEnd/>
+              </a:ln>
+            </p:spPr>
+            <p:txBody>
+              <a:bodyPr/>
+              <a:lstStyle>
+                <a:defPPr>
+                  <a:defRPr lang="pl-PL"/>
+                </a:defPPr>
+                <a:lvl1pPr algn="l" rtl="0" fontAlgn="base">
+                  <a:spcBef>
+                    <a:spcPct val="0"/>
+                  </a:spcBef>
+                  <a:spcAft>
+                    <a:spcPct val="0"/>
+                  </a:spcAft>
+                  <a:defRPr sz="2400" kern="1200">
+                    <a:solidFill>
+                      <a:schemeClr val="tx1"/>
+                    </a:solidFill>
+                    <a:latin typeface="Times New Roman" pitchFamily="18" charset="0"/>
+                    <a:ea typeface="+mn-ea"/>
+                    <a:cs typeface="+mn-cs"/>
+                  </a:defRPr>
+                </a:lvl1pPr>
+                <a:lvl2pPr marL="457200" algn="l" rtl="0" fontAlgn="base">
+                  <a:spcBef>
+                    <a:spcPct val="0"/>
+                  </a:spcBef>
+                  <a:spcAft>
+                    <a:spcPct val="0"/>
+                  </a:spcAft>
+                  <a:defRPr sz="2400" kern="1200">
+                    <a:solidFill>
+                      <a:schemeClr val="tx1"/>
+                    </a:solidFill>
+                    <a:latin typeface="Times New Roman" pitchFamily="18" charset="0"/>
+                    <a:ea typeface="+mn-ea"/>
+                    <a:cs typeface="+mn-cs"/>
+                  </a:defRPr>
+                </a:lvl2pPr>
+                <a:lvl3pPr marL="914400" algn="l" rtl="0" fontAlgn="base">
+                  <a:spcBef>
+                    <a:spcPct val="0"/>
+                  </a:spcBef>
+                  <a:spcAft>
+                    <a:spcPct val="0"/>
+                  </a:spcAft>
+                  <a:defRPr sz="2400" kern="1200">
+                    <a:solidFill>
+                      <a:schemeClr val="tx1"/>
+                    </a:solidFill>
+                    <a:latin typeface="Times New Roman" pitchFamily="18" charset="0"/>
+                    <a:ea typeface="+mn-ea"/>
+                    <a:cs typeface="+mn-cs"/>
+                  </a:defRPr>
+                </a:lvl3pPr>
+                <a:lvl4pPr marL="1371600" algn="l" rtl="0" fontAlgn="base">
+                  <a:spcBef>
+                    <a:spcPct val="0"/>
+                  </a:spcBef>
+                  <a:spcAft>
+                    <a:spcPct val="0"/>
+                  </a:spcAft>
+                  <a:defRPr sz="2400" kern="1200">
+                    <a:solidFill>
+                      <a:schemeClr val="tx1"/>
+                    </a:solidFill>
+                    <a:latin typeface="Times New Roman" pitchFamily="18" charset="0"/>
+                    <a:ea typeface="+mn-ea"/>
+                    <a:cs typeface="+mn-cs"/>
+                  </a:defRPr>
+                </a:lvl4pPr>
+                <a:lvl5pPr marL="1828800" algn="l" rtl="0" fontAlgn="base">
+                  <a:spcBef>
+                    <a:spcPct val="0"/>
+                  </a:spcBef>
+                  <a:spcAft>
+                    <a:spcPct val="0"/>
+                  </a:spcAft>
+                  <a:defRPr sz="2400" kern="1200">
+                    <a:solidFill>
+                      <a:schemeClr val="tx1"/>
+                    </a:solidFill>
+                    <a:latin typeface="Times New Roman" pitchFamily="18" charset="0"/>
+                    <a:ea typeface="+mn-ea"/>
+                    <a:cs typeface="+mn-cs"/>
+                  </a:defRPr>
+                </a:lvl5pPr>
+                <a:lvl6pPr marL="2286000" algn="l" defTabSz="914400" rtl="0" eaLnBrk="1" latinLnBrk="0" hangingPunct="1">
+                  <a:defRPr sz="2400" kern="1200">
+                    <a:solidFill>
+                      <a:schemeClr val="tx1"/>
+                    </a:solidFill>
+                    <a:latin typeface="Times New Roman" pitchFamily="18" charset="0"/>
+                    <a:ea typeface="+mn-ea"/>
+                    <a:cs typeface="+mn-cs"/>
+                  </a:defRPr>
+                </a:lvl6pPr>
+                <a:lvl7pPr marL="2743200" algn="l" defTabSz="914400" rtl="0" eaLnBrk="1" latinLnBrk="0" hangingPunct="1">
+                  <a:defRPr sz="2400" kern="1200">
+                    <a:solidFill>
+                      <a:schemeClr val="tx1"/>
+                    </a:solidFill>
+                    <a:latin typeface="Times New Roman" pitchFamily="18" charset="0"/>
+                    <a:ea typeface="+mn-ea"/>
+                    <a:cs typeface="+mn-cs"/>
+                  </a:defRPr>
+                </a:lvl7pPr>
+                <a:lvl8pPr marL="3200400" algn="l" defTabSz="914400" rtl="0" eaLnBrk="1" latinLnBrk="0" hangingPunct="1">
+                  <a:defRPr sz="2400" kern="1200">
+                    <a:solidFill>
+                      <a:schemeClr val="tx1"/>
+                    </a:solidFill>
+                    <a:latin typeface="Times New Roman" pitchFamily="18" charset="0"/>
+                    <a:ea typeface="+mn-ea"/>
+                    <a:cs typeface="+mn-cs"/>
+                  </a:defRPr>
+                </a:lvl8pPr>
+                <a:lvl9pPr marL="3657600" algn="l" defTabSz="914400" rtl="0" eaLnBrk="1" latinLnBrk="0" hangingPunct="1">
+                  <a:defRPr sz="2400" kern="1200">
+                    <a:solidFill>
+                      <a:schemeClr val="tx1"/>
+                    </a:solidFill>
+                    <a:latin typeface="Times New Roman" pitchFamily="18" charset="0"/>
+                    <a:ea typeface="+mn-ea"/>
+                    <a:cs typeface="+mn-cs"/>
+                  </a:defRPr>
+                </a:lvl9pPr>
+              </a:lstStyle>
+              <a:p>
+                <a:endParaRPr lang="pl-PL"/>
+              </a:p>
+            </p:txBody>
+          </p:sp>
+          <p:sp>
+            <p:nvSpPr>
+              <p:cNvPr id="10" name="laptop">
+                <a:extLst>
+                  <a:ext uri="{FF2B5EF4-FFF2-40B4-BE49-F238E27FC236}">
+                    <a16:creationId xmlns:a16="http://schemas.microsoft.com/office/drawing/2014/main" id="{F60DF7DA-35D6-4013-A46C-916549FFF265}"/>
+                  </a:ext>
+                </a:extLst>
+              </p:cNvPr>
+              <p:cNvSpPr>
+                <a:spLocks noEditPoints="1" noChangeArrowheads="1"/>
+              </p:cNvSpPr>
+              <p:nvPr/>
+            </p:nvSpPr>
+            <p:spPr bwMode="auto">
+              <a:xfrm>
+                <a:off x="4224" y="2784"/>
+                <a:ext cx="1140" cy="858"/>
+              </a:xfrm>
+              <a:custGeom>
+                <a:avLst/>
+                <a:gdLst>
+                  <a:gd name="T0" fmla="*/ 3362 w 21600"/>
+                  <a:gd name="T1" fmla="*/ 0 h 21600"/>
+                  <a:gd name="T2" fmla="*/ 3362 w 21600"/>
+                  <a:gd name="T3" fmla="*/ 7173 h 21600"/>
+                  <a:gd name="T4" fmla="*/ 18327 w 21600"/>
+                  <a:gd name="T5" fmla="*/ 0 h 21600"/>
+                  <a:gd name="T6" fmla="*/ 18327 w 21600"/>
+                  <a:gd name="T7" fmla="*/ 7173 h 21600"/>
+                  <a:gd name="T8" fmla="*/ 10800 w 21600"/>
+                  <a:gd name="T9" fmla="*/ 0 h 21600"/>
+                  <a:gd name="T10" fmla="*/ 10800 w 21600"/>
+                  <a:gd name="T11" fmla="*/ 21600 h 21600"/>
+                  <a:gd name="T12" fmla="*/ 0 w 21600"/>
+                  <a:gd name="T13" fmla="*/ 21600 h 21600"/>
+                  <a:gd name="T14" fmla="*/ 21600 w 21600"/>
+                  <a:gd name="T15" fmla="*/ 21600 h 21600"/>
+                  <a:gd name="T16" fmla="*/ 4445 w 21600"/>
+                  <a:gd name="T17" fmla="*/ 1858 h 21600"/>
+                  <a:gd name="T18" fmla="*/ 17311 w 21600"/>
+                  <a:gd name="T19" fmla="*/ 12323 h 21600"/>
+                </a:gdLst>
+                <a:ahLst/>
+                <a:cxnLst>
+                  <a:cxn ang="0">
+                    <a:pos x="T0" y="T1"/>
+                  </a:cxn>
+                  <a:cxn ang="0">
+                    <a:pos x="T2" y="T3"/>
+                  </a:cxn>
+                  <a:cxn ang="0">
+                    <a:pos x="T4" y="T5"/>
+                  </a:cxn>
+                  <a:cxn ang="0">
+                    <a:pos x="T6" y="T7"/>
+                  </a:cxn>
+                  <a:cxn ang="0">
+                    <a:pos x="T8" y="T9"/>
+                  </a:cxn>
+                  <a:cxn ang="0">
+                    <a:pos x="T10" y="T11"/>
+                  </a:cxn>
+                  <a:cxn ang="0">
+                    <a:pos x="T12" y="T13"/>
+                  </a:cxn>
+                  <a:cxn ang="0">
+                    <a:pos x="T14" y="T15"/>
+                  </a:cxn>
+                </a:cxnLst>
+                <a:rect l="T16" t="T17" r="T18" b="T19"/>
+                <a:pathLst>
+                  <a:path w="21600" h="21600" extrusionOk="0">
+                    <a:moveTo>
+                      <a:pt x="3362" y="0"/>
+                    </a:moveTo>
+                    <a:lnTo>
+                      <a:pt x="18327" y="0"/>
+                    </a:lnTo>
+                    <a:lnTo>
+                      <a:pt x="18327" y="14347"/>
+                    </a:lnTo>
+                    <a:lnTo>
+                      <a:pt x="3362" y="14347"/>
+                    </a:lnTo>
+                    <a:lnTo>
+                      <a:pt x="3362" y="0"/>
+                    </a:lnTo>
+                    <a:close/>
+                  </a:path>
+                  <a:path w="21600" h="21600" extrusionOk="0">
+                    <a:moveTo>
+                      <a:pt x="3340" y="15068"/>
+                    </a:moveTo>
+                    <a:lnTo>
+                      <a:pt x="0" y="19877"/>
+                    </a:lnTo>
+                    <a:lnTo>
+                      <a:pt x="21600" y="19877"/>
+                    </a:lnTo>
+                    <a:lnTo>
+                      <a:pt x="18327" y="15068"/>
+                    </a:lnTo>
+                    <a:lnTo>
+                      <a:pt x="3340" y="15068"/>
+                    </a:lnTo>
+                    <a:close/>
+                  </a:path>
+                  <a:path w="21600" h="21600" extrusionOk="0">
+                    <a:moveTo>
+                      <a:pt x="0" y="19877"/>
+                    </a:moveTo>
+                    <a:lnTo>
+                      <a:pt x="0" y="21600"/>
+                    </a:lnTo>
+                    <a:lnTo>
+                      <a:pt x="21600" y="21600"/>
+                    </a:lnTo>
+                    <a:lnTo>
+                      <a:pt x="21600" y="19877"/>
+                    </a:lnTo>
+                    <a:lnTo>
+                      <a:pt x="0" y="19877"/>
+                    </a:lnTo>
+                    <a:close/>
+                  </a:path>
+                  <a:path w="21600" h="21600" extrusionOk="0">
+                    <a:moveTo>
+                      <a:pt x="4186" y="1523"/>
+                    </a:moveTo>
+                    <a:lnTo>
+                      <a:pt x="17547" y="1523"/>
+                    </a:lnTo>
+                    <a:lnTo>
+                      <a:pt x="17547" y="12744"/>
+                    </a:lnTo>
+                    <a:lnTo>
+                      <a:pt x="4186" y="12744"/>
+                    </a:lnTo>
+                    <a:lnTo>
+                      <a:pt x="4186" y="1523"/>
+                    </a:lnTo>
+                    <a:close/>
+                  </a:path>
+                  <a:path w="21600" h="21600" extrusionOk="0">
+                    <a:moveTo>
+                      <a:pt x="3318" y="15549"/>
+                    </a:moveTo>
+                    <a:lnTo>
+                      <a:pt x="2917" y="16110"/>
+                    </a:lnTo>
+                    <a:lnTo>
+                      <a:pt x="18727" y="16110"/>
+                    </a:lnTo>
+                    <a:lnTo>
+                      <a:pt x="18327" y="15549"/>
+                    </a:lnTo>
+                    <a:lnTo>
+                      <a:pt x="3318" y="15549"/>
+                    </a:lnTo>
+                    <a:close/>
+                  </a:path>
+                  <a:path w="21600" h="21600" extrusionOk="0">
+                    <a:moveTo>
+                      <a:pt x="6213" y="18314"/>
+                    </a:moveTo>
+                    <a:lnTo>
+                      <a:pt x="5946" y="18875"/>
+                    </a:lnTo>
+                    <a:lnTo>
+                      <a:pt x="15766" y="18875"/>
+                    </a:lnTo>
+                    <a:lnTo>
+                      <a:pt x="15499" y="18314"/>
+                    </a:lnTo>
+                    <a:lnTo>
+                      <a:pt x="6213" y="18314"/>
+                    </a:lnTo>
+                    <a:close/>
+                  </a:path>
+                  <a:path w="21600" h="21600" extrusionOk="0">
+                    <a:moveTo>
+                      <a:pt x="2828" y="16471"/>
+                    </a:moveTo>
+                    <a:lnTo>
+                      <a:pt x="2405" y="17072"/>
+                    </a:lnTo>
+                    <a:lnTo>
+                      <a:pt x="19284" y="17072"/>
+                    </a:lnTo>
+                    <a:lnTo>
+                      <a:pt x="18839" y="16471"/>
+                    </a:lnTo>
+                    <a:lnTo>
+                      <a:pt x="2828" y="16471"/>
+                    </a:lnTo>
+                    <a:close/>
+                  </a:path>
+                  <a:path w="21600" h="21600" extrusionOk="0">
+                    <a:moveTo>
+                      <a:pt x="2316" y="17352"/>
+                    </a:moveTo>
+                    <a:lnTo>
+                      <a:pt x="1871" y="17953"/>
+                    </a:lnTo>
+                    <a:lnTo>
+                      <a:pt x="19863" y="17953"/>
+                    </a:lnTo>
+                    <a:lnTo>
+                      <a:pt x="19395" y="17352"/>
+                    </a:lnTo>
+                    <a:lnTo>
+                      <a:pt x="2316" y="17352"/>
+                    </a:lnTo>
+                    <a:close/>
+                  </a:path>
+                </a:pathLst>
+              </a:custGeom>
+              <a:solidFill>
+                <a:srgbClr val="C0C0C0"/>
+              </a:solidFill>
+              <a:ln w="9525">
+                <a:solidFill>
+                  <a:srgbClr val="000000"/>
+                </a:solidFill>
+                <a:miter lim="800000"/>
+                <a:headEnd/>
+                <a:tailEnd/>
+              </a:ln>
+            </p:spPr>
+            <p:txBody>
+              <a:bodyPr/>
+              <a:lstStyle>
+                <a:defPPr>
+                  <a:defRPr lang="pl-PL"/>
+                </a:defPPr>
+                <a:lvl1pPr algn="l" rtl="0" fontAlgn="base">
+                  <a:spcBef>
+                    <a:spcPct val="0"/>
+                  </a:spcBef>
+                  <a:spcAft>
+                    <a:spcPct val="0"/>
+                  </a:spcAft>
+                  <a:defRPr sz="2400" kern="1200">
+                    <a:solidFill>
+                      <a:schemeClr val="tx1"/>
+                    </a:solidFill>
+                    <a:latin typeface="Times New Roman" pitchFamily="18" charset="0"/>
+                    <a:ea typeface="+mn-ea"/>
+                    <a:cs typeface="+mn-cs"/>
+                  </a:defRPr>
+                </a:lvl1pPr>
+                <a:lvl2pPr marL="457200" algn="l" rtl="0" fontAlgn="base">
+                  <a:spcBef>
+                    <a:spcPct val="0"/>
+                  </a:spcBef>
+                  <a:spcAft>
+                    <a:spcPct val="0"/>
+                  </a:spcAft>
+                  <a:defRPr sz="2400" kern="1200">
+                    <a:solidFill>
+                      <a:schemeClr val="tx1"/>
+                    </a:solidFill>
+                    <a:latin typeface="Times New Roman" pitchFamily="18" charset="0"/>
+                    <a:ea typeface="+mn-ea"/>
+                    <a:cs typeface="+mn-cs"/>
+                  </a:defRPr>
+                </a:lvl2pPr>
+                <a:lvl3pPr marL="914400" algn="l" rtl="0" fontAlgn="base">
+                  <a:spcBef>
+                    <a:spcPct val="0"/>
+                  </a:spcBef>
+                  <a:spcAft>
+                    <a:spcPct val="0"/>
+                  </a:spcAft>
+                  <a:defRPr sz="2400" kern="1200">
+                    <a:solidFill>
+                      <a:schemeClr val="tx1"/>
+                    </a:solidFill>
+                    <a:latin typeface="Times New Roman" pitchFamily="18" charset="0"/>
+                    <a:ea typeface="+mn-ea"/>
+                    <a:cs typeface="+mn-cs"/>
+                  </a:defRPr>
+                </a:lvl3pPr>
+                <a:lvl4pPr marL="1371600" algn="l" rtl="0" fontAlgn="base">
+                  <a:spcBef>
+                    <a:spcPct val="0"/>
+                  </a:spcBef>
+                  <a:spcAft>
+                    <a:spcPct val="0"/>
+                  </a:spcAft>
+                  <a:defRPr sz="2400" kern="1200">
+                    <a:solidFill>
+                      <a:schemeClr val="tx1"/>
+                    </a:solidFill>
+                    <a:latin typeface="Times New Roman" pitchFamily="18" charset="0"/>
+                    <a:ea typeface="+mn-ea"/>
+                    <a:cs typeface="+mn-cs"/>
+                  </a:defRPr>
+                </a:lvl4pPr>
+                <a:lvl5pPr marL="1828800" algn="l" rtl="0" fontAlgn="base">
+                  <a:spcBef>
+                    <a:spcPct val="0"/>
+                  </a:spcBef>
+                  <a:spcAft>
+                    <a:spcPct val="0"/>
+                  </a:spcAft>
+                  <a:defRPr sz="2400" kern="1200">
+                    <a:solidFill>
+                      <a:schemeClr val="tx1"/>
+                    </a:solidFill>
+                    <a:latin typeface="Times New Roman" pitchFamily="18" charset="0"/>
+                    <a:ea typeface="+mn-ea"/>
+                    <a:cs typeface="+mn-cs"/>
+                  </a:defRPr>
+                </a:lvl5pPr>
+                <a:lvl6pPr marL="2286000" algn="l" defTabSz="914400" rtl="0" eaLnBrk="1" latinLnBrk="0" hangingPunct="1">
+                  <a:defRPr sz="2400" kern="1200">
+                    <a:solidFill>
+                      <a:schemeClr val="tx1"/>
+                    </a:solidFill>
+                    <a:latin typeface="Times New Roman" pitchFamily="18" charset="0"/>
+                    <a:ea typeface="+mn-ea"/>
+                    <a:cs typeface="+mn-cs"/>
+                  </a:defRPr>
+                </a:lvl6pPr>
+                <a:lvl7pPr marL="2743200" algn="l" defTabSz="914400" rtl="0" eaLnBrk="1" latinLnBrk="0" hangingPunct="1">
+                  <a:defRPr sz="2400" kern="1200">
+                    <a:solidFill>
+                      <a:schemeClr val="tx1"/>
+                    </a:solidFill>
+                    <a:latin typeface="Times New Roman" pitchFamily="18" charset="0"/>
+                    <a:ea typeface="+mn-ea"/>
+                    <a:cs typeface="+mn-cs"/>
+                  </a:defRPr>
+                </a:lvl7pPr>
+                <a:lvl8pPr marL="3200400" algn="l" defTabSz="914400" rtl="0" eaLnBrk="1" latinLnBrk="0" hangingPunct="1">
+                  <a:defRPr sz="2400" kern="1200">
+                    <a:solidFill>
+                      <a:schemeClr val="tx1"/>
+                    </a:solidFill>
+                    <a:latin typeface="Times New Roman" pitchFamily="18" charset="0"/>
+                    <a:ea typeface="+mn-ea"/>
+                    <a:cs typeface="+mn-cs"/>
+                  </a:defRPr>
+                </a:lvl8pPr>
+                <a:lvl9pPr marL="3657600" algn="l" defTabSz="914400" rtl="0" eaLnBrk="1" latinLnBrk="0" hangingPunct="1">
+                  <a:defRPr sz="2400" kern="1200">
+                    <a:solidFill>
+                      <a:schemeClr val="tx1"/>
+                    </a:solidFill>
+                    <a:latin typeface="Times New Roman" pitchFamily="18" charset="0"/>
+                    <a:ea typeface="+mn-ea"/>
+                    <a:cs typeface="+mn-cs"/>
+                  </a:defRPr>
+                </a:lvl9pPr>
+              </a:lstStyle>
+              <a:p>
+                <a:endParaRPr lang="pl-PL"/>
+              </a:p>
+            </p:txBody>
+          </p:sp>
+          <p:sp>
+            <p:nvSpPr>
+              <p:cNvPr id="11" name="Line 16">
+                <a:extLst>
+                  <a:ext uri="{FF2B5EF4-FFF2-40B4-BE49-F238E27FC236}">
+                    <a16:creationId xmlns:a16="http://schemas.microsoft.com/office/drawing/2014/main" id="{B847FA97-3F8C-432C-8A9D-00B969D21D55}"/>
+                  </a:ext>
+                </a:extLst>
+              </p:cNvPr>
+              <p:cNvSpPr>
+                <a:spLocks noChangeShapeType="1"/>
+              </p:cNvSpPr>
+              <p:nvPr/>
+            </p:nvSpPr>
+            <p:spPr bwMode="auto">
+              <a:xfrm>
+                <a:off x="1488" y="1680"/>
+                <a:ext cx="768" cy="576"/>
+              </a:xfrm>
+              <a:prstGeom prst="line">
+                <a:avLst/>
+              </a:prstGeom>
+              <a:noFill/>
+              <a:ln w="38100">
+                <a:solidFill>
+                  <a:schemeClr val="tx1"/>
+                </a:solidFill>
+                <a:round/>
+                <a:headEnd type="triangle" w="med" len="med"/>
+                <a:tailEnd type="triangle" w="med" len="med"/>
+              </a:ln>
+              <a:effectLst/>
+              <a:extLst>
+                <a:ext uri="{909E8E84-426E-40DD-AFC4-6F175D3DCCD1}">
+                  <a14:hiddenFill xmlns:a14="http://schemas.microsoft.com/office/drawing/2010/main">
+                    <a:noFill/>
+                  </a14:hiddenFill>
+                </a:ext>
+                <a:ext uri="{AF507438-7753-43E0-B8FC-AC1667EBCBE1}">
+                  <a14:hiddenEffects xmlns:a14="http://schemas.microsoft.com/office/drawing/2010/main">
+                    <a:effectLst>
+                      <a:outerShdw dist="35921" dir="2700000" algn="ctr" rotWithShape="0">
+                        <a:schemeClr val="bg2"/>
+                      </a:outerShdw>
+                    </a:effectLst>
+                  </a14:hiddenEffects>
+                </a:ext>
+              </a:extLst>
+            </p:spPr>
+            <p:txBody>
+              <a:bodyPr/>
+              <a:lstStyle>
+                <a:defPPr>
+                  <a:defRPr lang="pl-PL"/>
+                </a:defPPr>
+                <a:lvl1pPr algn="l" rtl="0" fontAlgn="base">
+                  <a:spcBef>
+                    <a:spcPct val="0"/>
+                  </a:spcBef>
+                  <a:spcAft>
+                    <a:spcPct val="0"/>
+                  </a:spcAft>
+                  <a:defRPr sz="2400" kern="1200">
+                    <a:solidFill>
+                      <a:schemeClr val="tx1"/>
+                    </a:solidFill>
+                    <a:latin typeface="Times New Roman" pitchFamily="18" charset="0"/>
+                    <a:ea typeface="+mn-ea"/>
+                    <a:cs typeface="+mn-cs"/>
+                  </a:defRPr>
+                </a:lvl1pPr>
+                <a:lvl2pPr marL="457200" algn="l" rtl="0" fontAlgn="base">
+                  <a:spcBef>
+                    <a:spcPct val="0"/>
+                  </a:spcBef>
+                  <a:spcAft>
+                    <a:spcPct val="0"/>
+                  </a:spcAft>
+                  <a:defRPr sz="2400" kern="1200">
+                    <a:solidFill>
+                      <a:schemeClr val="tx1"/>
+                    </a:solidFill>
+                    <a:latin typeface="Times New Roman" pitchFamily="18" charset="0"/>
+                    <a:ea typeface="+mn-ea"/>
+                    <a:cs typeface="+mn-cs"/>
+                  </a:defRPr>
+                </a:lvl2pPr>
+                <a:lvl3pPr marL="914400" algn="l" rtl="0" fontAlgn="base">
+                  <a:spcBef>
+                    <a:spcPct val="0"/>
+                  </a:spcBef>
+                  <a:spcAft>
+                    <a:spcPct val="0"/>
+                  </a:spcAft>
+                  <a:defRPr sz="2400" kern="1200">
+                    <a:solidFill>
+                      <a:schemeClr val="tx1"/>
+                    </a:solidFill>
+                    <a:latin typeface="Times New Roman" pitchFamily="18" charset="0"/>
+                    <a:ea typeface="+mn-ea"/>
+                    <a:cs typeface="+mn-cs"/>
+                  </a:defRPr>
+                </a:lvl3pPr>
+                <a:lvl4pPr marL="1371600" algn="l" rtl="0" fontAlgn="base">
+                  <a:spcBef>
+                    <a:spcPct val="0"/>
+                  </a:spcBef>
+                  <a:spcAft>
+                    <a:spcPct val="0"/>
+                  </a:spcAft>
+                  <a:defRPr sz="2400" kern="1200">
+                    <a:solidFill>
+                      <a:schemeClr val="tx1"/>
+                    </a:solidFill>
+                    <a:latin typeface="Times New Roman" pitchFamily="18" charset="0"/>
+                    <a:ea typeface="+mn-ea"/>
+                    <a:cs typeface="+mn-cs"/>
+                  </a:defRPr>
+                </a:lvl4pPr>
+                <a:lvl5pPr marL="1828800" algn="l" rtl="0" fontAlgn="base">
+                  <a:spcBef>
+                    <a:spcPct val="0"/>
+                  </a:spcBef>
+                  <a:spcAft>
+                    <a:spcPct val="0"/>
+                  </a:spcAft>
+                  <a:defRPr sz="2400" kern="1200">
+                    <a:solidFill>
+                      <a:schemeClr val="tx1"/>
+                    </a:solidFill>
+                    <a:latin typeface="Times New Roman" pitchFamily="18" charset="0"/>
+                    <a:ea typeface="+mn-ea"/>
+                    <a:cs typeface="+mn-cs"/>
+                  </a:defRPr>
+                </a:lvl5pPr>
+                <a:lvl6pPr marL="2286000" algn="l" defTabSz="914400" rtl="0" eaLnBrk="1" latinLnBrk="0" hangingPunct="1">
+                  <a:defRPr sz="2400" kern="1200">
+                    <a:solidFill>
+                      <a:schemeClr val="tx1"/>
+                    </a:solidFill>
+                    <a:latin typeface="Times New Roman" pitchFamily="18" charset="0"/>
+                    <a:ea typeface="+mn-ea"/>
+                    <a:cs typeface="+mn-cs"/>
+                  </a:defRPr>
+                </a:lvl6pPr>
+                <a:lvl7pPr marL="2743200" algn="l" defTabSz="914400" rtl="0" eaLnBrk="1" latinLnBrk="0" hangingPunct="1">
+                  <a:defRPr sz="2400" kern="1200">
+                    <a:solidFill>
+                      <a:schemeClr val="tx1"/>
+                    </a:solidFill>
+                    <a:latin typeface="Times New Roman" pitchFamily="18" charset="0"/>
+                    <a:ea typeface="+mn-ea"/>
+                    <a:cs typeface="+mn-cs"/>
+                  </a:defRPr>
+                </a:lvl7pPr>
+                <a:lvl8pPr marL="3200400" algn="l" defTabSz="914400" rtl="0" eaLnBrk="1" latinLnBrk="0" hangingPunct="1">
+                  <a:defRPr sz="2400" kern="1200">
+                    <a:solidFill>
+                      <a:schemeClr val="tx1"/>
+                    </a:solidFill>
+                    <a:latin typeface="Times New Roman" pitchFamily="18" charset="0"/>
+                    <a:ea typeface="+mn-ea"/>
+                    <a:cs typeface="+mn-cs"/>
+                  </a:defRPr>
+                </a:lvl8pPr>
+                <a:lvl9pPr marL="3657600" algn="l" defTabSz="914400" rtl="0" eaLnBrk="1" latinLnBrk="0" hangingPunct="1">
+                  <a:defRPr sz="2400" kern="1200">
+                    <a:solidFill>
+                      <a:schemeClr val="tx1"/>
+                    </a:solidFill>
+                    <a:latin typeface="Times New Roman" pitchFamily="18" charset="0"/>
+                    <a:ea typeface="+mn-ea"/>
+                    <a:cs typeface="+mn-cs"/>
+                  </a:defRPr>
+                </a:lvl9pPr>
+              </a:lstStyle>
+              <a:p>
+                <a:endParaRPr lang="pl-PL"/>
+              </a:p>
+            </p:txBody>
+          </p:sp>
+          <p:sp>
+            <p:nvSpPr>
+              <p:cNvPr id="12" name="Line 17">
+                <a:extLst>
+                  <a:ext uri="{FF2B5EF4-FFF2-40B4-BE49-F238E27FC236}">
+                    <a16:creationId xmlns:a16="http://schemas.microsoft.com/office/drawing/2014/main" id="{FF77A56C-333D-4E41-B3A7-1C746AA7BB98}"/>
+                  </a:ext>
+                </a:extLst>
+              </p:cNvPr>
+              <p:cNvSpPr>
+                <a:spLocks noChangeShapeType="1"/>
+              </p:cNvSpPr>
+              <p:nvPr/>
+            </p:nvSpPr>
+            <p:spPr bwMode="auto">
+              <a:xfrm flipV="1">
+                <a:off x="1392" y="2544"/>
+                <a:ext cx="816" cy="624"/>
+              </a:xfrm>
+              <a:prstGeom prst="line">
+                <a:avLst/>
+              </a:prstGeom>
+              <a:noFill/>
+              <a:ln w="38100">
+                <a:solidFill>
+                  <a:schemeClr val="tx1"/>
+                </a:solidFill>
+                <a:round/>
+                <a:headEnd type="triangle" w="med" len="med"/>
+                <a:tailEnd type="triangle" w="med" len="med"/>
+              </a:ln>
+              <a:effectLst/>
+              <a:extLst>
+                <a:ext uri="{909E8E84-426E-40DD-AFC4-6F175D3DCCD1}">
+                  <a14:hiddenFill xmlns:a14="http://schemas.microsoft.com/office/drawing/2010/main">
+                    <a:noFill/>
+                  </a14:hiddenFill>
+                </a:ext>
+                <a:ext uri="{AF507438-7753-43E0-B8FC-AC1667EBCBE1}">
+                  <a14:hiddenEffects xmlns:a14="http://schemas.microsoft.com/office/drawing/2010/main">
+                    <a:effectLst>
+                      <a:outerShdw dist="35921" dir="2700000" algn="ctr" rotWithShape="0">
+                        <a:schemeClr val="bg2"/>
+                      </a:outerShdw>
+                    </a:effectLst>
+                  </a14:hiddenEffects>
+                </a:ext>
+              </a:extLst>
+            </p:spPr>
+            <p:txBody>
+              <a:bodyPr/>
+              <a:lstStyle>
+                <a:defPPr>
+                  <a:defRPr lang="pl-PL"/>
+                </a:defPPr>
+                <a:lvl1pPr algn="l" rtl="0" fontAlgn="base">
+                  <a:spcBef>
+                    <a:spcPct val="0"/>
+                  </a:spcBef>
+                  <a:spcAft>
+                    <a:spcPct val="0"/>
+                  </a:spcAft>
+                  <a:defRPr sz="2400" kern="1200">
+                    <a:solidFill>
+                      <a:schemeClr val="tx1"/>
+                    </a:solidFill>
+                    <a:latin typeface="Times New Roman" pitchFamily="18" charset="0"/>
+                    <a:ea typeface="+mn-ea"/>
+                    <a:cs typeface="+mn-cs"/>
+                  </a:defRPr>
+                </a:lvl1pPr>
+                <a:lvl2pPr marL="457200" algn="l" rtl="0" fontAlgn="base">
+                  <a:spcBef>
+                    <a:spcPct val="0"/>
+                  </a:spcBef>
+                  <a:spcAft>
+                    <a:spcPct val="0"/>
+                  </a:spcAft>
+                  <a:defRPr sz="2400" kern="1200">
+                    <a:solidFill>
+                      <a:schemeClr val="tx1"/>
+                    </a:solidFill>
+                    <a:latin typeface="Times New Roman" pitchFamily="18" charset="0"/>
+                    <a:ea typeface="+mn-ea"/>
+                    <a:cs typeface="+mn-cs"/>
+                  </a:defRPr>
+                </a:lvl2pPr>
+                <a:lvl3pPr marL="914400" algn="l" rtl="0" fontAlgn="base">
+                  <a:spcBef>
+                    <a:spcPct val="0"/>
+                  </a:spcBef>
+                  <a:spcAft>
+                    <a:spcPct val="0"/>
+                  </a:spcAft>
+                  <a:defRPr sz="2400" kern="1200">
+                    <a:solidFill>
+                      <a:schemeClr val="tx1"/>
+                    </a:solidFill>
+                    <a:latin typeface="Times New Roman" pitchFamily="18" charset="0"/>
+                    <a:ea typeface="+mn-ea"/>
+                    <a:cs typeface="+mn-cs"/>
+                  </a:defRPr>
+                </a:lvl3pPr>
+                <a:lvl4pPr marL="1371600" algn="l" rtl="0" fontAlgn="base">
+                  <a:spcBef>
+                    <a:spcPct val="0"/>
+                  </a:spcBef>
+                  <a:spcAft>
+                    <a:spcPct val="0"/>
+                  </a:spcAft>
+                  <a:defRPr sz="2400" kern="1200">
+                    <a:solidFill>
+                      <a:schemeClr val="tx1"/>
+                    </a:solidFill>
+                    <a:latin typeface="Times New Roman" pitchFamily="18" charset="0"/>
+                    <a:ea typeface="+mn-ea"/>
+                    <a:cs typeface="+mn-cs"/>
+                  </a:defRPr>
+                </a:lvl4pPr>
+                <a:lvl5pPr marL="1828800" algn="l" rtl="0" fontAlgn="base">
+                  <a:spcBef>
+                    <a:spcPct val="0"/>
+                  </a:spcBef>
+                  <a:spcAft>
+                    <a:spcPct val="0"/>
+                  </a:spcAft>
+                  <a:defRPr sz="2400" kern="1200">
+                    <a:solidFill>
+                      <a:schemeClr val="tx1"/>
+                    </a:solidFill>
+                    <a:latin typeface="Times New Roman" pitchFamily="18" charset="0"/>
+                    <a:ea typeface="+mn-ea"/>
+                    <a:cs typeface="+mn-cs"/>
+                  </a:defRPr>
+                </a:lvl5pPr>
+                <a:lvl6pPr marL="2286000" algn="l" defTabSz="914400" rtl="0" eaLnBrk="1" latinLnBrk="0" hangingPunct="1">
+                  <a:defRPr sz="2400" kern="1200">
+                    <a:solidFill>
+                      <a:schemeClr val="tx1"/>
+                    </a:solidFill>
+                    <a:latin typeface="Times New Roman" pitchFamily="18" charset="0"/>
+                    <a:ea typeface="+mn-ea"/>
+                    <a:cs typeface="+mn-cs"/>
+                  </a:defRPr>
+                </a:lvl6pPr>
+                <a:lvl7pPr marL="2743200" algn="l" defTabSz="914400" rtl="0" eaLnBrk="1" latinLnBrk="0" hangingPunct="1">
+                  <a:defRPr sz="2400" kern="1200">
+                    <a:solidFill>
+                      <a:schemeClr val="tx1"/>
+                    </a:solidFill>
+                    <a:latin typeface="Times New Roman" pitchFamily="18" charset="0"/>
+                    <a:ea typeface="+mn-ea"/>
+                    <a:cs typeface="+mn-cs"/>
+                  </a:defRPr>
+                </a:lvl7pPr>
+                <a:lvl8pPr marL="3200400" algn="l" defTabSz="914400" rtl="0" eaLnBrk="1" latinLnBrk="0" hangingPunct="1">
+                  <a:defRPr sz="2400" kern="1200">
+                    <a:solidFill>
+                      <a:schemeClr val="tx1"/>
+                    </a:solidFill>
+                    <a:latin typeface="Times New Roman" pitchFamily="18" charset="0"/>
+                    <a:ea typeface="+mn-ea"/>
+                    <a:cs typeface="+mn-cs"/>
+                  </a:defRPr>
+                </a:lvl8pPr>
+                <a:lvl9pPr marL="3657600" algn="l" defTabSz="914400" rtl="0" eaLnBrk="1" latinLnBrk="0" hangingPunct="1">
+                  <a:defRPr sz="2400" kern="1200">
+                    <a:solidFill>
+                      <a:schemeClr val="tx1"/>
+                    </a:solidFill>
+                    <a:latin typeface="Times New Roman" pitchFamily="18" charset="0"/>
+                    <a:ea typeface="+mn-ea"/>
+                    <a:cs typeface="+mn-cs"/>
+                  </a:defRPr>
+                </a:lvl9pPr>
+              </a:lstStyle>
+              <a:p>
+                <a:endParaRPr lang="pl-PL"/>
+              </a:p>
+            </p:txBody>
+          </p:sp>
+          <p:sp>
+            <p:nvSpPr>
+              <p:cNvPr id="13" name="Line 18">
+                <a:extLst>
+                  <a:ext uri="{FF2B5EF4-FFF2-40B4-BE49-F238E27FC236}">
+                    <a16:creationId xmlns:a16="http://schemas.microsoft.com/office/drawing/2014/main" id="{88C9B22A-962D-467D-A185-8879356A6B27}"/>
+                  </a:ext>
+                </a:extLst>
+              </p:cNvPr>
+              <p:cNvSpPr>
+                <a:spLocks noChangeShapeType="1"/>
+              </p:cNvSpPr>
+              <p:nvPr/>
+            </p:nvSpPr>
+            <p:spPr bwMode="auto">
+              <a:xfrm>
+                <a:off x="3552" y="2544"/>
+                <a:ext cx="768" cy="576"/>
+              </a:xfrm>
+              <a:prstGeom prst="line">
+                <a:avLst/>
+              </a:prstGeom>
+              <a:noFill/>
+              <a:ln w="38100">
+                <a:solidFill>
+                  <a:schemeClr val="tx1"/>
+                </a:solidFill>
+                <a:round/>
+                <a:headEnd type="triangle" w="med" len="med"/>
+                <a:tailEnd type="triangle" w="med" len="med"/>
+              </a:ln>
+              <a:effectLst/>
+              <a:extLst>
+                <a:ext uri="{909E8E84-426E-40DD-AFC4-6F175D3DCCD1}">
+                  <a14:hiddenFill xmlns:a14="http://schemas.microsoft.com/office/drawing/2010/main">
+                    <a:noFill/>
+                  </a14:hiddenFill>
+                </a:ext>
+                <a:ext uri="{AF507438-7753-43E0-B8FC-AC1667EBCBE1}">
+                  <a14:hiddenEffects xmlns:a14="http://schemas.microsoft.com/office/drawing/2010/main">
+                    <a:effectLst>
+                      <a:outerShdw dist="35921" dir="2700000" algn="ctr" rotWithShape="0">
+                        <a:schemeClr val="bg2"/>
+                      </a:outerShdw>
+                    </a:effectLst>
+                  </a14:hiddenEffects>
+                </a:ext>
+              </a:extLst>
+            </p:spPr>
+            <p:txBody>
+              <a:bodyPr/>
+              <a:lstStyle>
+                <a:defPPr>
+                  <a:defRPr lang="pl-PL"/>
+                </a:defPPr>
+                <a:lvl1pPr algn="l" rtl="0" fontAlgn="base">
+                  <a:spcBef>
+                    <a:spcPct val="0"/>
+                  </a:spcBef>
+                  <a:spcAft>
+                    <a:spcPct val="0"/>
+                  </a:spcAft>
+                  <a:defRPr sz="2400" kern="1200">
+                    <a:solidFill>
+                      <a:schemeClr val="tx1"/>
+                    </a:solidFill>
+                    <a:latin typeface="Times New Roman" pitchFamily="18" charset="0"/>
+                    <a:ea typeface="+mn-ea"/>
+                    <a:cs typeface="+mn-cs"/>
+                  </a:defRPr>
+                </a:lvl1pPr>
+                <a:lvl2pPr marL="457200" algn="l" rtl="0" fontAlgn="base">
+                  <a:spcBef>
+                    <a:spcPct val="0"/>
+                  </a:spcBef>
+                  <a:spcAft>
+                    <a:spcPct val="0"/>
+                  </a:spcAft>
+                  <a:defRPr sz="2400" kern="1200">
+                    <a:solidFill>
+                      <a:schemeClr val="tx1"/>
+                    </a:solidFill>
+                    <a:latin typeface="Times New Roman" pitchFamily="18" charset="0"/>
+                    <a:ea typeface="+mn-ea"/>
+                    <a:cs typeface="+mn-cs"/>
+                  </a:defRPr>
+                </a:lvl2pPr>
+                <a:lvl3pPr marL="914400" algn="l" rtl="0" fontAlgn="base">
+                  <a:spcBef>
+                    <a:spcPct val="0"/>
+                  </a:spcBef>
+                  <a:spcAft>
+                    <a:spcPct val="0"/>
+                  </a:spcAft>
+                  <a:defRPr sz="2400" kern="1200">
+                    <a:solidFill>
+                      <a:schemeClr val="tx1"/>
+                    </a:solidFill>
+                    <a:latin typeface="Times New Roman" pitchFamily="18" charset="0"/>
+                    <a:ea typeface="+mn-ea"/>
+                    <a:cs typeface="+mn-cs"/>
+                  </a:defRPr>
+                </a:lvl3pPr>
+                <a:lvl4pPr marL="1371600" algn="l" rtl="0" fontAlgn="base">
+                  <a:spcBef>
+                    <a:spcPct val="0"/>
+                  </a:spcBef>
+                  <a:spcAft>
+                    <a:spcPct val="0"/>
+                  </a:spcAft>
+                  <a:defRPr sz="2400" kern="1200">
+                    <a:solidFill>
+                      <a:schemeClr val="tx1"/>
+                    </a:solidFill>
+                    <a:latin typeface="Times New Roman" pitchFamily="18" charset="0"/>
+                    <a:ea typeface="+mn-ea"/>
+                    <a:cs typeface="+mn-cs"/>
+                  </a:defRPr>
+                </a:lvl4pPr>
+                <a:lvl5pPr marL="1828800" algn="l" rtl="0" fontAlgn="base">
+                  <a:spcBef>
+                    <a:spcPct val="0"/>
+                  </a:spcBef>
+                  <a:spcAft>
+                    <a:spcPct val="0"/>
+                  </a:spcAft>
+                  <a:defRPr sz="2400" kern="1200">
+                    <a:solidFill>
+                      <a:schemeClr val="tx1"/>
+                    </a:solidFill>
+                    <a:latin typeface="Times New Roman" pitchFamily="18" charset="0"/>
+                    <a:ea typeface="+mn-ea"/>
+                    <a:cs typeface="+mn-cs"/>
+                  </a:defRPr>
+                </a:lvl5pPr>
+                <a:lvl6pPr marL="2286000" algn="l" defTabSz="914400" rtl="0" eaLnBrk="1" latinLnBrk="0" hangingPunct="1">
+                  <a:defRPr sz="2400" kern="1200">
+                    <a:solidFill>
+                      <a:schemeClr val="tx1"/>
+                    </a:solidFill>
+                    <a:latin typeface="Times New Roman" pitchFamily="18" charset="0"/>
+                    <a:ea typeface="+mn-ea"/>
+                    <a:cs typeface="+mn-cs"/>
+                  </a:defRPr>
+                </a:lvl6pPr>
+                <a:lvl7pPr marL="2743200" algn="l" defTabSz="914400" rtl="0" eaLnBrk="1" latinLnBrk="0" hangingPunct="1">
+                  <a:defRPr sz="2400" kern="1200">
+                    <a:solidFill>
+                      <a:schemeClr val="tx1"/>
+                    </a:solidFill>
+                    <a:latin typeface="Times New Roman" pitchFamily="18" charset="0"/>
+                    <a:ea typeface="+mn-ea"/>
+                    <a:cs typeface="+mn-cs"/>
+                  </a:defRPr>
+                </a:lvl7pPr>
+                <a:lvl8pPr marL="3200400" algn="l" defTabSz="914400" rtl="0" eaLnBrk="1" latinLnBrk="0" hangingPunct="1">
+                  <a:defRPr sz="2400" kern="1200">
+                    <a:solidFill>
+                      <a:schemeClr val="tx1"/>
+                    </a:solidFill>
+                    <a:latin typeface="Times New Roman" pitchFamily="18" charset="0"/>
+                    <a:ea typeface="+mn-ea"/>
+                    <a:cs typeface="+mn-cs"/>
+                  </a:defRPr>
+                </a:lvl8pPr>
+                <a:lvl9pPr marL="3657600" algn="l" defTabSz="914400" rtl="0" eaLnBrk="1" latinLnBrk="0" hangingPunct="1">
+                  <a:defRPr sz="2400" kern="1200">
+                    <a:solidFill>
+                      <a:schemeClr val="tx1"/>
+                    </a:solidFill>
+                    <a:latin typeface="Times New Roman" pitchFamily="18" charset="0"/>
+                    <a:ea typeface="+mn-ea"/>
+                    <a:cs typeface="+mn-cs"/>
+                  </a:defRPr>
+                </a:lvl9pPr>
+              </a:lstStyle>
+              <a:p>
+                <a:endParaRPr lang="pl-PL"/>
+              </a:p>
+            </p:txBody>
+          </p:sp>
+          <p:sp>
+            <p:nvSpPr>
+              <p:cNvPr id="14" name="Line 19">
+                <a:extLst>
+                  <a:ext uri="{FF2B5EF4-FFF2-40B4-BE49-F238E27FC236}">
+                    <a16:creationId xmlns:a16="http://schemas.microsoft.com/office/drawing/2014/main" id="{EDE5FEC0-EE8D-43B0-9958-BCC6BEF1908E}"/>
+                  </a:ext>
+                </a:extLst>
+              </p:cNvPr>
+              <p:cNvSpPr>
+                <a:spLocks noChangeShapeType="1"/>
+              </p:cNvSpPr>
+              <p:nvPr/>
+            </p:nvSpPr>
+            <p:spPr bwMode="auto">
+              <a:xfrm flipV="1">
+                <a:off x="3552" y="1632"/>
+                <a:ext cx="816" cy="624"/>
+              </a:xfrm>
+              <a:prstGeom prst="line">
+                <a:avLst/>
+              </a:prstGeom>
+              <a:noFill/>
+              <a:ln w="38100">
+                <a:solidFill>
+                  <a:schemeClr val="tx1"/>
+                </a:solidFill>
+                <a:round/>
+                <a:headEnd type="triangle" w="med" len="med"/>
+                <a:tailEnd type="triangle" w="med" len="med"/>
+              </a:ln>
+              <a:effectLst/>
+              <a:extLst>
+                <a:ext uri="{909E8E84-426E-40DD-AFC4-6F175D3DCCD1}">
+                  <a14:hiddenFill xmlns:a14="http://schemas.microsoft.com/office/drawing/2010/main">
+                    <a:noFill/>
+                  </a14:hiddenFill>
+                </a:ext>
+                <a:ext uri="{AF507438-7753-43E0-B8FC-AC1667EBCBE1}">
+                  <a14:hiddenEffects xmlns:a14="http://schemas.microsoft.com/office/drawing/2010/main">
+                    <a:effectLst>
+                      <a:outerShdw dist="35921" dir="2700000" algn="ctr" rotWithShape="0">
+                        <a:schemeClr val="bg2"/>
+                      </a:outerShdw>
+                    </a:effectLst>
+                  </a14:hiddenEffects>
+                </a:ext>
+              </a:extLst>
+            </p:spPr>
+            <p:txBody>
+              <a:bodyPr/>
+              <a:lstStyle>
+                <a:defPPr>
+                  <a:defRPr lang="pl-PL"/>
+                </a:defPPr>
+                <a:lvl1pPr algn="l" rtl="0" fontAlgn="base">
+                  <a:spcBef>
+                    <a:spcPct val="0"/>
+                  </a:spcBef>
+                  <a:spcAft>
+                    <a:spcPct val="0"/>
+                  </a:spcAft>
+                  <a:defRPr sz="2400" kern="1200">
+                    <a:solidFill>
+                      <a:schemeClr val="tx1"/>
+                    </a:solidFill>
+                    <a:latin typeface="Times New Roman" pitchFamily="18" charset="0"/>
+                    <a:ea typeface="+mn-ea"/>
+                    <a:cs typeface="+mn-cs"/>
+                  </a:defRPr>
+                </a:lvl1pPr>
+                <a:lvl2pPr marL="457200" algn="l" rtl="0" fontAlgn="base">
+                  <a:spcBef>
+                    <a:spcPct val="0"/>
+                  </a:spcBef>
+                  <a:spcAft>
+                    <a:spcPct val="0"/>
+                  </a:spcAft>
+                  <a:defRPr sz="2400" kern="1200">
+                    <a:solidFill>
+                      <a:schemeClr val="tx1"/>
+                    </a:solidFill>
+                    <a:latin typeface="Times New Roman" pitchFamily="18" charset="0"/>
+                    <a:ea typeface="+mn-ea"/>
+                    <a:cs typeface="+mn-cs"/>
+                  </a:defRPr>
+                </a:lvl2pPr>
+                <a:lvl3pPr marL="914400" algn="l" rtl="0" fontAlgn="base">
+                  <a:spcBef>
+                    <a:spcPct val="0"/>
+                  </a:spcBef>
+                  <a:spcAft>
+                    <a:spcPct val="0"/>
+                  </a:spcAft>
+                  <a:defRPr sz="2400" kern="1200">
+                    <a:solidFill>
+                      <a:schemeClr val="tx1"/>
+                    </a:solidFill>
+                    <a:latin typeface="Times New Roman" pitchFamily="18" charset="0"/>
+                    <a:ea typeface="+mn-ea"/>
+                    <a:cs typeface="+mn-cs"/>
+                  </a:defRPr>
+                </a:lvl3pPr>
+                <a:lvl4pPr marL="1371600" algn="l" rtl="0" fontAlgn="base">
+                  <a:spcBef>
+                    <a:spcPct val="0"/>
+                  </a:spcBef>
+                  <a:spcAft>
+                    <a:spcPct val="0"/>
+                  </a:spcAft>
+                  <a:defRPr sz="2400" kern="1200">
+                    <a:solidFill>
+                      <a:schemeClr val="tx1"/>
+                    </a:solidFill>
+                    <a:latin typeface="Times New Roman" pitchFamily="18" charset="0"/>
+                    <a:ea typeface="+mn-ea"/>
+                    <a:cs typeface="+mn-cs"/>
+                  </a:defRPr>
+                </a:lvl4pPr>
+                <a:lvl5pPr marL="1828800" algn="l" rtl="0" fontAlgn="base">
+                  <a:spcBef>
+                    <a:spcPct val="0"/>
+                  </a:spcBef>
+                  <a:spcAft>
+                    <a:spcPct val="0"/>
+                  </a:spcAft>
+                  <a:defRPr sz="2400" kern="1200">
+                    <a:solidFill>
+                      <a:schemeClr val="tx1"/>
+                    </a:solidFill>
+                    <a:latin typeface="Times New Roman" pitchFamily="18" charset="0"/>
+                    <a:ea typeface="+mn-ea"/>
+                    <a:cs typeface="+mn-cs"/>
+                  </a:defRPr>
+                </a:lvl5pPr>
+                <a:lvl6pPr marL="2286000" algn="l" defTabSz="914400" rtl="0" eaLnBrk="1" latinLnBrk="0" hangingPunct="1">
+                  <a:defRPr sz="2400" kern="1200">
+                    <a:solidFill>
+                      <a:schemeClr val="tx1"/>
+                    </a:solidFill>
+                    <a:latin typeface="Times New Roman" pitchFamily="18" charset="0"/>
+                    <a:ea typeface="+mn-ea"/>
+                    <a:cs typeface="+mn-cs"/>
+                  </a:defRPr>
+                </a:lvl6pPr>
+                <a:lvl7pPr marL="2743200" algn="l" defTabSz="914400" rtl="0" eaLnBrk="1" latinLnBrk="0" hangingPunct="1">
+                  <a:defRPr sz="2400" kern="1200">
+                    <a:solidFill>
+                      <a:schemeClr val="tx1"/>
+                    </a:solidFill>
+                    <a:latin typeface="Times New Roman" pitchFamily="18" charset="0"/>
+                    <a:ea typeface="+mn-ea"/>
+                    <a:cs typeface="+mn-cs"/>
+                  </a:defRPr>
+                </a:lvl7pPr>
+                <a:lvl8pPr marL="3200400" algn="l" defTabSz="914400" rtl="0" eaLnBrk="1" latinLnBrk="0" hangingPunct="1">
+                  <a:defRPr sz="2400" kern="1200">
+                    <a:solidFill>
+                      <a:schemeClr val="tx1"/>
+                    </a:solidFill>
+                    <a:latin typeface="Times New Roman" pitchFamily="18" charset="0"/>
+                    <a:ea typeface="+mn-ea"/>
+                    <a:cs typeface="+mn-cs"/>
+                  </a:defRPr>
+                </a:lvl8pPr>
+                <a:lvl9pPr marL="3657600" algn="l" defTabSz="914400" rtl="0" eaLnBrk="1" latinLnBrk="0" hangingPunct="1">
+                  <a:defRPr sz="2400" kern="1200">
+                    <a:solidFill>
+                      <a:schemeClr val="tx1"/>
+                    </a:solidFill>
+                    <a:latin typeface="Times New Roman" pitchFamily="18" charset="0"/>
+                    <a:ea typeface="+mn-ea"/>
+                    <a:cs typeface="+mn-cs"/>
+                  </a:defRPr>
+                </a:lvl9pPr>
+              </a:lstStyle>
+              <a:p>
+                <a:endParaRPr lang="pl-PL"/>
+              </a:p>
+            </p:txBody>
+          </p:sp>
+        </p:grpSp>
+        <p:sp>
+          <p:nvSpPr>
+            <p:cNvPr id="6" name="mainfrm">
+              <a:extLst>
+                <a:ext uri="{FF2B5EF4-FFF2-40B4-BE49-F238E27FC236}">
+                  <a16:creationId xmlns:a16="http://schemas.microsoft.com/office/drawing/2014/main" id="{9E8BDA0C-F6FD-4BBD-A9DD-871D67BBAA96}"/>
+                </a:ext>
+              </a:extLst>
+            </p:cNvPr>
+            <p:cNvSpPr>
+              <a:spLocks noEditPoints="1" noChangeArrowheads="1"/>
+            </p:cNvSpPr>
+            <p:nvPr/>
+          </p:nvSpPr>
+          <p:spPr bwMode="auto">
+            <a:xfrm>
+              <a:off x="3952135" y="4269038"/>
+              <a:ext cx="990600" cy="1295400"/>
+            </a:xfrm>
+            <a:custGeom>
+              <a:avLst/>
+              <a:gdLst>
+                <a:gd name="T0" fmla="*/ 0 w 21600"/>
+                <a:gd name="T1" fmla="*/ 0 h 21600"/>
+                <a:gd name="T2" fmla="*/ 10800 w 21600"/>
+                <a:gd name="T3" fmla="*/ 0 h 21600"/>
+                <a:gd name="T4" fmla="*/ 21600 w 21600"/>
+                <a:gd name="T5" fmla="*/ 0 h 21600"/>
+                <a:gd name="T6" fmla="*/ 21600 w 21600"/>
+                <a:gd name="T7" fmla="*/ 10800 h 21600"/>
+                <a:gd name="T8" fmla="*/ 20603 w 21600"/>
+                <a:gd name="T9" fmla="*/ 21600 h 21600"/>
+                <a:gd name="T10" fmla="*/ 10800 w 21600"/>
+                <a:gd name="T11" fmla="*/ 21600 h 21600"/>
+                <a:gd name="T12" fmla="*/ 1163 w 21600"/>
+                <a:gd name="T13" fmla="*/ 21600 h 21600"/>
+                <a:gd name="T14" fmla="*/ 0 w 21600"/>
+                <a:gd name="T15" fmla="*/ 10800 h 21600"/>
+                <a:gd name="T16" fmla="*/ 332 w 21600"/>
+                <a:gd name="T17" fmla="*/ 22174 h 21600"/>
+                <a:gd name="T18" fmla="*/ 21579 w 21600"/>
+                <a:gd name="T19" fmla="*/ 27914 h 21600"/>
+              </a:gdLst>
+              <a:ahLst/>
+              <a:cxnLst>
+                <a:cxn ang="0">
+                  <a:pos x="T0" y="T1"/>
+                </a:cxn>
+                <a:cxn ang="0">
+                  <a:pos x="T2" y="T3"/>
+                </a:cxn>
+                <a:cxn ang="0">
+                  <a:pos x="T4" y="T5"/>
+                </a:cxn>
+                <a:cxn ang="0">
+                  <a:pos x="T6" y="T7"/>
+                </a:cxn>
+                <a:cxn ang="0">
+                  <a:pos x="T8" y="T9"/>
+                </a:cxn>
+                <a:cxn ang="0">
+                  <a:pos x="T10" y="T11"/>
+                </a:cxn>
+                <a:cxn ang="0">
+                  <a:pos x="T12" y="T13"/>
+                </a:cxn>
+                <a:cxn ang="0">
+                  <a:pos x="T14" y="T15"/>
+                </a:cxn>
+              </a:cxnLst>
+              <a:rect l="T16" t="T17" r="T18" b="T19"/>
+              <a:pathLst>
+                <a:path w="21600" h="21600" extrusionOk="0">
+                  <a:moveTo>
+                    <a:pt x="21600" y="10885"/>
+                  </a:moveTo>
+                  <a:lnTo>
+                    <a:pt x="21600" y="0"/>
+                  </a:lnTo>
+                  <a:lnTo>
+                    <a:pt x="10634" y="0"/>
+                  </a:lnTo>
+                  <a:lnTo>
+                    <a:pt x="0" y="0"/>
+                  </a:lnTo>
+                  <a:lnTo>
+                    <a:pt x="0" y="10885"/>
+                  </a:lnTo>
+                  <a:lnTo>
+                    <a:pt x="0" y="19729"/>
+                  </a:lnTo>
+                  <a:lnTo>
+                    <a:pt x="1163" y="19729"/>
+                  </a:lnTo>
+                  <a:lnTo>
+                    <a:pt x="1163" y="21600"/>
+                  </a:lnTo>
+                  <a:lnTo>
+                    <a:pt x="10800" y="21600"/>
+                  </a:lnTo>
+                  <a:lnTo>
+                    <a:pt x="20603" y="21600"/>
+                  </a:lnTo>
+                  <a:lnTo>
+                    <a:pt x="20603" y="19729"/>
+                  </a:lnTo>
+                  <a:lnTo>
+                    <a:pt x="21600" y="19729"/>
+                  </a:lnTo>
+                  <a:lnTo>
+                    <a:pt x="21600" y="10885"/>
+                  </a:lnTo>
+                  <a:close/>
+                </a:path>
+                <a:path w="21600" h="21600" extrusionOk="0">
+                  <a:moveTo>
+                    <a:pt x="1163" y="19729"/>
+                  </a:moveTo>
+                  <a:lnTo>
+                    <a:pt x="4320" y="19729"/>
+                  </a:lnTo>
+                  <a:lnTo>
+                    <a:pt x="16449" y="19729"/>
+                  </a:lnTo>
+                  <a:lnTo>
+                    <a:pt x="20603" y="19729"/>
+                  </a:lnTo>
+                  <a:lnTo>
+                    <a:pt x="1163" y="19729"/>
+                  </a:lnTo>
+                  <a:moveTo>
+                    <a:pt x="1495" y="2381"/>
+                  </a:moveTo>
+                  <a:lnTo>
+                    <a:pt x="2160" y="2381"/>
+                  </a:lnTo>
+                  <a:lnTo>
+                    <a:pt x="4985" y="2381"/>
+                  </a:lnTo>
+                  <a:lnTo>
+                    <a:pt x="5982" y="2381"/>
+                  </a:lnTo>
+                  <a:lnTo>
+                    <a:pt x="1495" y="2381"/>
+                  </a:lnTo>
+                  <a:lnTo>
+                    <a:pt x="1495" y="3402"/>
+                  </a:lnTo>
+                  <a:lnTo>
+                    <a:pt x="2160" y="3402"/>
+                  </a:lnTo>
+                  <a:lnTo>
+                    <a:pt x="4985" y="3402"/>
+                  </a:lnTo>
+                  <a:lnTo>
+                    <a:pt x="5982" y="3402"/>
+                  </a:lnTo>
+                  <a:lnTo>
+                    <a:pt x="1495" y="3402"/>
+                  </a:lnTo>
+                  <a:lnTo>
+                    <a:pt x="1495" y="4422"/>
+                  </a:lnTo>
+                  <a:lnTo>
+                    <a:pt x="2160" y="4422"/>
+                  </a:lnTo>
+                  <a:lnTo>
+                    <a:pt x="4985" y="4422"/>
+                  </a:lnTo>
+                  <a:lnTo>
+                    <a:pt x="5982" y="4422"/>
+                  </a:lnTo>
+                  <a:lnTo>
+                    <a:pt x="1495" y="4422"/>
+                  </a:lnTo>
+                  <a:lnTo>
+                    <a:pt x="1495" y="5443"/>
+                  </a:lnTo>
+                  <a:lnTo>
+                    <a:pt x="2160" y="5443"/>
+                  </a:lnTo>
+                  <a:lnTo>
+                    <a:pt x="4985" y="5443"/>
+                  </a:lnTo>
+                  <a:lnTo>
+                    <a:pt x="5982" y="5443"/>
+                  </a:lnTo>
+                  <a:lnTo>
+                    <a:pt x="1495" y="5443"/>
+                  </a:lnTo>
+                  <a:lnTo>
+                    <a:pt x="1495" y="6463"/>
+                  </a:lnTo>
+                  <a:lnTo>
+                    <a:pt x="2160" y="6463"/>
+                  </a:lnTo>
+                  <a:lnTo>
+                    <a:pt x="4985" y="6463"/>
+                  </a:lnTo>
+                  <a:lnTo>
+                    <a:pt x="5982" y="6463"/>
+                  </a:lnTo>
+                  <a:lnTo>
+                    <a:pt x="1495" y="6463"/>
+                  </a:lnTo>
+                  <a:lnTo>
+                    <a:pt x="1495" y="7483"/>
+                  </a:lnTo>
+                  <a:lnTo>
+                    <a:pt x="2160" y="7483"/>
+                  </a:lnTo>
+                  <a:lnTo>
+                    <a:pt x="4985" y="7483"/>
+                  </a:lnTo>
+                  <a:lnTo>
+                    <a:pt x="5982" y="7483"/>
+                  </a:lnTo>
+                  <a:lnTo>
+                    <a:pt x="1495" y="7483"/>
+                  </a:lnTo>
+                  <a:lnTo>
+                    <a:pt x="1495" y="8504"/>
+                  </a:lnTo>
+                  <a:lnTo>
+                    <a:pt x="2160" y="8504"/>
+                  </a:lnTo>
+                  <a:lnTo>
+                    <a:pt x="4985" y="8504"/>
+                  </a:lnTo>
+                  <a:lnTo>
+                    <a:pt x="5982" y="8504"/>
+                  </a:lnTo>
+                  <a:lnTo>
+                    <a:pt x="1495" y="8504"/>
+                  </a:lnTo>
+                  <a:lnTo>
+                    <a:pt x="1495" y="9524"/>
+                  </a:lnTo>
+                  <a:lnTo>
+                    <a:pt x="2160" y="9524"/>
+                  </a:lnTo>
+                  <a:lnTo>
+                    <a:pt x="4985" y="9524"/>
+                  </a:lnTo>
+                  <a:lnTo>
+                    <a:pt x="5982" y="9524"/>
+                  </a:lnTo>
+                  <a:lnTo>
+                    <a:pt x="1495" y="9524"/>
+                  </a:lnTo>
+                  <a:lnTo>
+                    <a:pt x="1495" y="10545"/>
+                  </a:lnTo>
+                  <a:lnTo>
+                    <a:pt x="2160" y="10545"/>
+                  </a:lnTo>
+                  <a:lnTo>
+                    <a:pt x="4985" y="10545"/>
+                  </a:lnTo>
+                  <a:lnTo>
+                    <a:pt x="5982" y="10545"/>
+                  </a:lnTo>
+                  <a:lnTo>
+                    <a:pt x="1495" y="10545"/>
+                  </a:lnTo>
+                  <a:lnTo>
+                    <a:pt x="1495" y="11565"/>
+                  </a:lnTo>
+                  <a:lnTo>
+                    <a:pt x="2160" y="11565"/>
+                  </a:lnTo>
+                  <a:lnTo>
+                    <a:pt x="4985" y="11565"/>
+                  </a:lnTo>
+                  <a:lnTo>
+                    <a:pt x="5982" y="11565"/>
+                  </a:lnTo>
+                  <a:lnTo>
+                    <a:pt x="1495" y="11565"/>
+                  </a:lnTo>
+                  <a:lnTo>
+                    <a:pt x="1495" y="12586"/>
+                  </a:lnTo>
+                  <a:lnTo>
+                    <a:pt x="2160" y="12586"/>
+                  </a:lnTo>
+                  <a:lnTo>
+                    <a:pt x="4985" y="12586"/>
+                  </a:lnTo>
+                  <a:lnTo>
+                    <a:pt x="5982" y="12586"/>
+                  </a:lnTo>
+                  <a:lnTo>
+                    <a:pt x="1495" y="12586"/>
+                  </a:lnTo>
+                  <a:lnTo>
+                    <a:pt x="1495" y="13606"/>
+                  </a:lnTo>
+                  <a:lnTo>
+                    <a:pt x="2160" y="13606"/>
+                  </a:lnTo>
+                  <a:lnTo>
+                    <a:pt x="4985" y="13606"/>
+                  </a:lnTo>
+                  <a:lnTo>
+                    <a:pt x="5982" y="13606"/>
+                  </a:lnTo>
+                  <a:lnTo>
+                    <a:pt x="1495" y="13606"/>
+                  </a:lnTo>
+                  <a:lnTo>
+                    <a:pt x="1495" y="14627"/>
+                  </a:lnTo>
+                  <a:lnTo>
+                    <a:pt x="2160" y="14627"/>
+                  </a:lnTo>
+                  <a:lnTo>
+                    <a:pt x="4985" y="14627"/>
+                  </a:lnTo>
+                  <a:lnTo>
+                    <a:pt x="5982" y="14627"/>
+                  </a:lnTo>
+                  <a:lnTo>
+                    <a:pt x="1495" y="14627"/>
+                  </a:lnTo>
+                  <a:lnTo>
+                    <a:pt x="1495" y="15647"/>
+                  </a:lnTo>
+                  <a:lnTo>
+                    <a:pt x="2160" y="15647"/>
+                  </a:lnTo>
+                  <a:lnTo>
+                    <a:pt x="4985" y="15647"/>
+                  </a:lnTo>
+                  <a:lnTo>
+                    <a:pt x="5982" y="15647"/>
+                  </a:lnTo>
+                  <a:lnTo>
+                    <a:pt x="1495" y="15647"/>
+                  </a:lnTo>
+                  <a:lnTo>
+                    <a:pt x="1495" y="16668"/>
+                  </a:lnTo>
+                  <a:lnTo>
+                    <a:pt x="2160" y="16668"/>
+                  </a:lnTo>
+                  <a:lnTo>
+                    <a:pt x="4985" y="16668"/>
+                  </a:lnTo>
+                  <a:lnTo>
+                    <a:pt x="5982" y="16668"/>
+                  </a:lnTo>
+                  <a:lnTo>
+                    <a:pt x="1495" y="16668"/>
+                  </a:lnTo>
+                  <a:lnTo>
+                    <a:pt x="1495" y="17688"/>
+                  </a:lnTo>
+                  <a:lnTo>
+                    <a:pt x="2160" y="17688"/>
+                  </a:lnTo>
+                  <a:lnTo>
+                    <a:pt x="4985" y="17688"/>
+                  </a:lnTo>
+                  <a:lnTo>
+                    <a:pt x="5982" y="17688"/>
+                  </a:lnTo>
+                  <a:lnTo>
+                    <a:pt x="1495" y="17688"/>
+                  </a:lnTo>
+                  <a:moveTo>
+                    <a:pt x="1994" y="19729"/>
+                  </a:moveTo>
+                  <a:lnTo>
+                    <a:pt x="1994" y="20069"/>
+                  </a:lnTo>
+                  <a:lnTo>
+                    <a:pt x="1994" y="21260"/>
+                  </a:lnTo>
+                  <a:lnTo>
+                    <a:pt x="1994" y="21600"/>
+                  </a:lnTo>
+                  <a:lnTo>
+                    <a:pt x="1994" y="19729"/>
+                  </a:lnTo>
+                  <a:lnTo>
+                    <a:pt x="2658" y="19729"/>
+                  </a:lnTo>
+                  <a:lnTo>
+                    <a:pt x="2658" y="20069"/>
+                  </a:lnTo>
+                  <a:lnTo>
+                    <a:pt x="2658" y="21260"/>
+                  </a:lnTo>
+                  <a:lnTo>
+                    <a:pt x="2658" y="21600"/>
+                  </a:lnTo>
+                  <a:lnTo>
+                    <a:pt x="2658" y="19729"/>
+                  </a:lnTo>
+                  <a:lnTo>
+                    <a:pt x="3489" y="19729"/>
+                  </a:lnTo>
+                  <a:lnTo>
+                    <a:pt x="3489" y="20069"/>
+                  </a:lnTo>
+                  <a:lnTo>
+                    <a:pt x="3489" y="21260"/>
+                  </a:lnTo>
+                  <a:lnTo>
+                    <a:pt x="3489" y="21600"/>
+                  </a:lnTo>
+                  <a:lnTo>
+                    <a:pt x="3489" y="19729"/>
+                  </a:lnTo>
+                  <a:lnTo>
+                    <a:pt x="4320" y="19729"/>
+                  </a:lnTo>
+                  <a:lnTo>
+                    <a:pt x="4320" y="20069"/>
+                  </a:lnTo>
+                  <a:lnTo>
+                    <a:pt x="4320" y="21260"/>
+                  </a:lnTo>
+                  <a:lnTo>
+                    <a:pt x="4320" y="21600"/>
+                  </a:lnTo>
+                  <a:lnTo>
+                    <a:pt x="4320" y="19729"/>
+                  </a:lnTo>
+                  <a:lnTo>
+                    <a:pt x="5151" y="19729"/>
+                  </a:lnTo>
+                  <a:lnTo>
+                    <a:pt x="5151" y="20069"/>
+                  </a:lnTo>
+                  <a:lnTo>
+                    <a:pt x="5151" y="21260"/>
+                  </a:lnTo>
+                  <a:lnTo>
+                    <a:pt x="5151" y="21600"/>
+                  </a:lnTo>
+                  <a:lnTo>
+                    <a:pt x="5151" y="19729"/>
+                  </a:lnTo>
+                  <a:lnTo>
+                    <a:pt x="5982" y="19729"/>
+                  </a:lnTo>
+                  <a:lnTo>
+                    <a:pt x="5982" y="20069"/>
+                  </a:lnTo>
+                  <a:lnTo>
+                    <a:pt x="5982" y="21260"/>
+                  </a:lnTo>
+                  <a:lnTo>
+                    <a:pt x="5982" y="21600"/>
+                  </a:lnTo>
+                  <a:lnTo>
+                    <a:pt x="5982" y="19729"/>
+                  </a:lnTo>
+                  <a:lnTo>
+                    <a:pt x="6812" y="19729"/>
+                  </a:lnTo>
+                  <a:lnTo>
+                    <a:pt x="6812" y="20069"/>
+                  </a:lnTo>
+                  <a:lnTo>
+                    <a:pt x="6812" y="21260"/>
+                  </a:lnTo>
+                  <a:lnTo>
+                    <a:pt x="6812" y="21600"/>
+                  </a:lnTo>
+                  <a:lnTo>
+                    <a:pt x="6812" y="19729"/>
+                  </a:lnTo>
+                  <a:lnTo>
+                    <a:pt x="7643" y="19729"/>
+                  </a:lnTo>
+                  <a:lnTo>
+                    <a:pt x="7643" y="20069"/>
+                  </a:lnTo>
+                  <a:lnTo>
+                    <a:pt x="7643" y="21260"/>
+                  </a:lnTo>
+                  <a:lnTo>
+                    <a:pt x="7643" y="21600"/>
+                  </a:lnTo>
+                  <a:lnTo>
+                    <a:pt x="7643" y="19729"/>
+                  </a:lnTo>
+                  <a:lnTo>
+                    <a:pt x="8474" y="19729"/>
+                  </a:lnTo>
+                  <a:lnTo>
+                    <a:pt x="8474" y="20069"/>
+                  </a:lnTo>
+                  <a:lnTo>
+                    <a:pt x="8474" y="21260"/>
+                  </a:lnTo>
+                  <a:lnTo>
+                    <a:pt x="8474" y="21600"/>
+                  </a:lnTo>
+                  <a:lnTo>
+                    <a:pt x="8474" y="19729"/>
+                  </a:lnTo>
+                  <a:lnTo>
+                    <a:pt x="9305" y="19729"/>
+                  </a:lnTo>
+                  <a:lnTo>
+                    <a:pt x="9305" y="20069"/>
+                  </a:lnTo>
+                  <a:lnTo>
+                    <a:pt x="9305" y="21260"/>
+                  </a:lnTo>
+                  <a:lnTo>
+                    <a:pt x="9305" y="21600"/>
+                  </a:lnTo>
+                  <a:lnTo>
+                    <a:pt x="9305" y="19729"/>
+                  </a:lnTo>
+                  <a:lnTo>
+                    <a:pt x="10135" y="19729"/>
+                  </a:lnTo>
+                  <a:lnTo>
+                    <a:pt x="10135" y="20069"/>
+                  </a:lnTo>
+                  <a:lnTo>
+                    <a:pt x="10135" y="21260"/>
+                  </a:lnTo>
+                  <a:lnTo>
+                    <a:pt x="10135" y="21600"/>
+                  </a:lnTo>
+                  <a:lnTo>
+                    <a:pt x="10135" y="19729"/>
+                  </a:lnTo>
+                  <a:lnTo>
+                    <a:pt x="10966" y="19729"/>
+                  </a:lnTo>
+                  <a:lnTo>
+                    <a:pt x="10966" y="20069"/>
+                  </a:lnTo>
+                  <a:lnTo>
+                    <a:pt x="10966" y="21260"/>
+                  </a:lnTo>
+                  <a:lnTo>
+                    <a:pt x="10966" y="21600"/>
+                  </a:lnTo>
+                  <a:lnTo>
+                    <a:pt x="10966" y="19729"/>
+                  </a:lnTo>
+                  <a:lnTo>
+                    <a:pt x="11797" y="19729"/>
+                  </a:lnTo>
+                  <a:lnTo>
+                    <a:pt x="11797" y="20069"/>
+                  </a:lnTo>
+                  <a:lnTo>
+                    <a:pt x="11797" y="21260"/>
+                  </a:lnTo>
+                  <a:lnTo>
+                    <a:pt x="11797" y="21600"/>
+                  </a:lnTo>
+                  <a:lnTo>
+                    <a:pt x="11797" y="19729"/>
+                  </a:lnTo>
+                  <a:lnTo>
+                    <a:pt x="12462" y="19729"/>
+                  </a:lnTo>
+                  <a:lnTo>
+                    <a:pt x="12462" y="20069"/>
+                  </a:lnTo>
+                  <a:lnTo>
+                    <a:pt x="12462" y="21260"/>
+                  </a:lnTo>
+                  <a:lnTo>
+                    <a:pt x="12462" y="21600"/>
+                  </a:lnTo>
+                  <a:lnTo>
+                    <a:pt x="12462" y="19729"/>
+                  </a:lnTo>
+                  <a:lnTo>
+                    <a:pt x="13292" y="19729"/>
+                  </a:lnTo>
+                  <a:lnTo>
+                    <a:pt x="13292" y="20069"/>
+                  </a:lnTo>
+                  <a:lnTo>
+                    <a:pt x="13292" y="21260"/>
+                  </a:lnTo>
+                  <a:lnTo>
+                    <a:pt x="13292" y="21600"/>
+                  </a:lnTo>
+                  <a:lnTo>
+                    <a:pt x="13292" y="19729"/>
+                  </a:lnTo>
+                  <a:lnTo>
+                    <a:pt x="14123" y="19729"/>
+                  </a:lnTo>
+                  <a:lnTo>
+                    <a:pt x="14123" y="20069"/>
+                  </a:lnTo>
+                  <a:lnTo>
+                    <a:pt x="14123" y="21260"/>
+                  </a:lnTo>
+                  <a:lnTo>
+                    <a:pt x="14123" y="21600"/>
+                  </a:lnTo>
+                  <a:lnTo>
+                    <a:pt x="14123" y="19729"/>
+                  </a:lnTo>
+                  <a:lnTo>
+                    <a:pt x="14954" y="19729"/>
+                  </a:lnTo>
+                  <a:lnTo>
+                    <a:pt x="14954" y="20069"/>
+                  </a:lnTo>
+                  <a:lnTo>
+                    <a:pt x="14954" y="21260"/>
+                  </a:lnTo>
+                  <a:lnTo>
+                    <a:pt x="14954" y="21600"/>
+                  </a:lnTo>
+                  <a:lnTo>
+                    <a:pt x="14954" y="19729"/>
+                  </a:lnTo>
+                  <a:lnTo>
+                    <a:pt x="15785" y="19729"/>
+                  </a:lnTo>
+                  <a:lnTo>
+                    <a:pt x="15785" y="20069"/>
+                  </a:lnTo>
+                  <a:lnTo>
+                    <a:pt x="15785" y="21260"/>
+                  </a:lnTo>
+                  <a:lnTo>
+                    <a:pt x="15785" y="21600"/>
+                  </a:lnTo>
+                  <a:lnTo>
+                    <a:pt x="15785" y="19729"/>
+                  </a:lnTo>
+                  <a:lnTo>
+                    <a:pt x="16615" y="19729"/>
+                  </a:lnTo>
+                  <a:lnTo>
+                    <a:pt x="16615" y="20069"/>
+                  </a:lnTo>
+                  <a:lnTo>
+                    <a:pt x="16615" y="21260"/>
+                  </a:lnTo>
+                  <a:lnTo>
+                    <a:pt x="16615" y="21600"/>
+                  </a:lnTo>
+                  <a:lnTo>
+                    <a:pt x="16615" y="19729"/>
+                  </a:lnTo>
+                  <a:lnTo>
+                    <a:pt x="17446" y="19729"/>
+                  </a:lnTo>
+                  <a:lnTo>
+                    <a:pt x="17446" y="20069"/>
+                  </a:lnTo>
+                  <a:lnTo>
+                    <a:pt x="17446" y="21260"/>
+                  </a:lnTo>
+                  <a:lnTo>
+                    <a:pt x="17446" y="21600"/>
+                  </a:lnTo>
+                  <a:lnTo>
+                    <a:pt x="17446" y="19729"/>
+                  </a:lnTo>
+                  <a:lnTo>
+                    <a:pt x="18277" y="19729"/>
+                  </a:lnTo>
+                  <a:lnTo>
+                    <a:pt x="18277" y="20069"/>
+                  </a:lnTo>
+                  <a:lnTo>
+                    <a:pt x="18277" y="21260"/>
+                  </a:lnTo>
+                  <a:lnTo>
+                    <a:pt x="18277" y="21600"/>
+                  </a:lnTo>
+                  <a:lnTo>
+                    <a:pt x="18277" y="19729"/>
+                  </a:lnTo>
+                  <a:lnTo>
+                    <a:pt x="19108" y="19729"/>
+                  </a:lnTo>
+                  <a:lnTo>
+                    <a:pt x="19108" y="20069"/>
+                  </a:lnTo>
+                  <a:lnTo>
+                    <a:pt x="19108" y="21260"/>
+                  </a:lnTo>
+                  <a:lnTo>
+                    <a:pt x="19108" y="21600"/>
+                  </a:lnTo>
+                  <a:lnTo>
+                    <a:pt x="19108" y="19729"/>
+                  </a:lnTo>
+                  <a:lnTo>
+                    <a:pt x="19938" y="19729"/>
+                  </a:lnTo>
+                  <a:lnTo>
+                    <a:pt x="19938" y="20069"/>
+                  </a:lnTo>
+                  <a:lnTo>
+                    <a:pt x="19938" y="21260"/>
+                  </a:lnTo>
+                  <a:lnTo>
+                    <a:pt x="19938" y="21600"/>
+                  </a:lnTo>
+                  <a:lnTo>
+                    <a:pt x="19938" y="19729"/>
+                  </a:lnTo>
+                  <a:moveTo>
+                    <a:pt x="1495" y="1531"/>
+                  </a:moveTo>
+                  <a:lnTo>
+                    <a:pt x="5982" y="1531"/>
+                  </a:lnTo>
+                  <a:lnTo>
+                    <a:pt x="5982" y="18539"/>
+                  </a:lnTo>
+                  <a:lnTo>
+                    <a:pt x="1495" y="18539"/>
+                  </a:lnTo>
+                  <a:lnTo>
+                    <a:pt x="1495" y="1531"/>
+                  </a:lnTo>
+                  <a:moveTo>
+                    <a:pt x="7311" y="1531"/>
+                  </a:moveTo>
+                  <a:lnTo>
+                    <a:pt x="7975" y="1531"/>
+                  </a:lnTo>
+                  <a:lnTo>
+                    <a:pt x="7975" y="8334"/>
+                  </a:lnTo>
+                  <a:lnTo>
+                    <a:pt x="7311" y="8334"/>
+                  </a:lnTo>
+                  <a:lnTo>
+                    <a:pt x="7311" y="1531"/>
+                  </a:lnTo>
+                  <a:moveTo>
+                    <a:pt x="7145" y="9865"/>
+                  </a:moveTo>
+                  <a:lnTo>
+                    <a:pt x="8142" y="9865"/>
+                  </a:lnTo>
+                  <a:lnTo>
+                    <a:pt x="8142" y="10715"/>
+                  </a:lnTo>
+                  <a:lnTo>
+                    <a:pt x="7145" y="10715"/>
+                  </a:lnTo>
+                  <a:lnTo>
+                    <a:pt x="7145" y="9865"/>
+                  </a:lnTo>
+                  <a:moveTo>
+                    <a:pt x="8972" y="1531"/>
+                  </a:moveTo>
+                  <a:lnTo>
+                    <a:pt x="12462" y="1531"/>
+                  </a:lnTo>
+                  <a:lnTo>
+                    <a:pt x="12462" y="5443"/>
+                  </a:lnTo>
+                  <a:lnTo>
+                    <a:pt x="8972" y="5443"/>
+                  </a:lnTo>
+                  <a:lnTo>
+                    <a:pt x="8972" y="1531"/>
+                  </a:lnTo>
+                  <a:moveTo>
+                    <a:pt x="13625" y="1531"/>
+                  </a:moveTo>
+                  <a:lnTo>
+                    <a:pt x="20271" y="1531"/>
+                  </a:lnTo>
+                  <a:lnTo>
+                    <a:pt x="20271" y="5443"/>
+                  </a:lnTo>
+                  <a:lnTo>
+                    <a:pt x="13625" y="5443"/>
+                  </a:lnTo>
+                  <a:lnTo>
+                    <a:pt x="13625" y="1531"/>
+                  </a:lnTo>
+                  <a:moveTo>
+                    <a:pt x="18609" y="6463"/>
+                  </a:moveTo>
+                  <a:lnTo>
+                    <a:pt x="20437" y="6463"/>
+                  </a:lnTo>
+                  <a:lnTo>
+                    <a:pt x="20437" y="10885"/>
+                  </a:lnTo>
+                  <a:lnTo>
+                    <a:pt x="18609" y="10885"/>
+                  </a:lnTo>
+                  <a:lnTo>
+                    <a:pt x="18609" y="6463"/>
+                  </a:lnTo>
+                </a:path>
+              </a:pathLst>
+            </a:custGeom>
+            <a:solidFill>
+              <a:srgbClr val="C0C0C0"/>
+            </a:solidFill>
+            <a:ln w="9525">
+              <a:solidFill>
+                <a:srgbClr val="000000"/>
+              </a:solidFill>
+              <a:miter lim="800000"/>
+              <a:headEnd/>
+              <a:tailEnd/>
+            </a:ln>
+          </p:spPr>
+          <p:txBody>
+            <a:bodyPr/>
+            <a:lstStyle>
+              <a:defPPr>
+                <a:defRPr lang="pl-PL"/>
+              </a:defPPr>
+              <a:lvl1pPr algn="l" rtl="0" fontAlgn="base">
+                <a:spcBef>
+                  <a:spcPct val="0"/>
+                </a:spcBef>
+                <a:spcAft>
+                  <a:spcPct val="0"/>
+                </a:spcAft>
+                <a:defRPr sz="2400" kern="1200">
+                  <a:solidFill>
+                    <a:schemeClr val="tx1"/>
+                  </a:solidFill>
+                  <a:latin typeface="Times New Roman" pitchFamily="18" charset="0"/>
+                  <a:ea typeface="+mn-ea"/>
+                  <a:cs typeface="+mn-cs"/>
+                </a:defRPr>
+              </a:lvl1pPr>
+              <a:lvl2pPr marL="457200" algn="l" rtl="0" fontAlgn="base">
+                <a:spcBef>
+                  <a:spcPct val="0"/>
+                </a:spcBef>
+                <a:spcAft>
+                  <a:spcPct val="0"/>
+                </a:spcAft>
+                <a:defRPr sz="2400" kern="1200">
+                  <a:solidFill>
+                    <a:schemeClr val="tx1"/>
+                  </a:solidFill>
+                  <a:latin typeface="Times New Roman" pitchFamily="18" charset="0"/>
+                  <a:ea typeface="+mn-ea"/>
+                  <a:cs typeface="+mn-cs"/>
+                </a:defRPr>
+              </a:lvl2pPr>
+              <a:lvl3pPr marL="914400" algn="l" rtl="0" fontAlgn="base">
+                <a:spcBef>
+                  <a:spcPct val="0"/>
+                </a:spcBef>
+                <a:spcAft>
+                  <a:spcPct val="0"/>
+                </a:spcAft>
+                <a:defRPr sz="2400" kern="1200">
+                  <a:solidFill>
+                    <a:schemeClr val="tx1"/>
+                  </a:solidFill>
+                  <a:latin typeface="Times New Roman" pitchFamily="18" charset="0"/>
+                  <a:ea typeface="+mn-ea"/>
+                  <a:cs typeface="+mn-cs"/>
+                </a:defRPr>
+              </a:lvl3pPr>
+              <a:lvl4pPr marL="1371600" algn="l" rtl="0" fontAlgn="base">
+                <a:spcBef>
+                  <a:spcPct val="0"/>
+                </a:spcBef>
+                <a:spcAft>
+                  <a:spcPct val="0"/>
+                </a:spcAft>
+                <a:defRPr sz="2400" kern="1200">
+                  <a:solidFill>
+                    <a:schemeClr val="tx1"/>
+                  </a:solidFill>
+                  <a:latin typeface="Times New Roman" pitchFamily="18" charset="0"/>
+                  <a:ea typeface="+mn-ea"/>
+                  <a:cs typeface="+mn-cs"/>
+                </a:defRPr>
+              </a:lvl4pPr>
+              <a:lvl5pPr marL="1828800" algn="l" rtl="0" fontAlgn="base">
+                <a:spcBef>
+                  <a:spcPct val="0"/>
+                </a:spcBef>
+                <a:spcAft>
+                  <a:spcPct val="0"/>
+                </a:spcAft>
+                <a:defRPr sz="2400" kern="1200">
+                  <a:solidFill>
+                    <a:schemeClr val="tx1"/>
+                  </a:solidFill>
+                  <a:latin typeface="Times New Roman" pitchFamily="18" charset="0"/>
+                  <a:ea typeface="+mn-ea"/>
+                  <a:cs typeface="+mn-cs"/>
+                </a:defRPr>
+              </a:lvl5pPr>
+              <a:lvl6pPr marL="2286000" algn="l" defTabSz="914400" rtl="0" eaLnBrk="1" latinLnBrk="0" hangingPunct="1">
+                <a:defRPr sz="2400" kern="1200">
+                  <a:solidFill>
+                    <a:schemeClr val="tx1"/>
+                  </a:solidFill>
+                  <a:latin typeface="Times New Roman" pitchFamily="18" charset="0"/>
+                  <a:ea typeface="+mn-ea"/>
+                  <a:cs typeface="+mn-cs"/>
+                </a:defRPr>
+              </a:lvl6pPr>
+              <a:lvl7pPr marL="2743200" algn="l" defTabSz="914400" rtl="0" eaLnBrk="1" latinLnBrk="0" hangingPunct="1">
+                <a:defRPr sz="2400" kern="1200">
+                  <a:solidFill>
+                    <a:schemeClr val="tx1"/>
+                  </a:solidFill>
+                  <a:latin typeface="Times New Roman" pitchFamily="18" charset="0"/>
+                  <a:ea typeface="+mn-ea"/>
+                  <a:cs typeface="+mn-cs"/>
+                </a:defRPr>
+              </a:lvl7pPr>
+              <a:lvl8pPr marL="3200400" algn="l" defTabSz="914400" rtl="0" eaLnBrk="1" latinLnBrk="0" hangingPunct="1">
+                <a:defRPr sz="2400" kern="1200">
+                  <a:solidFill>
+                    <a:schemeClr val="tx1"/>
+                  </a:solidFill>
+                  <a:latin typeface="Times New Roman" pitchFamily="18" charset="0"/>
+                  <a:ea typeface="+mn-ea"/>
+                  <a:cs typeface="+mn-cs"/>
+                </a:defRPr>
+              </a:lvl8pPr>
+              <a:lvl9pPr marL="3657600" algn="l" defTabSz="914400" rtl="0" eaLnBrk="1" latinLnBrk="0" hangingPunct="1">
+                <a:defRPr sz="2400" kern="1200">
+                  <a:solidFill>
+                    <a:schemeClr val="tx1"/>
+                  </a:solidFill>
+                  <a:latin typeface="Times New Roman" pitchFamily="18" charset="0"/>
+                  <a:ea typeface="+mn-ea"/>
+                  <a:cs typeface="+mn-cs"/>
+                </a:defRPr>
+              </a:lvl9pPr>
+            </a:lstStyle>
+            <a:p>
+              <a:endParaRPr lang="pl-PL"/>
+            </a:p>
+          </p:txBody>
+        </p:sp>
+      </p:grpSp>
     </p:spTree>
     <p:extLst>
       <p:ext uri="{BB962C8B-B14F-4D97-AF65-F5344CB8AC3E}">
@@ -16632,10 +19994,79 @@
   <p:clrMapOvr>
     <a:masterClrMapping/>
   </p:clrMapOvr>
+  <p:timing>
+    <p:tnLst>
+      <p:par>
+        <p:cTn id="1" dur="indefinite" restart="never" nodeType="tmRoot">
+          <p:childTnLst>
+            <p:seq concurrent="1" nextAc="seek">
+              <p:cTn id="2" dur="indefinite" nodeType="mainSeq">
+                <p:childTnLst>
+                  <p:par>
+                    <p:cTn id="3" fill="hold">
+                      <p:stCondLst>
+                        <p:cond delay="indefinite"/>
+                      </p:stCondLst>
+                      <p:childTnLst>
+                        <p:par>
+                          <p:cTn id="4" fill="hold">
+                            <p:stCondLst>
+                              <p:cond delay="0"/>
+                            </p:stCondLst>
+                            <p:childTnLst>
+                              <p:par>
+                                <p:cTn id="5" presetID="42" presetClass="path" presetSubtype="0" accel="50000" decel="50000" fill="hold" nodeType="clickEffect">
+                                  <p:stCondLst>
+                                    <p:cond delay="0"/>
+                                  </p:stCondLst>
+                                  <p:childTnLst>
+                                    <p:animMotion origin="layout" path="M 0 0 L 0 0.25 E" pathEditMode="relative" ptsTypes="">
+                                      <p:cBhvr>
+                                        <p:cTn id="6" dur="2000" fill="hold"/>
+                                        <p:tgtEl>
+                                          <p:spTgt spid="4"/>
+                                        </p:tgtEl>
+                                        <p:attrNameLst>
+                                          <p:attrName>ppt_x</p:attrName>
+                                          <p:attrName>ppt_y</p:attrName>
+                                        </p:attrNameLst>
+                                      </p:cBhvr>
+                                    </p:animMotion>
+                                  </p:childTnLst>
+                                </p:cTn>
+                              </p:par>
+                            </p:childTnLst>
+                          </p:cTn>
+                        </p:par>
+                      </p:childTnLst>
+                    </p:cTn>
+                  </p:par>
+                </p:childTnLst>
+              </p:cTn>
+              <p:prevCondLst>
+                <p:cond evt="onPrev" delay="0">
+                  <p:tgtEl>
+                    <p:sldTgt/>
+                  </p:tgtEl>
+                </p:cond>
+              </p:prevCondLst>
+              <p:nextCondLst>
+                <p:cond evt="onNext" delay="0">
+                  <p:tgtEl>
+                    <p:sldTgt/>
+                  </p:tgtEl>
+                </p:cond>
+              </p:nextCondLst>
+            </p:seq>
+          </p:childTnLst>
+        </p:cTn>
+      </p:par>
+    </p:tnLst>
+  </p:timing>
 </p:sld>
 </file>
 
-<file path=ppt/slides/slide16.xml><?xml version="1.0" encoding="utf-8"?>
+<file path=ppt/slides/slide18.xml><?xml version="1.0" encoding="utf-8"?>
 <p:sld xmlns:a="http://schemas.openxmlformats.org/drawingml/2006/main" xmlns:r="http://schemas.openxmlformats.org/officeDocument/2006/relationships" xmlns:p="http://schemas.openxmlformats.org/presentationml/2006/main" show="0">
   <p:cSld>
     <p:spTree>
@@ -16736,7 +20167,7 @@
 </p:sld>
 </file>
 
-<file path=ppt/slides/slide17.xml><?xml version="1.0" encoding="utf-8"?>
+<file path=ppt/slides/slide19.xml><?xml version="1.0" encoding="utf-8"?>
 <p:sld xmlns:a="http://schemas.openxmlformats.org/drawingml/2006/main" xmlns:r="http://schemas.openxmlformats.org/officeDocument/2006/relationships" xmlns:p="http://schemas.openxmlformats.org/presentationml/2006/main" show="0">
   <p:cSld>
     <p:spTree>
@@ -16843,7 +20274,119 @@
 </p:sld>
 </file>
 
-<file path=ppt/slides/slide18.xml><?xml version="1.0" encoding="utf-8"?>
+<file path=ppt/slides/slide2.xml><?xml version="1.0" encoding="utf-8"?>
+<p:sld xmlns:a="http://schemas.openxmlformats.org/drawingml/2006/main" xmlns:r="http://schemas.openxmlformats.org/officeDocument/2006/relationships" xmlns:p="http://schemas.openxmlformats.org/presentationml/2006/main">
+  <p:cSld>
+    <p:spTree>
+      <p:nvGrpSpPr>
+        <p:cNvPr id="1" name=""/>
+        <p:cNvGrpSpPr/>
+        <p:nvPr/>
+      </p:nvGrpSpPr>
+      <p:grpSpPr>
+        <a:xfrm>
+          <a:off x="0" y="0"/>
+          <a:ext cx="0" cy="0"/>
+          <a:chOff x="0" y="0"/>
+          <a:chExt cx="0" cy="0"/>
+        </a:xfrm>
+      </p:grpSpPr>
+      <p:sp>
+        <p:nvSpPr>
+          <p:cNvPr id="2" name="Tytuł 1">
+            <a:extLst>
+              <a:ext uri="{FF2B5EF4-FFF2-40B4-BE49-F238E27FC236}">
+                <a16:creationId xmlns:a16="http://schemas.microsoft.com/office/drawing/2014/main" id="{38FE2930-C9F9-42F1-BC5A-B5D8CC8FE5FB}"/>
+              </a:ext>
+            </a:extLst>
+          </p:cNvPr>
+          <p:cNvSpPr>
+            <a:spLocks noGrp="1"/>
+          </p:cNvSpPr>
+          <p:nvPr>
+            <p:ph type="title"/>
+          </p:nvPr>
+        </p:nvSpPr>
+        <p:spPr/>
+        <p:txBody>
+          <a:bodyPr/>
+          <a:lstStyle/>
+          <a:p>
+            <a:pPr algn="ctr"/>
+            <a:r>
+              <a:rPr lang="pl-PL"/>
+              <a:t>Firma</a:t>
+            </a:r>
+          </a:p>
+        </p:txBody>
+      </p:sp>
+      <p:sp>
+        <p:nvSpPr>
+          <p:cNvPr id="3" name="Symbol zastępczy zawartości 2">
+            <a:extLst>
+              <a:ext uri="{FF2B5EF4-FFF2-40B4-BE49-F238E27FC236}">
+                <a16:creationId xmlns:a16="http://schemas.microsoft.com/office/drawing/2014/main" id="{8426D2BE-ED27-420C-AF5A-CBE400D5329A}"/>
+              </a:ext>
+            </a:extLst>
+          </p:cNvPr>
+          <p:cNvSpPr>
+            <a:spLocks noGrp="1"/>
+          </p:cNvSpPr>
+          <p:nvPr>
+            <p:ph idx="1"/>
+          </p:nvPr>
+        </p:nvSpPr>
+        <p:spPr>
+          <a:xfrm>
+            <a:off x="680321" y="2635847"/>
+            <a:ext cx="10131425" cy="2387988"/>
+          </a:xfrm>
+        </p:spPr>
+        <p:txBody>
+          <a:bodyPr>
+            <a:normAutofit lnSpcReduction="10000"/>
+          </a:bodyPr>
+          <a:lstStyle/>
+          <a:p>
+            <a:pPr marL="0" indent="0">
+              <a:buNone/>
+            </a:pPr>
+            <a:r>
+              <a:rPr lang="pl-PL" dirty="0"/>
+              <a:t>System wspomagający zarządzanie zaprojektowano dla firmy, której działalnością jest produkcja elementów przy wykorzystaniu technologii addytywnych. Firma pracuje od poniedziałku do piątku w trybie jednozmianowym od 8:00 do 16:00.</a:t>
+            </a:r>
+          </a:p>
+          <a:p>
+            <a:pPr marL="0" indent="0">
+              <a:buNone/>
+            </a:pPr>
+            <a:endParaRPr lang="pl-PL" sz="2800" dirty="0"/>
+          </a:p>
+          <a:p>
+            <a:pPr marL="0" indent="0">
+              <a:buNone/>
+            </a:pPr>
+            <a:r>
+              <a:rPr lang="pl-PL" sz="2800" dirty="0"/>
+              <a:t>Rodzaj przedsiębiorstwa, model biznesowy</a:t>
+            </a:r>
+          </a:p>
+        </p:txBody>
+      </p:sp>
+    </p:spTree>
+    <p:extLst>
+      <p:ext uri="{BB962C8B-B14F-4D97-AF65-F5344CB8AC3E}">
+        <p14:creationId xmlns:p14="http://schemas.microsoft.com/office/powerpoint/2010/main" val="3558708667"/>
+      </p:ext>
+    </p:extLst>
+  </p:cSld>
+  <p:clrMapOvr>
+    <a:masterClrMapping/>
+  </p:clrMapOvr>
+</p:sld>
+</file>
+
+<file path=ppt/slides/slide20.xml><?xml version="1.0" encoding="utf-8"?>
 <p:sld xmlns:a="http://schemas.openxmlformats.org/drawingml/2006/main" xmlns:r="http://schemas.openxmlformats.org/officeDocument/2006/relationships" xmlns:p="http://schemas.openxmlformats.org/presentationml/2006/main">
   <p:cSld>
     <p:spTree>
@@ -16904,7 +20447,12 @@
             <p:ph idx="1"/>
           </p:nvPr>
         </p:nvSpPr>
-        <p:spPr/>
+        <p:spPr>
+          <a:xfrm>
+            <a:off x="680321" y="2336873"/>
+            <a:ext cx="10675937" cy="3599316"/>
+          </a:xfrm>
+        </p:spPr>
         <p:txBody>
           <a:bodyPr/>
           <a:lstStyle/>
@@ -16913,8 +20461,31 @@
               <a:buNone/>
             </a:pPr>
             <a:r>
-              <a:rPr lang="pl-PL" dirty="0"/>
-              <a:t>SQL : Microsoft SQL Server 2019</a:t>
+              <a:rPr lang="pl-PL" b="0" i="1" dirty="0" err="1">
+                <a:effectLst/>
+                <a:latin typeface="+mj-lt"/>
+              </a:rPr>
+              <a:t>Structured</a:t>
+            </a:r>
+            <a:r>
+              <a:rPr lang="pl-PL" b="0" i="1" dirty="0">
+                <a:effectLst/>
+                <a:latin typeface="+mj-lt"/>
+              </a:rPr>
+              <a:t> Query Language</a:t>
+            </a:r>
+            <a:r>
+              <a:rPr lang="pl-PL" b="0" i="0" dirty="0">
+                <a:effectLst/>
+                <a:latin typeface="+mj-lt"/>
+              </a:rPr>
+              <a:t> (SQL)</a:t>
+            </a:r>
+            <a:r>
+              <a:rPr lang="pl-PL" dirty="0">
+                <a:latin typeface="+mj-lt"/>
+              </a:rPr>
+              <a:t> : Microsoft SQL Server 2018</a:t>
             </a:r>
           </a:p>
           <a:p>
@@ -16922,13 +20493,45 @@
               <a:buNone/>
             </a:pPr>
             <a:r>
-              <a:rPr lang="pl-PL" dirty="0"/>
-              <a:t>IDE : Visual Studio 2019 </a:t>
-            </a:r>
-            <a:r>
-              <a:rPr lang="pl-PL" dirty="0" err="1"/>
+              <a:rPr lang="pl-PL" b="0" i="0" dirty="0" err="1">
+                <a:effectLst/>
+                <a:latin typeface="+mj-lt"/>
+              </a:rPr>
+              <a:t>Integrated</a:t>
+            </a:r>
+            <a:r>
+              <a:rPr lang="pl-PL" b="0" i="0" dirty="0">
+                <a:effectLst/>
+                <a:latin typeface="+mj-lt"/>
+              </a:rPr>
+              <a:t> Development Environment(</a:t>
+            </a:r>
+            <a:r>
+              <a:rPr lang="pl-PL" dirty="0">
+                <a:latin typeface="+mj-lt"/>
+              </a:rPr>
+              <a:t>IDE) : Visual Studio 2019 </a:t>
+            </a:r>
+            <a:r>
+              <a:rPr lang="pl-PL" dirty="0" err="1">
+                <a:latin typeface="+mj-lt"/>
+              </a:rPr>
               <a:t>Community</a:t>
             </a:r>
+            <a:endParaRPr lang="pl-PL" dirty="0">
+              <a:latin typeface="+mj-lt"/>
+            </a:endParaRPr>
+          </a:p>
+          <a:p>
+            <a:pPr marL="0" indent="0">
+              <a:buNone/>
+            </a:pPr>
+            <a:endParaRPr lang="pl-PL" dirty="0"/>
+          </a:p>
+          <a:p>
+            <a:pPr marL="0" indent="0">
+              <a:buNone/>
+            </a:pPr>
             <a:endParaRPr lang="pl-PL" dirty="0"/>
           </a:p>
           <a:p>
@@ -16936,6 +20539,78 @@
           </a:p>
         </p:txBody>
       </p:sp>
+      <p:pic>
+        <p:nvPicPr>
+          <p:cNvPr id="5" name="Obraz 4">
+            <a:extLst>
+              <a:ext uri="{FF2B5EF4-FFF2-40B4-BE49-F238E27FC236}">
+                <a16:creationId xmlns:a16="http://schemas.microsoft.com/office/drawing/2014/main" id="{09AAA038-A8AA-49C4-99FF-FE068BCC18B0}"/>
+              </a:ext>
+            </a:extLst>
+          </p:cNvPr>
+          <p:cNvPicPr>
+            <a:picLocks noChangeAspect="1"/>
+          </p:cNvPicPr>
+          <p:nvPr/>
+        </p:nvPicPr>
+        <p:blipFill>
+          <a:blip r:embed="rId2">
+            <a:extLst>
+              <a:ext uri="{28A0092B-C50C-407E-A947-70E740481C1C}">
+                <a14:useLocalDpi xmlns:a14="http://schemas.microsoft.com/office/drawing/2010/main" val="0"/>
+              </a:ext>
+            </a:extLst>
+          </a:blip>
+          <a:stretch>
+            <a:fillRect/>
+          </a:stretch>
+        </p:blipFill>
+        <p:spPr>
+          <a:xfrm>
+            <a:off x="1897818" y="3353643"/>
+            <a:ext cx="3291455" cy="3291455"/>
+          </a:xfrm>
+          <a:prstGeom prst="rect">
+            <a:avLst/>
+          </a:prstGeom>
+        </p:spPr>
+      </p:pic>
+      <p:pic>
+        <p:nvPicPr>
+          <p:cNvPr id="7" name="Obraz 6">
+            <a:extLst>
+              <a:ext uri="{FF2B5EF4-FFF2-40B4-BE49-F238E27FC236}">
+                <a16:creationId xmlns:a16="http://schemas.microsoft.com/office/drawing/2014/main" id="{51415B09-5FB9-41AE-BEEE-90547C065D98}"/>
+              </a:ext>
+            </a:extLst>
+          </p:cNvPr>
+          <p:cNvPicPr>
+            <a:picLocks noChangeAspect="1"/>
+          </p:cNvPicPr>
+          <p:nvPr/>
+        </p:nvPicPr>
+        <p:blipFill>
+          <a:blip r:embed="rId3">
+            <a:extLst>
+              <a:ext uri="{28A0092B-C50C-407E-A947-70E740481C1C}">
+                <a14:useLocalDpi xmlns:a14="http://schemas.microsoft.com/office/drawing/2010/main" val="0"/>
+              </a:ext>
+            </a:extLst>
+          </a:blip>
+          <a:stretch>
+            <a:fillRect/>
+          </a:stretch>
+        </p:blipFill>
+        <p:spPr>
+          <a:xfrm>
+            <a:off x="6991912" y="3429000"/>
+            <a:ext cx="3034640" cy="3034640"/>
+          </a:xfrm>
+          <a:prstGeom prst="rect">
+            <a:avLst/>
+          </a:prstGeom>
+        </p:spPr>
+      </p:pic>
     </p:spTree>
     <p:extLst>
       <p:ext uri="{BB962C8B-B14F-4D97-AF65-F5344CB8AC3E}">
@@ -16949,8 +20624,8 @@
 </p:sld>
 </file>
 
-<file path=ppt/slides/slide19.xml><?xml version="1.0" encoding="utf-8"?>
-<p:sld xmlns:a="http://schemas.openxmlformats.org/drawingml/2006/main" xmlns:r="http://schemas.openxmlformats.org/officeDocument/2006/relationships" xmlns:p="http://schemas.openxmlformats.org/presentationml/2006/main">
+<file path=ppt/slides/slide21.xml><?xml version="1.0" encoding="utf-8"?>
+<p:sld xmlns:a="http://schemas.openxmlformats.org/drawingml/2006/main" xmlns:r="http://schemas.openxmlformats.org/officeDocument/2006/relationships" xmlns:p="http://schemas.openxmlformats.org/presentationml/2006/main" show="0">
   <p:cSld>
     <p:spTree>
       <p:nvGrpSpPr>
@@ -17057,6 +20732,15 @@
               <a:t>/s</a:t>
             </a:r>
           </a:p>
+          <a:p>
+            <a:endParaRPr lang="pl-PL" dirty="0"/>
+          </a:p>
+          <a:p>
+            <a:r>
+              <a:rPr lang="pl-PL" dirty="0"/>
+              <a:t>Niepotrzebne</a:t>
+            </a:r>
+          </a:p>
         </p:txBody>
       </p:sp>
     </p:spTree>
@@ -17072,105 +20756,7 @@
 </p:sld>
 </file>
 
-<file path=ppt/slides/slide2.xml><?xml version="1.0" encoding="utf-8"?>
-<p:sld xmlns:a="http://schemas.openxmlformats.org/drawingml/2006/main" xmlns:r="http://schemas.openxmlformats.org/officeDocument/2006/relationships" xmlns:p="http://schemas.openxmlformats.org/presentationml/2006/main" show="0">
-  <p:cSld>
-    <p:spTree>
-      <p:nvGrpSpPr>
-        <p:cNvPr id="1" name=""/>
-        <p:cNvGrpSpPr/>
-        <p:nvPr/>
-      </p:nvGrpSpPr>
-      <p:grpSpPr>
-        <a:xfrm>
-          <a:off x="0" y="0"/>
-          <a:ext cx="0" cy="0"/>
-          <a:chOff x="0" y="0"/>
-          <a:chExt cx="0" cy="0"/>
-        </a:xfrm>
-      </p:grpSpPr>
-      <p:sp>
-        <p:nvSpPr>
-          <p:cNvPr id="2" name="Tytuł 1">
-            <a:extLst>
-              <a:ext uri="{FF2B5EF4-FFF2-40B4-BE49-F238E27FC236}">
-                <a16:creationId xmlns:a16="http://schemas.microsoft.com/office/drawing/2014/main" id="{38FE2930-C9F9-42F1-BC5A-B5D8CC8FE5FB}"/>
-              </a:ext>
-            </a:extLst>
-          </p:cNvPr>
-          <p:cNvSpPr>
-            <a:spLocks noGrp="1"/>
-          </p:cNvSpPr>
-          <p:nvPr>
-            <p:ph type="title"/>
-          </p:nvPr>
-        </p:nvSpPr>
-        <p:spPr/>
-        <p:txBody>
-          <a:bodyPr/>
-          <a:lstStyle/>
-          <a:p>
-            <a:pPr algn="ctr"/>
-            <a:r>
-              <a:rPr lang="pl-PL"/>
-              <a:t>Firma</a:t>
-            </a:r>
-          </a:p>
-        </p:txBody>
-      </p:sp>
-      <p:sp>
-        <p:nvSpPr>
-          <p:cNvPr id="3" name="Symbol zastępczy zawartości 2">
-            <a:extLst>
-              <a:ext uri="{FF2B5EF4-FFF2-40B4-BE49-F238E27FC236}">
-                <a16:creationId xmlns:a16="http://schemas.microsoft.com/office/drawing/2014/main" id="{8426D2BE-ED27-420C-AF5A-CBE400D5329A}"/>
-              </a:ext>
-            </a:extLst>
-          </p:cNvPr>
-          <p:cNvSpPr>
-            <a:spLocks noGrp="1"/>
-          </p:cNvSpPr>
-          <p:nvPr>
-            <p:ph idx="1"/>
-          </p:nvPr>
-        </p:nvSpPr>
-        <p:spPr>
-          <a:xfrm>
-            <a:off x="680321" y="2635847"/>
-            <a:ext cx="10131425" cy="2387988"/>
-          </a:xfrm>
-        </p:spPr>
-        <p:txBody>
-          <a:bodyPr>
-            <a:normAutofit/>
-          </a:bodyPr>
-          <a:lstStyle/>
-          <a:p>
-            <a:pPr marL="0" indent="0">
-              <a:buNone/>
-            </a:pPr>
-            <a:r>
-              <a:rPr lang="pl-PL"/>
-              <a:t>System wspomagający zarządzanie zaprojektowano dla firmy, której działalnością jest produkcja elementów przy wykorzystaniu technologii addytywnych. Firma pracuje od poniedziałku do piątku w trybie jednozmianowym od 8:00 do 16:00.</a:t>
-            </a:r>
-            <a:endParaRPr lang="pl-PL" sz="2800"/>
-          </a:p>
-        </p:txBody>
-      </p:sp>
-    </p:spTree>
-    <p:extLst>
-      <p:ext uri="{BB962C8B-B14F-4D97-AF65-F5344CB8AC3E}">
-        <p14:creationId xmlns:p14="http://schemas.microsoft.com/office/powerpoint/2010/main" val="3558708667"/>
-      </p:ext>
-    </p:extLst>
-  </p:cSld>
-  <p:clrMapOvr>
-    <a:masterClrMapping/>
-  </p:clrMapOvr>
-</p:sld>
-</file>
-
-<file path=ppt/slides/slide20.xml><?xml version="1.0" encoding="utf-8"?>
+<file path=ppt/slides/slide22.xml><?xml version="1.0" encoding="utf-8"?>
 <p:sld xmlns:a="http://schemas.openxmlformats.org/drawingml/2006/main" xmlns:r="http://schemas.openxmlformats.org/officeDocument/2006/relationships" xmlns:p="http://schemas.openxmlformats.org/presentationml/2006/main">
   <p:cSld>
     <p:spTree>
@@ -17299,7 +20885,7 @@
 </p:sld>
 </file>
 
-<file path=ppt/slides/slide21.xml><?xml version="1.0" encoding="utf-8"?>
+<file path=ppt/slides/slide23.xml><?xml version="1.0" encoding="utf-8"?>
 <p:sld xmlns:a="http://schemas.openxmlformats.org/drawingml/2006/main" xmlns:r="http://schemas.openxmlformats.org/officeDocument/2006/relationships" xmlns:p="http://schemas.openxmlformats.org/presentationml/2006/main">
   <p:cSld>
     <p:spTree>
@@ -17487,7 +21073,7 @@
 </p:sld>
 </file>
 
-<file path=ppt/slides/slide22.xml><?xml version="1.0" encoding="utf-8"?>
+<file path=ppt/slides/slide24.xml><?xml version="1.0" encoding="utf-8"?>
 <p:sld xmlns:a="http://schemas.openxmlformats.org/drawingml/2006/main" xmlns:r="http://schemas.openxmlformats.org/officeDocument/2006/relationships" xmlns:p="http://schemas.openxmlformats.org/presentationml/2006/main">
   <p:cSld>
     <p:spTree>
@@ -17616,7 +21202,7 @@
 </p:sld>
 </file>
 
-<file path=ppt/slides/slide23.xml><?xml version="1.0" encoding="utf-8"?>
+<file path=ppt/slides/slide25.xml><?xml version="1.0" encoding="utf-8"?>
 <p:sld xmlns:a="http://schemas.openxmlformats.org/drawingml/2006/main" xmlns:r="http://schemas.openxmlformats.org/officeDocument/2006/relationships" xmlns:p="http://schemas.openxmlformats.org/presentationml/2006/main">
   <p:cSld>
     <p:spTree>
@@ -17804,7 +21390,7 @@
 </p:sld>
 </file>
 
-<file path=ppt/slides/slide24.xml><?xml version="1.0" encoding="utf-8"?>
+<file path=ppt/slides/slide26.xml><?xml version="1.0" encoding="utf-8"?>
 <p:sld xmlns:a="http://schemas.openxmlformats.org/drawingml/2006/main" xmlns:r="http://schemas.openxmlformats.org/officeDocument/2006/relationships" xmlns:p="http://schemas.openxmlformats.org/presentationml/2006/main">
   <p:cSld>
     <p:spTree>
@@ -17892,7 +21478,7 @@
 </p:sld>
 </file>
 
-<file path=ppt/slides/slide25.xml><?xml version="1.0" encoding="utf-8"?>
+<file path=ppt/slides/slide27.xml><?xml version="1.0" encoding="utf-8"?>
 <p:sld xmlns:a="http://schemas.openxmlformats.org/drawingml/2006/main" xmlns:r="http://schemas.openxmlformats.org/officeDocument/2006/relationships" xmlns:p="http://schemas.openxmlformats.org/presentationml/2006/main">
   <p:cSld>
     <p:spTree>
@@ -17980,7 +21566,7 @@
 </p:sld>
 </file>
 
-<file path=ppt/slides/slide26.xml><?xml version="1.0" encoding="utf-8"?>
+<file path=ppt/slides/slide28.xml><?xml version="1.0" encoding="utf-8"?>
 <p:sld xmlns:a="http://schemas.openxmlformats.org/drawingml/2006/main" xmlns:r="http://schemas.openxmlformats.org/officeDocument/2006/relationships" xmlns:p="http://schemas.openxmlformats.org/presentationml/2006/main">
   <p:cSld>
     <p:spTree>
@@ -18068,7 +21654,7 @@
 </p:sld>
 </file>
 
-<file path=ppt/slides/slide27.xml><?xml version="1.0" encoding="utf-8"?>
+<file path=ppt/slides/slide29.xml><?xml version="1.0" encoding="utf-8"?>
 <p:sld xmlns:a="http://schemas.openxmlformats.org/drawingml/2006/main" xmlns:r="http://schemas.openxmlformats.org/officeDocument/2006/relationships" xmlns:p="http://schemas.openxmlformats.org/presentationml/2006/main">
   <p:cSld>
     <p:spTree>
@@ -18156,7 +21742,110 @@
 </p:sld>
 </file>
 
-<file path=ppt/slides/slide28.xml><?xml version="1.0" encoding="utf-8"?>
+<file path=ppt/slides/slide3.xml><?xml version="1.0" encoding="utf-8"?>
+<p:sld xmlns:a="http://schemas.openxmlformats.org/drawingml/2006/main" xmlns:r="http://schemas.openxmlformats.org/officeDocument/2006/relationships" xmlns:p="http://schemas.openxmlformats.org/presentationml/2006/main">
+  <p:cSld>
+    <p:spTree>
+      <p:nvGrpSpPr>
+        <p:cNvPr id="1" name=""/>
+        <p:cNvGrpSpPr/>
+        <p:nvPr/>
+      </p:nvGrpSpPr>
+      <p:grpSpPr>
+        <a:xfrm>
+          <a:off x="0" y="0"/>
+          <a:ext cx="0" cy="0"/>
+          <a:chOff x="0" y="0"/>
+          <a:chExt cx="0" cy="0"/>
+        </a:xfrm>
+      </p:grpSpPr>
+      <p:sp>
+        <p:nvSpPr>
+          <p:cNvPr id="2" name="Tytuł 1">
+            <a:extLst>
+              <a:ext uri="{FF2B5EF4-FFF2-40B4-BE49-F238E27FC236}">
+                <a16:creationId xmlns:a16="http://schemas.microsoft.com/office/drawing/2014/main" id="{38FE2930-C9F9-42F1-BC5A-B5D8CC8FE5FB}"/>
+              </a:ext>
+            </a:extLst>
+          </p:cNvPr>
+          <p:cNvSpPr>
+            <a:spLocks noGrp="1"/>
+          </p:cNvSpPr>
+          <p:nvPr>
+            <p:ph type="title"/>
+          </p:nvPr>
+        </p:nvSpPr>
+        <p:spPr/>
+        <p:txBody>
+          <a:bodyPr/>
+          <a:lstStyle/>
+          <a:p>
+            <a:pPr algn="ctr"/>
+            <a:r>
+              <a:rPr lang="pl-PL" dirty="0"/>
+              <a:t>Forma prawna przedsiębiorstwa</a:t>
+            </a:r>
+          </a:p>
+        </p:txBody>
+      </p:sp>
+      <p:sp>
+        <p:nvSpPr>
+          <p:cNvPr id="3" name="Symbol zastępczy zawartości 2">
+            <a:extLst>
+              <a:ext uri="{FF2B5EF4-FFF2-40B4-BE49-F238E27FC236}">
+                <a16:creationId xmlns:a16="http://schemas.microsoft.com/office/drawing/2014/main" id="{8426D2BE-ED27-420C-AF5A-CBE400D5329A}"/>
+              </a:ext>
+            </a:extLst>
+          </p:cNvPr>
+          <p:cNvSpPr>
+            <a:spLocks noGrp="1"/>
+          </p:cNvSpPr>
+          <p:nvPr>
+            <p:ph idx="1"/>
+          </p:nvPr>
+        </p:nvSpPr>
+        <p:spPr>
+          <a:xfrm>
+            <a:off x="680321" y="2635847"/>
+            <a:ext cx="10131425" cy="2387988"/>
+          </a:xfrm>
+        </p:spPr>
+        <p:txBody>
+          <a:bodyPr>
+            <a:normAutofit/>
+          </a:bodyPr>
+          <a:lstStyle/>
+          <a:p>
+            <a:pPr marL="0" indent="0">
+              <a:buNone/>
+            </a:pPr>
+            <a:r>
+              <a:rPr lang="pl-PL" dirty="0"/>
+              <a:t>Nasze przedsiębiorstwo jest spółką z ograniczoną odpowiedzialnością. Wybrana została ze względu na ograniczoną odpowiedzialność majątkową wspólników oraz możliwość prowadzenia spółki na dużą skalę.</a:t>
+            </a:r>
+          </a:p>
+          <a:p>
+            <a:pPr marL="0" indent="0">
+              <a:buNone/>
+            </a:pPr>
+            <a:endParaRPr lang="pl-PL" sz="2800" dirty="0"/>
+          </a:p>
+        </p:txBody>
+      </p:sp>
+    </p:spTree>
+    <p:extLst>
+      <p:ext uri="{BB962C8B-B14F-4D97-AF65-F5344CB8AC3E}">
+        <p14:creationId xmlns:p14="http://schemas.microsoft.com/office/powerpoint/2010/main" val="3480498017"/>
+      </p:ext>
+    </p:extLst>
+  </p:cSld>
+  <p:clrMapOvr>
+    <a:masterClrMapping/>
+  </p:clrMapOvr>
+</p:sld>
+</file>
+
+<file path=ppt/slides/slide30.xml><?xml version="1.0" encoding="utf-8"?>
 <p:sld xmlns:a="http://schemas.openxmlformats.org/drawingml/2006/main" xmlns:r="http://schemas.openxmlformats.org/officeDocument/2006/relationships" xmlns:p="http://schemas.openxmlformats.org/presentationml/2006/main">
   <p:cSld>
     <p:spTree>
@@ -18244,7 +21933,7 @@
 </p:sld>
 </file>
 
-<file path=ppt/slides/slide29.xml><?xml version="1.0" encoding="utf-8"?>
+<file path=ppt/slides/slide31.xml><?xml version="1.0" encoding="utf-8"?>
 <p:sld xmlns:a="http://schemas.openxmlformats.org/drawingml/2006/main" xmlns:r="http://schemas.openxmlformats.org/officeDocument/2006/relationships" xmlns:p="http://schemas.openxmlformats.org/presentationml/2006/main">
   <p:cSld>
     <p:spTree>
@@ -18332,131 +22021,7 @@
 </p:sld>
 </file>
 
-<file path=ppt/slides/slide3.xml><?xml version="1.0" encoding="utf-8"?>
-<p:sld xmlns:a="http://schemas.openxmlformats.org/drawingml/2006/main" xmlns:r="http://schemas.openxmlformats.org/officeDocument/2006/relationships" xmlns:p="http://schemas.openxmlformats.org/presentationml/2006/main" show="0">
-  <p:cSld>
-    <p:spTree>
-      <p:nvGrpSpPr>
-        <p:cNvPr id="1" name=""/>
-        <p:cNvGrpSpPr/>
-        <p:nvPr/>
-      </p:nvGrpSpPr>
-      <p:grpSpPr>
-        <a:xfrm>
-          <a:off x="0" y="0"/>
-          <a:ext cx="0" cy="0"/>
-          <a:chOff x="0" y="0"/>
-          <a:chExt cx="0" cy="0"/>
-        </a:xfrm>
-      </p:grpSpPr>
-      <p:sp>
-        <p:nvSpPr>
-          <p:cNvPr id="2" name="Tytuł 1">
-            <a:extLst>
-              <a:ext uri="{FF2B5EF4-FFF2-40B4-BE49-F238E27FC236}">
-                <a16:creationId xmlns:a16="http://schemas.microsoft.com/office/drawing/2014/main" id="{D5B77372-D8E3-48EE-A895-C7FED7C0C32C}"/>
-              </a:ext>
-            </a:extLst>
-          </p:cNvPr>
-          <p:cNvSpPr>
-            <a:spLocks noGrp="1"/>
-          </p:cNvSpPr>
-          <p:nvPr>
-            <p:ph type="title"/>
-          </p:nvPr>
-        </p:nvSpPr>
-        <p:spPr/>
-        <p:txBody>
-          <a:bodyPr/>
-          <a:lstStyle/>
-          <a:p>
-            <a:r>
-              <a:rPr lang="pl-PL" dirty="0"/>
-              <a:t>Cele przedsiębiorstwa :</a:t>
-            </a:r>
-          </a:p>
-        </p:txBody>
-      </p:sp>
-      <p:sp>
-        <p:nvSpPr>
-          <p:cNvPr id="3" name="Symbol zastępczy zawartości 2">
-            <a:extLst>
-              <a:ext uri="{FF2B5EF4-FFF2-40B4-BE49-F238E27FC236}">
-                <a16:creationId xmlns:a16="http://schemas.microsoft.com/office/drawing/2014/main" id="{25D05DB1-613F-4888-892D-647FB35E7E3A}"/>
-              </a:ext>
-            </a:extLst>
-          </p:cNvPr>
-          <p:cNvSpPr>
-            <a:spLocks noGrp="1"/>
-          </p:cNvSpPr>
-          <p:nvPr>
-            <p:ph idx="1"/>
-          </p:nvPr>
-        </p:nvSpPr>
-        <p:spPr>
-          <a:xfrm>
-            <a:off x="1074821" y="2248782"/>
-            <a:ext cx="9613861" cy="3599316"/>
-          </a:xfrm>
-        </p:spPr>
-        <p:txBody>
-          <a:bodyPr/>
-          <a:lstStyle/>
-          <a:p>
-            <a:r>
-              <a:rPr lang="pl-PL" dirty="0"/>
-              <a:t>Maksymalizacja zysków przedsiębiorstwa.</a:t>
-            </a:r>
-          </a:p>
-          <a:p>
-            <a:r>
-              <a:rPr lang="pl-PL" dirty="0"/>
-              <a:t>Maksymalizacja sprzedaży.</a:t>
-            </a:r>
-          </a:p>
-          <a:p>
-            <a:r>
-              <a:rPr lang="pl-PL" dirty="0"/>
-              <a:t>Zwiększenie stanu materialnego pracowników.</a:t>
-            </a:r>
-          </a:p>
-          <a:p>
-            <a:r>
-              <a:rPr lang="pl-PL" dirty="0"/>
-              <a:t>Dostarczenie produktu zgodnego z wymaganiami.</a:t>
-            </a:r>
-          </a:p>
-          <a:p>
-            <a:r>
-              <a:rPr lang="pl-PL" dirty="0"/>
-              <a:t>Zwiększenie konkurencyjności na rynku.</a:t>
-            </a:r>
-          </a:p>
-          <a:p>
-            <a:r>
-              <a:rPr lang="pl-PL" dirty="0"/>
-              <a:t>Przygotowanie funkcjonalnego systemu wspomagania zarządzania.</a:t>
-            </a:r>
-          </a:p>
-          <a:p>
-            <a:endParaRPr lang="pl-PL" dirty="0"/>
-          </a:p>
-        </p:txBody>
-      </p:sp>
-    </p:spTree>
-    <p:extLst>
-      <p:ext uri="{BB962C8B-B14F-4D97-AF65-F5344CB8AC3E}">
-        <p14:creationId xmlns:p14="http://schemas.microsoft.com/office/powerpoint/2010/main" val="1577202253"/>
-      </p:ext>
-    </p:extLst>
-  </p:cSld>
-  <p:clrMapOvr>
-    <a:masterClrMapping/>
-  </p:clrMapOvr>
-</p:sld>
-</file>
-
-<file path=ppt/slides/slide30.xml><?xml version="1.0" encoding="utf-8"?>
+<file path=ppt/slides/slide32.xml><?xml version="1.0" encoding="utf-8"?>
 <p:sld xmlns:a="http://schemas.openxmlformats.org/drawingml/2006/main" xmlns:r="http://schemas.openxmlformats.org/officeDocument/2006/relationships" xmlns:p="http://schemas.openxmlformats.org/presentationml/2006/main">
   <p:cSld>
     <p:spTree>
@@ -18566,6 +22131,213 @@
           <p:cNvPr id="2" name="Tytuł 1">
             <a:extLst>
               <a:ext uri="{FF2B5EF4-FFF2-40B4-BE49-F238E27FC236}">
+                <a16:creationId xmlns:a16="http://schemas.microsoft.com/office/drawing/2014/main" id="{68FE2211-33EF-4D43-8DD9-8F3BD2037BC8}"/>
+              </a:ext>
+            </a:extLst>
+          </p:cNvPr>
+          <p:cNvSpPr>
+            <a:spLocks noGrp="1"/>
+          </p:cNvSpPr>
+          <p:nvPr>
+            <p:ph type="title"/>
+          </p:nvPr>
+        </p:nvSpPr>
+        <p:spPr/>
+        <p:txBody>
+          <a:bodyPr/>
+          <a:lstStyle/>
+          <a:p>
+            <a:r>
+              <a:rPr lang="pl-PL" dirty="0"/>
+              <a:t>Model biznesowy przedsiębiorstwa</a:t>
+            </a:r>
+          </a:p>
+        </p:txBody>
+      </p:sp>
+      <p:sp>
+        <p:nvSpPr>
+          <p:cNvPr id="3" name="Symbol zastępczy zawartości 2">
+            <a:extLst>
+              <a:ext uri="{FF2B5EF4-FFF2-40B4-BE49-F238E27FC236}">
+                <a16:creationId xmlns:a16="http://schemas.microsoft.com/office/drawing/2014/main" id="{A871191D-3757-4DCB-9C0A-DF51E8DBFB7B}"/>
+              </a:ext>
+            </a:extLst>
+          </p:cNvPr>
+          <p:cNvSpPr>
+            <a:spLocks noGrp="1"/>
+          </p:cNvSpPr>
+          <p:nvPr>
+            <p:ph idx="1"/>
+          </p:nvPr>
+        </p:nvSpPr>
+        <p:spPr/>
+        <p:txBody>
+          <a:bodyPr/>
+          <a:lstStyle/>
+          <a:p>
+            <a:endParaRPr lang="pl-PL"/>
+          </a:p>
+        </p:txBody>
+      </p:sp>
+    </p:spTree>
+    <p:extLst>
+      <p:ext uri="{BB962C8B-B14F-4D97-AF65-F5344CB8AC3E}">
+        <p14:creationId xmlns:p14="http://schemas.microsoft.com/office/powerpoint/2010/main" val="449364182"/>
+      </p:ext>
+    </p:extLst>
+  </p:cSld>
+  <p:clrMapOvr>
+    <a:masterClrMapping/>
+  </p:clrMapOvr>
+</p:sld>
+</file>
+
+<file path=ppt/slides/slide5.xml><?xml version="1.0" encoding="utf-8"?>
+<p:sld xmlns:a="http://schemas.openxmlformats.org/drawingml/2006/main" xmlns:r="http://schemas.openxmlformats.org/officeDocument/2006/relationships" xmlns:p="http://schemas.openxmlformats.org/presentationml/2006/main" show="0">
+  <p:cSld>
+    <p:spTree>
+      <p:nvGrpSpPr>
+        <p:cNvPr id="1" name=""/>
+        <p:cNvGrpSpPr/>
+        <p:nvPr/>
+      </p:nvGrpSpPr>
+      <p:grpSpPr>
+        <a:xfrm>
+          <a:off x="0" y="0"/>
+          <a:ext cx="0" cy="0"/>
+          <a:chOff x="0" y="0"/>
+          <a:chExt cx="0" cy="0"/>
+        </a:xfrm>
+      </p:grpSpPr>
+      <p:sp>
+        <p:nvSpPr>
+          <p:cNvPr id="2" name="Tytuł 1">
+            <a:extLst>
+              <a:ext uri="{FF2B5EF4-FFF2-40B4-BE49-F238E27FC236}">
+                <a16:creationId xmlns:a16="http://schemas.microsoft.com/office/drawing/2014/main" id="{D5B77372-D8E3-48EE-A895-C7FED7C0C32C}"/>
+              </a:ext>
+            </a:extLst>
+          </p:cNvPr>
+          <p:cNvSpPr>
+            <a:spLocks noGrp="1"/>
+          </p:cNvSpPr>
+          <p:nvPr>
+            <p:ph type="title"/>
+          </p:nvPr>
+        </p:nvSpPr>
+        <p:spPr/>
+        <p:txBody>
+          <a:bodyPr/>
+          <a:lstStyle/>
+          <a:p>
+            <a:r>
+              <a:rPr lang="pl-PL" dirty="0"/>
+              <a:t>Cele przedsiębiorstwa :</a:t>
+            </a:r>
+          </a:p>
+        </p:txBody>
+      </p:sp>
+      <p:sp>
+        <p:nvSpPr>
+          <p:cNvPr id="3" name="Symbol zastępczy zawartości 2">
+            <a:extLst>
+              <a:ext uri="{FF2B5EF4-FFF2-40B4-BE49-F238E27FC236}">
+                <a16:creationId xmlns:a16="http://schemas.microsoft.com/office/drawing/2014/main" id="{25D05DB1-613F-4888-892D-647FB35E7E3A}"/>
+              </a:ext>
+            </a:extLst>
+          </p:cNvPr>
+          <p:cNvSpPr>
+            <a:spLocks noGrp="1"/>
+          </p:cNvSpPr>
+          <p:nvPr>
+            <p:ph idx="1"/>
+          </p:nvPr>
+        </p:nvSpPr>
+        <p:spPr>
+          <a:xfrm>
+            <a:off x="1074821" y="2248782"/>
+            <a:ext cx="9613861" cy="3599316"/>
+          </a:xfrm>
+        </p:spPr>
+        <p:txBody>
+          <a:bodyPr/>
+          <a:lstStyle/>
+          <a:p>
+            <a:r>
+              <a:rPr lang="pl-PL" dirty="0"/>
+              <a:t>Maksymalizacja zysków przedsiębiorstwa.</a:t>
+            </a:r>
+          </a:p>
+          <a:p>
+            <a:r>
+              <a:rPr lang="pl-PL" dirty="0"/>
+              <a:t>Maksymalizacja sprzedaży.</a:t>
+            </a:r>
+          </a:p>
+          <a:p>
+            <a:r>
+              <a:rPr lang="pl-PL" dirty="0"/>
+              <a:t>Zwiększenie stanu materialnego pracowników.</a:t>
+            </a:r>
+          </a:p>
+          <a:p>
+            <a:r>
+              <a:rPr lang="pl-PL" dirty="0"/>
+              <a:t>Dostarczenie produktu zgodnego z wymaganiami.</a:t>
+            </a:r>
+          </a:p>
+          <a:p>
+            <a:r>
+              <a:rPr lang="pl-PL" dirty="0"/>
+              <a:t>Zwiększenie konkurencyjności na rynku.</a:t>
+            </a:r>
+          </a:p>
+          <a:p>
+            <a:r>
+              <a:rPr lang="pl-PL" dirty="0"/>
+              <a:t>Przygotowanie funkcjonalnego systemu wspomagania zarządzania.</a:t>
+            </a:r>
+          </a:p>
+          <a:p>
+            <a:endParaRPr lang="pl-PL" dirty="0"/>
+          </a:p>
+        </p:txBody>
+      </p:sp>
+    </p:spTree>
+    <p:extLst>
+      <p:ext uri="{BB962C8B-B14F-4D97-AF65-F5344CB8AC3E}">
+        <p14:creationId xmlns:p14="http://schemas.microsoft.com/office/powerpoint/2010/main" val="1577202253"/>
+      </p:ext>
+    </p:extLst>
+  </p:cSld>
+  <p:clrMapOvr>
+    <a:masterClrMapping/>
+  </p:clrMapOvr>
+</p:sld>
+</file>
+
+<file path=ppt/slides/slide6.xml><?xml version="1.0" encoding="utf-8"?>
+<p:sld xmlns:a="http://schemas.openxmlformats.org/drawingml/2006/main" xmlns:r="http://schemas.openxmlformats.org/officeDocument/2006/relationships" xmlns:p="http://schemas.openxmlformats.org/presentationml/2006/main">
+  <p:cSld>
+    <p:spTree>
+      <p:nvGrpSpPr>
+        <p:cNvPr id="1" name=""/>
+        <p:cNvGrpSpPr/>
+        <p:nvPr/>
+      </p:nvGrpSpPr>
+      <p:grpSpPr>
+        <a:xfrm>
+          <a:off x="0" y="0"/>
+          <a:ext cx="0" cy="0"/>
+          <a:chOff x="0" y="0"/>
+          <a:chExt cx="0" cy="0"/>
+        </a:xfrm>
+      </p:grpSpPr>
+      <p:sp>
+        <p:nvSpPr>
+          <p:cNvPr id="2" name="Tytuł 1">
+            <a:extLst>
+              <a:ext uri="{FF2B5EF4-FFF2-40B4-BE49-F238E27FC236}">
                 <a16:creationId xmlns:a16="http://schemas.microsoft.com/office/drawing/2014/main" id="{2514308B-F515-419E-A803-A1A27A9DBDF1}"/>
               </a:ext>
             </a:extLst>
@@ -18688,7 +22460,7 @@
 </p:sld>
 </file>
 
-<file path=ppt/slides/slide5.xml><?xml version="1.0" encoding="utf-8"?>
+<file path=ppt/slides/slide7.xml><?xml version="1.0" encoding="utf-8"?>
 <p:sld xmlns:a="http://schemas.openxmlformats.org/drawingml/2006/main" xmlns:r="http://schemas.openxmlformats.org/officeDocument/2006/relationships" xmlns:p="http://schemas.openxmlformats.org/presentationml/2006/main">
   <p:cSld>
     <p:spTree>
@@ -18837,7 +22609,7 @@
 </p:sld>
 </file>
 
-<file path=ppt/slides/slide6.xml><?xml version="1.0" encoding="utf-8"?>
+<file path=ppt/slides/slide8.xml><?xml version="1.0" encoding="utf-8"?>
 <p:sld xmlns:a="http://schemas.openxmlformats.org/drawingml/2006/main" xmlns:r="http://schemas.openxmlformats.org/officeDocument/2006/relationships" xmlns:p="http://schemas.openxmlformats.org/presentationml/2006/main" show="0">
   <p:cSld>
     <p:spTree>
@@ -19710,7 +23482,7 @@
 </p:sld>
 </file>
 
-<file path=ppt/slides/slide7.xml><?xml version="1.0" encoding="utf-8"?>
+<file path=ppt/slides/slide9.xml><?xml version="1.0" encoding="utf-8"?>
 <p:sld xmlns:a="http://schemas.openxmlformats.org/drawingml/2006/main" xmlns:r="http://schemas.openxmlformats.org/officeDocument/2006/relationships" xmlns:p="http://schemas.openxmlformats.org/presentationml/2006/main">
   <p:cSld>
     <p:spTree>
@@ -19784,8 +23556,23 @@
           <a:p>
             <a:pPr algn="just"/>
             <a:r>
-              <a:rPr lang="pl-PL"/>
+              <a:rPr lang="pl-PL" dirty="0"/>
               <a:t>W przedsiębiorstwie wykonywane są elementy druku 3D, zamówienia składane są przez klientów, następnie przeprowadzany jest proces produkcji.</a:t>
+            </a:r>
+          </a:p>
+          <a:p>
+            <a:pPr algn="just"/>
+            <a:endParaRPr lang="pl-PL" dirty="0"/>
+          </a:p>
+          <a:p>
+            <a:pPr algn="just"/>
+            <a:endParaRPr lang="pl-PL" dirty="0"/>
+          </a:p>
+          <a:p>
+            <a:pPr algn="just"/>
+            <a:r>
+              <a:rPr lang="pl-PL" dirty="0"/>
+              <a:t>Jak wygląda proces technologiczny</a:t>
             </a:r>
           </a:p>
         </p:txBody>
@@ -19794,182 +23581,6 @@
     <p:extLst>
       <p:ext uri="{BB962C8B-B14F-4D97-AF65-F5344CB8AC3E}">
         <p14:creationId xmlns:p14="http://schemas.microsoft.com/office/powerpoint/2010/main" val="3268905368"/>
-      </p:ext>
-    </p:extLst>
-  </p:cSld>
-  <p:clrMapOvr>
-    <a:masterClrMapping/>
-  </p:clrMapOvr>
-</p:sld>
-</file>
-
-<file path=ppt/slides/slide8.xml><?xml version="1.0" encoding="utf-8"?>
-<p:sld xmlns:a="http://schemas.openxmlformats.org/drawingml/2006/main" xmlns:r="http://schemas.openxmlformats.org/officeDocument/2006/relationships" xmlns:p="http://schemas.openxmlformats.org/presentationml/2006/main" show="0">
-  <p:cSld>
-    <p:spTree>
-      <p:nvGrpSpPr>
-        <p:cNvPr id="1" name=""/>
-        <p:cNvGrpSpPr/>
-        <p:nvPr/>
-      </p:nvGrpSpPr>
-      <p:grpSpPr>
-        <a:xfrm>
-          <a:off x="0" y="0"/>
-          <a:ext cx="0" cy="0"/>
-          <a:chOff x="0" y="0"/>
-          <a:chExt cx="0" cy="0"/>
-        </a:xfrm>
-      </p:grpSpPr>
-      <p:sp>
-        <p:nvSpPr>
-          <p:cNvPr id="2" name="Tytuł 1">
-            <a:extLst>
-              <a:ext uri="{FF2B5EF4-FFF2-40B4-BE49-F238E27FC236}">
-                <a16:creationId xmlns:a16="http://schemas.microsoft.com/office/drawing/2014/main" id="{276E0BDA-CFCE-4FCC-9462-7ABD12218273}"/>
-              </a:ext>
-            </a:extLst>
-          </p:cNvPr>
-          <p:cNvSpPr>
-            <a:spLocks noGrp="1"/>
-          </p:cNvSpPr>
-          <p:nvPr>
-            <p:ph type="title"/>
-          </p:nvPr>
-        </p:nvSpPr>
-        <p:spPr/>
-        <p:txBody>
-          <a:bodyPr/>
-          <a:lstStyle/>
-          <a:p>
-            <a:r>
-              <a:rPr lang="pl-PL"/>
-              <a:t>Mapa myśli</a:t>
-            </a:r>
-          </a:p>
-        </p:txBody>
-      </p:sp>
-      <p:graphicFrame>
-        <p:nvGraphicFramePr>
-          <p:cNvPr id="4" name="Symbol zastępczy zawartości 3">
-            <a:extLst>
-              <a:ext uri="{FF2B5EF4-FFF2-40B4-BE49-F238E27FC236}">
-                <a16:creationId xmlns:a16="http://schemas.microsoft.com/office/drawing/2014/main" id="{13A4F842-1CB8-436D-952D-AC3D8A2DFCA5}"/>
-              </a:ext>
-            </a:extLst>
-          </p:cNvPr>
-          <p:cNvGraphicFramePr>
-            <a:graphicFrameLocks noGrp="1"/>
-          </p:cNvGraphicFramePr>
-          <p:nvPr>
-            <p:ph idx="1"/>
-            <p:extLst>
-              <p:ext uri="{D42A27DB-BD31-4B8C-83A1-F6EECF244321}">
-                <p14:modId xmlns:p14="http://schemas.microsoft.com/office/powerpoint/2010/main" val="1244398296"/>
-              </p:ext>
-            </p:extLst>
-          </p:nvPr>
-        </p:nvGraphicFramePr>
-        <p:xfrm>
-          <a:off x="0" y="855677"/>
-          <a:ext cx="10427516" cy="5855516"/>
-        </p:xfrm>
-        <a:graphic>
-          <a:graphicData uri="http://schemas.openxmlformats.org/drawingml/2006/diagram">
-            <dgm:relIds xmlns:dgm="http://schemas.openxmlformats.org/drawingml/2006/diagram" xmlns:r="http://schemas.openxmlformats.org/officeDocument/2006/relationships" r:dm="rId2" r:lo="rId3" r:qs="rId4" r:cs="rId5"/>
-          </a:graphicData>
-        </a:graphic>
-      </p:graphicFrame>
-    </p:spTree>
-    <p:extLst>
-      <p:ext uri="{BB962C8B-B14F-4D97-AF65-F5344CB8AC3E}">
-        <p14:creationId xmlns:p14="http://schemas.microsoft.com/office/powerpoint/2010/main" val="2644152362"/>
-      </p:ext>
-    </p:extLst>
-  </p:cSld>
-  <p:clrMapOvr>
-    <a:masterClrMapping/>
-  </p:clrMapOvr>
-</p:sld>
-</file>
-
-<file path=ppt/slides/slide9.xml><?xml version="1.0" encoding="utf-8"?>
-<p:sld xmlns:a="http://schemas.openxmlformats.org/drawingml/2006/main" xmlns:r="http://schemas.openxmlformats.org/officeDocument/2006/relationships" xmlns:p="http://schemas.openxmlformats.org/presentationml/2006/main">
-  <p:cSld>
-    <p:spTree>
-      <p:nvGrpSpPr>
-        <p:cNvPr id="1" name=""/>
-        <p:cNvGrpSpPr/>
-        <p:nvPr/>
-      </p:nvGrpSpPr>
-      <p:grpSpPr>
-        <a:xfrm>
-          <a:off x="0" y="0"/>
-          <a:ext cx="0" cy="0"/>
-          <a:chOff x="0" y="0"/>
-          <a:chExt cx="0" cy="0"/>
-        </a:xfrm>
-      </p:grpSpPr>
-      <p:sp>
-        <p:nvSpPr>
-          <p:cNvPr id="2" name="Tytuł 1">
-            <a:extLst>
-              <a:ext uri="{FF2B5EF4-FFF2-40B4-BE49-F238E27FC236}">
-                <a16:creationId xmlns:a16="http://schemas.microsoft.com/office/drawing/2014/main" id="{05FE9B8C-BCC8-491A-9A40-09796781C6C5}"/>
-              </a:ext>
-            </a:extLst>
-          </p:cNvPr>
-          <p:cNvSpPr>
-            <a:spLocks noGrp="1"/>
-          </p:cNvSpPr>
-          <p:nvPr>
-            <p:ph type="title"/>
-          </p:nvPr>
-        </p:nvSpPr>
-        <p:spPr/>
-        <p:txBody>
-          <a:bodyPr/>
-          <a:lstStyle/>
-          <a:p>
-            <a:r>
-              <a:rPr lang="pl-PL"/>
-              <a:t>Serwisowanie</a:t>
-            </a:r>
-          </a:p>
-        </p:txBody>
-      </p:sp>
-      <p:sp>
-        <p:nvSpPr>
-          <p:cNvPr id="3" name="Symbol zastępczy zawartości 2">
-            <a:extLst>
-              <a:ext uri="{FF2B5EF4-FFF2-40B4-BE49-F238E27FC236}">
-                <a16:creationId xmlns:a16="http://schemas.microsoft.com/office/drawing/2014/main" id="{390CC1DD-0AF3-4FE1-8E9E-B299C34769A8}"/>
-              </a:ext>
-            </a:extLst>
-          </p:cNvPr>
-          <p:cNvSpPr>
-            <a:spLocks noGrp="1"/>
-          </p:cNvSpPr>
-          <p:nvPr>
-            <p:ph idx="1"/>
-          </p:nvPr>
-        </p:nvSpPr>
-        <p:spPr/>
-        <p:txBody>
-          <a:bodyPr/>
-          <a:lstStyle/>
-          <a:p>
-            <a:pPr algn="just"/>
-            <a:r>
-              <a:rPr lang="pl-PL" dirty="0"/>
-              <a:t>Eksploatacja prowadzona jest według planowanej profilaktyki. Obsługa (przegląd) profilaktyczny maszyn wykonywany jest przez zewnętrzną firmę, okresowe i bieżące przeglądy wykonywane są w naszym przedsiębiorstwie. Obsługa bieżąca – raz w tygodniu, okresowa – raz na trzy miesiące, przegląd profilaktyczny – raz na rok.</a:t>
-            </a:r>
-          </a:p>
-        </p:txBody>
-      </p:sp>
-    </p:spTree>
-    <p:extLst>
-      <p:ext uri="{BB962C8B-B14F-4D97-AF65-F5344CB8AC3E}">
-        <p14:creationId xmlns:p14="http://schemas.microsoft.com/office/powerpoint/2010/main" val="4285159381"/>
       </p:ext>
     </p:extLst>
   </p:cSld>

</xml_diff>

<commit_message>
Kolejne male poprawki stylistyczne
</commit_message>
<xml_diff>
--- a/Prezentacja_29.04.pptx
+++ b/Prezentacja_29.04.pptx
@@ -27872,8 +27872,8 @@
         </p:blipFill>
         <p:spPr bwMode="auto">
           <a:xfrm>
-            <a:off x="6390689" y="707899"/>
-            <a:ext cx="5581748" cy="5442202"/>
+            <a:off x="6318739" y="197718"/>
+            <a:ext cx="6181237" cy="6531645"/>
           </a:xfrm>
           <a:prstGeom prst="rect">
             <a:avLst/>

</xml_diff>

<commit_message>
Revert "Kolejne male poprawki stylistyczne"
This reverts commit a0850d0a329d77ea2d0e6d1daafee49d60671613.
</commit_message>
<xml_diff>
--- a/Prezentacja_29.04.pptx
+++ b/Prezentacja_29.04.pptx
@@ -27872,8 +27872,8 @@
         </p:blipFill>
         <p:spPr bwMode="auto">
           <a:xfrm>
-            <a:off x="6318739" y="197718"/>
-            <a:ext cx="6181237" cy="6531645"/>
+            <a:off x="6390689" y="707899"/>
+            <a:ext cx="5581748" cy="5442202"/>
           </a:xfrm>
           <a:prstGeom prst="rect">
             <a:avLst/>

</xml_diff>

<commit_message>
Poprawiona literówka w procesie biznesowym
</commit_message>
<xml_diff>
--- a/Prezentacja_29.04.pptx
+++ b/Prezentacja_29.04.pptx
@@ -5660,7 +5660,7 @@
           <a:p>
             <a:fld id="{77C7207A-6BEF-41EC-85B3-243D736B3C1C}" type="datetimeFigureOut">
               <a:rPr lang="pl-PL" smtClean="0"/>
-              <a:t>28.04.2021</a:t>
+              <a:t>28-04-2021</a:t>
             </a:fld>
             <a:endParaRPr lang="pl-PL"/>
           </a:p>
@@ -6201,7 +6201,7 @@
           <a:p>
             <a:fld id="{906E2E1F-15FB-4A85-A0E2-DD17BB6BDEE2}" type="datetime1">
               <a:rPr lang="pl-PL" smtClean="0"/>
-              <a:t>28.04.2021</a:t>
+              <a:t>28-04-2021</a:t>
             </a:fld>
             <a:endParaRPr lang="pl-PL"/>
           </a:p>
@@ -6615,7 +6615,7 @@
           <a:p>
             <a:fld id="{04BF9A06-73F2-4084-A96B-CDBA4804ABA9}" type="datetime1">
               <a:rPr lang="pl-PL" smtClean="0"/>
-              <a:t>28.04.2021</a:t>
+              <a:t>28-04-2021</a:t>
             </a:fld>
             <a:endParaRPr lang="pl-PL"/>
           </a:p>
@@ -6951,7 +6951,7 @@
           <a:p>
             <a:fld id="{94657371-091B-4329-9E46-EE3FD16C2124}" type="datetime1">
               <a:rPr lang="pl-PL" smtClean="0"/>
-              <a:t>28.04.2021</a:t>
+              <a:t>28-04-2021</a:t>
             </a:fld>
             <a:endParaRPr lang="pl-PL"/>
           </a:p>
@@ -7356,7 +7356,7 @@
           <a:p>
             <a:fld id="{2EEBA26D-7DBA-4D05-BE08-49D6D89E11A6}" type="datetime1">
               <a:rPr lang="pl-PL" smtClean="0"/>
-              <a:t>28.04.2021</a:t>
+              <a:t>28-04-2021</a:t>
             </a:fld>
             <a:endParaRPr lang="pl-PL"/>
           </a:p>
@@ -7924,7 +7924,7 @@
           <a:p>
             <a:fld id="{7DA14E7E-32E5-4B7E-9FBF-59259785A34C}" type="datetime1">
               <a:rPr lang="pl-PL" smtClean="0"/>
-              <a:t>28.04.2021</a:t>
+              <a:t>28-04-2021</a:t>
             </a:fld>
             <a:endParaRPr lang="pl-PL"/>
           </a:p>
@@ -8605,7 +8605,7 @@
           <a:p>
             <a:fld id="{DC6D9029-CF85-4195-89A6-D4D813FE0520}" type="datetime1">
               <a:rPr lang="pl-PL" smtClean="0"/>
-              <a:t>28.04.2021</a:t>
+              <a:t>28-04-2021</a:t>
             </a:fld>
             <a:endParaRPr lang="pl-PL"/>
           </a:p>
@@ -9518,7 +9518,7 @@
           <a:p>
             <a:fld id="{ABBD1CC0-C232-4B06-9DC1-160FE11F4035}" type="datetime1">
               <a:rPr lang="pl-PL" smtClean="0"/>
-              <a:t>28.04.2021</a:t>
+              <a:t>28-04-2021</a:t>
             </a:fld>
             <a:endParaRPr lang="pl-PL"/>
           </a:p>
@@ -9831,7 +9831,7 @@
           <a:p>
             <a:fld id="{81E484B1-DFFE-4276-B192-1B9A6DF5EC0E}" type="datetime1">
               <a:rPr lang="pl-PL" smtClean="0"/>
-              <a:t>28.04.2021</a:t>
+              <a:t>28-04-2021</a:t>
             </a:fld>
             <a:endParaRPr lang="pl-PL"/>
           </a:p>
@@ -10095,7 +10095,7 @@
           <a:p>
             <a:fld id="{33BAEE17-A6F7-44BA-9EC0-76AF5746B1EC}" type="datetime1">
               <a:rPr lang="pl-PL" smtClean="0"/>
-              <a:t>28.04.2021</a:t>
+              <a:t>28-04-2021</a:t>
             </a:fld>
             <a:endParaRPr lang="pl-PL"/>
           </a:p>
@@ -10418,7 +10418,7 @@
           <a:p>
             <a:fld id="{00EA0D49-4272-43DC-939C-32B7EDDCEC36}" type="datetime1">
               <a:rPr lang="pl-PL" smtClean="0"/>
-              <a:t>28.04.2021</a:t>
+              <a:t>28-04-2021</a:t>
             </a:fld>
             <a:endParaRPr lang="pl-PL"/>
           </a:p>
@@ -10807,7 +10807,7 @@
           <a:p>
             <a:fld id="{656722D7-39BE-489F-9F01-09A9E3FDDD2F}" type="datetime1">
               <a:rPr lang="pl-PL" smtClean="0"/>
-              <a:t>28.04.2021</a:t>
+              <a:t>28-04-2021</a:t>
             </a:fld>
             <a:endParaRPr lang="pl-PL"/>
           </a:p>
@@ -11183,7 +11183,7 @@
           <a:p>
             <a:fld id="{F5CF2885-881F-4D9E-AF34-74178AC3655B}" type="datetime1">
               <a:rPr lang="pl-PL" smtClean="0"/>
-              <a:t>28.04.2021</a:t>
+              <a:t>28-04-2021</a:t>
             </a:fld>
             <a:endParaRPr lang="pl-PL"/>
           </a:p>
@@ -11689,7 +11689,7 @@
           <a:p>
             <a:fld id="{FB3149CE-D561-44B8-8BBE-5242EF0871FB}" type="datetime1">
               <a:rPr lang="pl-PL" smtClean="0"/>
-              <a:t>28.04.2021</a:t>
+              <a:t>28-04-2021</a:t>
             </a:fld>
             <a:endParaRPr lang="pl-PL"/>
           </a:p>
@@ -11946,7 +11946,7 @@
           <a:p>
             <a:fld id="{0E1B7B2A-DE0F-42E2-A5FB-41E57F01A0B7}" type="datetime1">
               <a:rPr lang="pl-PL" smtClean="0"/>
-              <a:t>28.04.2021</a:t>
+              <a:t>28-04-2021</a:t>
             </a:fld>
             <a:endParaRPr lang="pl-PL"/>
           </a:p>
@@ -12109,7 +12109,7 @@
           <a:p>
             <a:fld id="{20E46B1F-0039-4D18-A22A-3894F85ECBDD}" type="datetime1">
               <a:rPr lang="pl-PL" smtClean="0"/>
-              <a:t>28.04.2021</a:t>
+              <a:t>28-04-2021</a:t>
             </a:fld>
             <a:endParaRPr lang="pl-PL"/>
           </a:p>
@@ -12499,7 +12499,7 @@
           <a:p>
             <a:fld id="{6D85D433-2300-4442-89E4-6FA629B02900}" type="datetime1">
               <a:rPr lang="pl-PL" smtClean="0"/>
-              <a:t>28.04.2021</a:t>
+              <a:t>28-04-2021</a:t>
             </a:fld>
             <a:endParaRPr lang="pl-PL"/>
           </a:p>
@@ -12908,7 +12908,7 @@
           <a:p>
             <a:fld id="{B17B109A-54FF-4910-950B-A924814B2F81}" type="datetime1">
               <a:rPr lang="pl-PL" smtClean="0"/>
-              <a:t>28.04.2021</a:t>
+              <a:t>28-04-2021</a:t>
             </a:fld>
             <a:endParaRPr lang="pl-PL"/>
           </a:p>
@@ -13152,7 +13152,7 @@
           <a:p>
             <a:fld id="{9ADAB105-627B-4324-A3EB-EA360819ED9B}" type="datetime1">
               <a:rPr lang="pl-PL" smtClean="0"/>
-              <a:t>28.04.2021</a:t>
+              <a:t>28-04-2021</a:t>
             </a:fld>
             <a:endParaRPr lang="pl-PL"/>
           </a:p>
@@ -17720,7 +17720,7 @@
         </p:spPr>
         <p:txBody>
           <a:bodyPr>
-            <a:normAutofit lnSpcReduction="10000"/>
+            <a:normAutofit/>
           </a:bodyPr>
           <a:lstStyle/>
           <a:p>
@@ -17737,15 +17737,6 @@
               <a:buNone/>
             </a:pPr>
             <a:endParaRPr lang="pl-PL" sz="2800" dirty="0"/>
-          </a:p>
-          <a:p>
-            <a:pPr marL="0" indent="0">
-              <a:buNone/>
-            </a:pPr>
-            <a:r>
-              <a:rPr lang="pl-PL" sz="2800" dirty="0"/>
-              <a:t>Rodzaj przedsiębiorstwa, model biznesowy</a:t>
-            </a:r>
           </a:p>
         </p:txBody>
       </p:sp>
@@ -28181,12 +28172,41 @@
           </a:p>
         </p:txBody>
       </p:sp>
+      <p:sp>
+        <p:nvSpPr>
+          <p:cNvPr id="4" name="Symbol zastępczy numeru slajdu 3">
+            <a:extLst>
+              <a:ext uri="{FF2B5EF4-FFF2-40B4-BE49-F238E27FC236}">
+                <a16:creationId xmlns:a16="http://schemas.microsoft.com/office/drawing/2014/main" id="{1140D038-9B3B-4882-A661-A915007F030D}"/>
+              </a:ext>
+            </a:extLst>
+          </p:cNvPr>
+          <p:cNvSpPr>
+            <a:spLocks noGrp="1"/>
+          </p:cNvSpPr>
+          <p:nvPr>
+            <p:ph type="sldNum" sz="quarter" idx="12"/>
+          </p:nvPr>
+        </p:nvSpPr>
+        <p:spPr/>
+        <p:txBody>
+          <a:bodyPr/>
+          <a:lstStyle/>
+          <a:p>
+            <a:fld id="{73EBA5C1-EA0D-4D38-B474-3131B775EA3E}" type="slidenum">
+              <a:rPr lang="pl-PL" smtClean="0"/>
+              <a:t>5</a:t>
+            </a:fld>
+            <a:endParaRPr lang="pl-PL"/>
+          </a:p>
+        </p:txBody>
+      </p:sp>
       <p:pic>
         <p:nvPicPr>
-          <p:cNvPr id="6" name="Symbol zastępczy zawartości 5">
+          <p:cNvPr id="16" name="Symbol zastępczy zawartości 15">
             <a:extLst>
               <a:ext uri="{FF2B5EF4-FFF2-40B4-BE49-F238E27FC236}">
-                <a16:creationId xmlns:a16="http://schemas.microsoft.com/office/drawing/2014/main" id="{23860A13-0449-4FDF-9049-80B8F3CC4C5E}"/>
+                <a16:creationId xmlns:a16="http://schemas.microsoft.com/office/drawing/2014/main" id="{11432ED4-127A-486D-8D95-2F016EAD7D01}"/>
               </a:ext>
             </a:extLst>
           </p:cNvPr>
@@ -28214,40 +28234,11 @@
         </p:blipFill>
         <p:spPr>
           <a:xfrm>
-            <a:off x="160407" y="2743200"/>
-            <a:ext cx="11753069" cy="3073138"/>
+            <a:off x="125089" y="2733965"/>
+            <a:ext cx="11762898" cy="3075708"/>
           </a:xfrm>
         </p:spPr>
       </p:pic>
-      <p:sp>
-        <p:nvSpPr>
-          <p:cNvPr id="4" name="Symbol zastępczy numeru slajdu 3">
-            <a:extLst>
-              <a:ext uri="{FF2B5EF4-FFF2-40B4-BE49-F238E27FC236}">
-                <a16:creationId xmlns:a16="http://schemas.microsoft.com/office/drawing/2014/main" id="{1140D038-9B3B-4882-A661-A915007F030D}"/>
-              </a:ext>
-            </a:extLst>
-          </p:cNvPr>
-          <p:cNvSpPr>
-            <a:spLocks noGrp="1"/>
-          </p:cNvSpPr>
-          <p:nvPr>
-            <p:ph type="sldNum" sz="quarter" idx="12"/>
-          </p:nvPr>
-        </p:nvSpPr>
-        <p:spPr/>
-        <p:txBody>
-          <a:bodyPr/>
-          <a:lstStyle/>
-          <a:p>
-            <a:fld id="{73EBA5C1-EA0D-4D38-B474-3131B775EA3E}" type="slidenum">
-              <a:rPr lang="pl-PL" smtClean="0"/>
-              <a:t>5</a:t>
-            </a:fld>
-            <a:endParaRPr lang="pl-PL"/>
-          </a:p>
-        </p:txBody>
-      </p:sp>
     </p:spTree>
     <p:extLst>
       <p:ext uri="{BB962C8B-B14F-4D97-AF65-F5344CB8AC3E}">

</xml_diff>

<commit_message>
dodanie zdj do serwisu
</commit_message>
<xml_diff>
--- a/Prezentacja_29.04.pptx
+++ b/Prezentacja_29.04.pptx
@@ -5660,7 +5660,7 @@
           <a:p>
             <a:fld id="{77C7207A-6BEF-41EC-85B3-243D736B3C1C}" type="datetimeFigureOut">
               <a:rPr lang="pl-PL" smtClean="0"/>
-              <a:t>28-04-2021</a:t>
+              <a:t>28.04.2021</a:t>
             </a:fld>
             <a:endParaRPr lang="pl-PL"/>
           </a:p>
@@ -6201,7 +6201,7 @@
           <a:p>
             <a:fld id="{906E2E1F-15FB-4A85-A0E2-DD17BB6BDEE2}" type="datetime1">
               <a:rPr lang="pl-PL" smtClean="0"/>
-              <a:t>28-04-2021</a:t>
+              <a:t>28.04.2021</a:t>
             </a:fld>
             <a:endParaRPr lang="pl-PL"/>
           </a:p>
@@ -6615,7 +6615,7 @@
           <a:p>
             <a:fld id="{04BF9A06-73F2-4084-A96B-CDBA4804ABA9}" type="datetime1">
               <a:rPr lang="pl-PL" smtClean="0"/>
-              <a:t>28-04-2021</a:t>
+              <a:t>28.04.2021</a:t>
             </a:fld>
             <a:endParaRPr lang="pl-PL"/>
           </a:p>
@@ -6951,7 +6951,7 @@
           <a:p>
             <a:fld id="{94657371-091B-4329-9E46-EE3FD16C2124}" type="datetime1">
               <a:rPr lang="pl-PL" smtClean="0"/>
-              <a:t>28-04-2021</a:t>
+              <a:t>28.04.2021</a:t>
             </a:fld>
             <a:endParaRPr lang="pl-PL"/>
           </a:p>
@@ -7356,7 +7356,7 @@
           <a:p>
             <a:fld id="{2EEBA26D-7DBA-4D05-BE08-49D6D89E11A6}" type="datetime1">
               <a:rPr lang="pl-PL" smtClean="0"/>
-              <a:t>28-04-2021</a:t>
+              <a:t>28.04.2021</a:t>
             </a:fld>
             <a:endParaRPr lang="pl-PL"/>
           </a:p>
@@ -7924,7 +7924,7 @@
           <a:p>
             <a:fld id="{7DA14E7E-32E5-4B7E-9FBF-59259785A34C}" type="datetime1">
               <a:rPr lang="pl-PL" smtClean="0"/>
-              <a:t>28-04-2021</a:t>
+              <a:t>28.04.2021</a:t>
             </a:fld>
             <a:endParaRPr lang="pl-PL"/>
           </a:p>
@@ -8605,7 +8605,7 @@
           <a:p>
             <a:fld id="{DC6D9029-CF85-4195-89A6-D4D813FE0520}" type="datetime1">
               <a:rPr lang="pl-PL" smtClean="0"/>
-              <a:t>28-04-2021</a:t>
+              <a:t>28.04.2021</a:t>
             </a:fld>
             <a:endParaRPr lang="pl-PL"/>
           </a:p>
@@ -9518,7 +9518,7 @@
           <a:p>
             <a:fld id="{ABBD1CC0-C232-4B06-9DC1-160FE11F4035}" type="datetime1">
               <a:rPr lang="pl-PL" smtClean="0"/>
-              <a:t>28-04-2021</a:t>
+              <a:t>28.04.2021</a:t>
             </a:fld>
             <a:endParaRPr lang="pl-PL"/>
           </a:p>
@@ -9831,7 +9831,7 @@
           <a:p>
             <a:fld id="{81E484B1-DFFE-4276-B192-1B9A6DF5EC0E}" type="datetime1">
               <a:rPr lang="pl-PL" smtClean="0"/>
-              <a:t>28-04-2021</a:t>
+              <a:t>28.04.2021</a:t>
             </a:fld>
             <a:endParaRPr lang="pl-PL"/>
           </a:p>
@@ -10095,7 +10095,7 @@
           <a:p>
             <a:fld id="{33BAEE17-A6F7-44BA-9EC0-76AF5746B1EC}" type="datetime1">
               <a:rPr lang="pl-PL" smtClean="0"/>
-              <a:t>28-04-2021</a:t>
+              <a:t>28.04.2021</a:t>
             </a:fld>
             <a:endParaRPr lang="pl-PL"/>
           </a:p>
@@ -10418,7 +10418,7 @@
           <a:p>
             <a:fld id="{00EA0D49-4272-43DC-939C-32B7EDDCEC36}" type="datetime1">
               <a:rPr lang="pl-PL" smtClean="0"/>
-              <a:t>28-04-2021</a:t>
+              <a:t>28.04.2021</a:t>
             </a:fld>
             <a:endParaRPr lang="pl-PL"/>
           </a:p>
@@ -10807,7 +10807,7 @@
           <a:p>
             <a:fld id="{656722D7-39BE-489F-9F01-09A9E3FDDD2F}" type="datetime1">
               <a:rPr lang="pl-PL" smtClean="0"/>
-              <a:t>28-04-2021</a:t>
+              <a:t>28.04.2021</a:t>
             </a:fld>
             <a:endParaRPr lang="pl-PL"/>
           </a:p>
@@ -11183,7 +11183,7 @@
           <a:p>
             <a:fld id="{F5CF2885-881F-4D9E-AF34-74178AC3655B}" type="datetime1">
               <a:rPr lang="pl-PL" smtClean="0"/>
-              <a:t>28-04-2021</a:t>
+              <a:t>28.04.2021</a:t>
             </a:fld>
             <a:endParaRPr lang="pl-PL"/>
           </a:p>
@@ -11689,7 +11689,7 @@
           <a:p>
             <a:fld id="{FB3149CE-D561-44B8-8BBE-5242EF0871FB}" type="datetime1">
               <a:rPr lang="pl-PL" smtClean="0"/>
-              <a:t>28-04-2021</a:t>
+              <a:t>28.04.2021</a:t>
             </a:fld>
             <a:endParaRPr lang="pl-PL"/>
           </a:p>
@@ -11946,7 +11946,7 @@
           <a:p>
             <a:fld id="{0E1B7B2A-DE0F-42E2-A5FB-41E57F01A0B7}" type="datetime1">
               <a:rPr lang="pl-PL" smtClean="0"/>
-              <a:t>28-04-2021</a:t>
+              <a:t>28.04.2021</a:t>
             </a:fld>
             <a:endParaRPr lang="pl-PL"/>
           </a:p>
@@ -12109,7 +12109,7 @@
           <a:p>
             <a:fld id="{20E46B1F-0039-4D18-A22A-3894F85ECBDD}" type="datetime1">
               <a:rPr lang="pl-PL" smtClean="0"/>
-              <a:t>28-04-2021</a:t>
+              <a:t>28.04.2021</a:t>
             </a:fld>
             <a:endParaRPr lang="pl-PL"/>
           </a:p>
@@ -12499,7 +12499,7 @@
           <a:p>
             <a:fld id="{6D85D433-2300-4442-89E4-6FA629B02900}" type="datetime1">
               <a:rPr lang="pl-PL" smtClean="0"/>
-              <a:t>28-04-2021</a:t>
+              <a:t>28.04.2021</a:t>
             </a:fld>
             <a:endParaRPr lang="pl-PL"/>
           </a:p>
@@ -12908,7 +12908,7 @@
           <a:p>
             <a:fld id="{B17B109A-54FF-4910-950B-A924814B2F81}" type="datetime1">
               <a:rPr lang="pl-PL" smtClean="0"/>
-              <a:t>28-04-2021</a:t>
+              <a:t>28.04.2021</a:t>
             </a:fld>
             <a:endParaRPr lang="pl-PL"/>
           </a:p>
@@ -13152,7 +13152,7 @@
           <a:p>
             <a:fld id="{9ADAB105-627B-4324-A3EB-EA360819ED9B}" type="datetime1">
               <a:rPr lang="pl-PL" smtClean="0"/>
-              <a:t>28-04-2021</a:t>
+              <a:t>28.04.2021</a:t>
             </a:fld>
             <a:endParaRPr lang="pl-PL"/>
           </a:p>
@@ -14216,6 +14216,41 @@
 <file path=ppt/slides/slide13.xml><?xml version="1.0" encoding="utf-8"?>
 <p:sld xmlns:a="http://schemas.openxmlformats.org/drawingml/2006/main" xmlns:r="http://schemas.openxmlformats.org/officeDocument/2006/relationships" xmlns:p="http://schemas.openxmlformats.org/presentationml/2006/main">
   <p:cSld>
+    <p:bg>
+      <p:bgPr>
+        <a:gradFill rotWithShape="1">
+          <a:gsLst>
+            <a:gs pos="0">
+              <a:schemeClr val="bg2">
+                <a:tint val="96000"/>
+                <a:shade val="100000"/>
+                <a:hueMod val="270000"/>
+                <a:satMod val="200000"/>
+                <a:lumMod val="128000"/>
+              </a:schemeClr>
+            </a:gs>
+            <a:gs pos="50000">
+              <a:schemeClr val="bg2">
+                <a:shade val="100000"/>
+                <a:hueMod val="100000"/>
+                <a:satMod val="110000"/>
+                <a:lumMod val="130000"/>
+              </a:schemeClr>
+            </a:gs>
+            <a:gs pos="100000">
+              <a:schemeClr val="bg2">
+                <a:shade val="78000"/>
+                <a:hueMod val="44000"/>
+                <a:satMod val="200000"/>
+                <a:lumMod val="69000"/>
+              </a:schemeClr>
+            </a:gs>
+          </a:gsLst>
+          <a:lin ang="2520000" scaled="0"/>
+        </a:gradFill>
+        <a:effectLst/>
+      </p:bgPr>
+    </p:bg>
     <p:spTree>
       <p:nvGrpSpPr>
         <p:cNvPr id="1" name=""/>
@@ -14246,15 +14281,76 @@
             <p:ph type="title"/>
           </p:nvPr>
         </p:nvSpPr>
-        <p:spPr/>
+        <p:spPr>
+          <a:xfrm>
+            <a:off x="680321" y="753228"/>
+            <a:ext cx="9613861" cy="1080938"/>
+          </a:xfrm>
+        </p:spPr>
         <p:txBody>
-          <a:bodyPr/>
+          <a:bodyPr>
+            <a:normAutofit/>
+          </a:bodyPr>
           <a:lstStyle/>
           <a:p>
             <a:r>
               <a:rPr lang="pl-PL"/>
               <a:t>Serwisowanie</a:t>
             </a:r>
+          </a:p>
+        </p:txBody>
+      </p:sp>
+      <p:sp>
+        <p:nvSpPr>
+          <p:cNvPr id="4" name="Symbol zastępczy numeru slajdu 3">
+            <a:extLst>
+              <a:ext uri="{FF2B5EF4-FFF2-40B4-BE49-F238E27FC236}">
+                <a16:creationId xmlns:a16="http://schemas.microsoft.com/office/drawing/2014/main" id="{5247EC12-22CF-42D5-B413-D4BFB5A256F7}"/>
+              </a:ext>
+            </a:extLst>
+          </p:cNvPr>
+          <p:cNvSpPr>
+            <a:spLocks noGrp="1"/>
+          </p:cNvSpPr>
+          <p:nvPr>
+            <p:ph type="sldNum" sz="quarter" idx="12"/>
+          </p:nvPr>
+        </p:nvSpPr>
+        <p:spPr>
+          <a:xfrm>
+            <a:off x="10729455" y="753227"/>
+            <a:ext cx="1154151" cy="1090789"/>
+          </a:xfrm>
+        </p:spPr>
+        <p:txBody>
+          <a:bodyPr>
+            <a:normAutofit/>
+          </a:bodyPr>
+          <a:lstStyle/>
+          <a:p>
+            <a:pPr>
+              <a:spcAft>
+                <a:spcPts val="600"/>
+              </a:spcAft>
+            </a:pPr>
+            <a:fld id="{73EBA5C1-EA0D-4D38-B474-3131B775EA3E}" type="slidenum">
+              <a:rPr lang="pl-PL">
+                <a:solidFill>
+                  <a:srgbClr val="FFFFFF"/>
+                </a:solidFill>
+              </a:rPr>
+              <a:pPr>
+                <a:spcAft>
+                  <a:spcPts val="600"/>
+                </a:spcAft>
+              </a:pPr>
+              <a:t>13</a:t>
+            </a:fld>
+            <a:endParaRPr lang="pl-PL">
+              <a:solidFill>
+                <a:srgbClr val="FFFFFF"/>
+              </a:solidFill>
+            </a:endParaRPr>
           </a:p>
         </p:txBody>
       </p:sp>
@@ -14274,54 +14370,71 @@
             <p:ph idx="1"/>
           </p:nvPr>
         </p:nvSpPr>
-        <p:spPr/>
+        <p:spPr>
+          <a:xfrm>
+            <a:off x="680322" y="2336873"/>
+            <a:ext cx="3489341" cy="3599316"/>
+          </a:xfrm>
+        </p:spPr>
         <p:txBody>
-          <a:bodyPr/>
+          <a:bodyPr>
+            <a:normAutofit/>
+          </a:bodyPr>
           <a:lstStyle/>
           <a:p>
-            <a:pPr algn="just"/>
-            <a:r>
-              <a:rPr lang="pl-PL" dirty="0"/>
+            <a:r>
+              <a:rPr lang="pl-PL" sz="1800"/>
               <a:t>Eksploatacja prowadzona jest według planowanej profilaktyki. Obsługa (przegląd) profilaktyczny maszyn wykonywany jest przez zewnętrzną firmę, okresowe i bieżące przeglądy wykonywane są w naszym przedsiębiorstwie. Obsługa bieżąca – raz w tygodniu, okresowa – raz na trzy miesiące, przegląd profilaktyczny – raz na rok.</a:t>
             </a:r>
           </a:p>
           <a:p>
-            <a:pPr marL="0" indent="0" algn="just">
+            <a:pPr marL="0" indent="0">
               <a:buNone/>
             </a:pPr>
-            <a:endParaRPr lang="pl-PL" dirty="0"/>
+            <a:endParaRPr lang="pl-PL" sz="1800"/>
           </a:p>
         </p:txBody>
       </p:sp>
-      <p:sp>
-        <p:nvSpPr>
-          <p:cNvPr id="4" name="Symbol zastępczy numeru slajdu 3">
+      <p:pic>
+        <p:nvPicPr>
+          <p:cNvPr id="6" name="Obraz 5">
             <a:extLst>
               <a:ext uri="{FF2B5EF4-FFF2-40B4-BE49-F238E27FC236}">
-                <a16:creationId xmlns:a16="http://schemas.microsoft.com/office/drawing/2014/main" id="{5247EC12-22CF-42D5-B413-D4BFB5A256F7}"/>
+                <a16:creationId xmlns:a16="http://schemas.microsoft.com/office/drawing/2014/main" id="{601CBEEC-E2E2-4289-926B-CC356AAA5B28}"/>
               </a:ext>
             </a:extLst>
           </p:cNvPr>
-          <p:cNvSpPr>
-            <a:spLocks noGrp="1"/>
-          </p:cNvSpPr>
-          <p:nvPr>
-            <p:ph type="sldNum" sz="quarter" idx="12"/>
-          </p:nvPr>
-        </p:nvSpPr>
-        <p:spPr/>
-        <p:txBody>
-          <a:bodyPr/>
-          <a:lstStyle/>
-          <a:p>
-            <a:fld id="{73EBA5C1-EA0D-4D38-B474-3131B775EA3E}" type="slidenum">
-              <a:rPr lang="pl-PL" smtClean="0"/>
-              <a:t>13</a:t>
-            </a:fld>
-            <a:endParaRPr lang="pl-PL"/>
-          </a:p>
-        </p:txBody>
-      </p:sp>
+          <p:cNvPicPr>
+            <a:picLocks noChangeAspect="1"/>
+          </p:cNvPicPr>
+          <p:nvPr/>
+        </p:nvPicPr>
+        <p:blipFill>
+          <a:blip r:embed="rId2"/>
+          <a:stretch>
+            <a:fillRect/>
+          </a:stretch>
+        </p:blipFill>
+        <p:spPr>
+          <a:xfrm>
+            <a:off x="4267132" y="2153265"/>
+            <a:ext cx="7624168" cy="4498258"/>
+          </a:xfrm>
+          <a:prstGeom prst="rect">
+            <a:avLst/>
+          </a:prstGeom>
+          <a:ln>
+            <a:noFill/>
+          </a:ln>
+          <a:effectLst>
+            <a:outerShdw blurRad="76200" dist="63500" dir="5040000" algn="tl" rotWithShape="0">
+              <a:srgbClr val="000000">
+                <a:alpha val="41000"/>
+              </a:srgbClr>
+            </a:outerShdw>
+          </a:effectLst>
+        </p:spPr>
+      </p:pic>
     </p:spTree>
     <p:extLst>
       <p:ext uri="{BB962C8B-B14F-4D97-AF65-F5344CB8AC3E}">

</xml_diff>

<commit_message>
Wprowadzenie zmian w 2 slajdzie
</commit_message>
<xml_diff>
--- a/Prezentacja_29.04.pptx
+++ b/Prezentacja_29.04.pptx
@@ -5660,7 +5660,7 @@
           <a:p>
             <a:fld id="{77C7207A-6BEF-41EC-85B3-243D736B3C1C}" type="datetimeFigureOut">
               <a:rPr lang="pl-PL" smtClean="0"/>
-              <a:t>28-04-2021</a:t>
+              <a:t>28.04.2021</a:t>
             </a:fld>
             <a:endParaRPr lang="pl-PL"/>
           </a:p>
@@ -6201,7 +6201,7 @@
           <a:p>
             <a:fld id="{906E2E1F-15FB-4A85-A0E2-DD17BB6BDEE2}" type="datetime1">
               <a:rPr lang="pl-PL" smtClean="0"/>
-              <a:t>28-04-2021</a:t>
+              <a:t>28.04.2021</a:t>
             </a:fld>
             <a:endParaRPr lang="pl-PL"/>
           </a:p>
@@ -6615,7 +6615,7 @@
           <a:p>
             <a:fld id="{04BF9A06-73F2-4084-A96B-CDBA4804ABA9}" type="datetime1">
               <a:rPr lang="pl-PL" smtClean="0"/>
-              <a:t>28-04-2021</a:t>
+              <a:t>28.04.2021</a:t>
             </a:fld>
             <a:endParaRPr lang="pl-PL"/>
           </a:p>
@@ -6951,7 +6951,7 @@
           <a:p>
             <a:fld id="{94657371-091B-4329-9E46-EE3FD16C2124}" type="datetime1">
               <a:rPr lang="pl-PL" smtClean="0"/>
-              <a:t>28-04-2021</a:t>
+              <a:t>28.04.2021</a:t>
             </a:fld>
             <a:endParaRPr lang="pl-PL"/>
           </a:p>
@@ -7356,7 +7356,7 @@
           <a:p>
             <a:fld id="{2EEBA26D-7DBA-4D05-BE08-49D6D89E11A6}" type="datetime1">
               <a:rPr lang="pl-PL" smtClean="0"/>
-              <a:t>28-04-2021</a:t>
+              <a:t>28.04.2021</a:t>
             </a:fld>
             <a:endParaRPr lang="pl-PL"/>
           </a:p>
@@ -7924,7 +7924,7 @@
           <a:p>
             <a:fld id="{7DA14E7E-32E5-4B7E-9FBF-59259785A34C}" type="datetime1">
               <a:rPr lang="pl-PL" smtClean="0"/>
-              <a:t>28-04-2021</a:t>
+              <a:t>28.04.2021</a:t>
             </a:fld>
             <a:endParaRPr lang="pl-PL"/>
           </a:p>
@@ -8605,7 +8605,7 @@
           <a:p>
             <a:fld id="{DC6D9029-CF85-4195-89A6-D4D813FE0520}" type="datetime1">
               <a:rPr lang="pl-PL" smtClean="0"/>
-              <a:t>28-04-2021</a:t>
+              <a:t>28.04.2021</a:t>
             </a:fld>
             <a:endParaRPr lang="pl-PL"/>
           </a:p>
@@ -9518,7 +9518,7 @@
           <a:p>
             <a:fld id="{ABBD1CC0-C232-4B06-9DC1-160FE11F4035}" type="datetime1">
               <a:rPr lang="pl-PL" smtClean="0"/>
-              <a:t>28-04-2021</a:t>
+              <a:t>28.04.2021</a:t>
             </a:fld>
             <a:endParaRPr lang="pl-PL"/>
           </a:p>
@@ -9831,7 +9831,7 @@
           <a:p>
             <a:fld id="{81E484B1-DFFE-4276-B192-1B9A6DF5EC0E}" type="datetime1">
               <a:rPr lang="pl-PL" smtClean="0"/>
-              <a:t>28-04-2021</a:t>
+              <a:t>28.04.2021</a:t>
             </a:fld>
             <a:endParaRPr lang="pl-PL"/>
           </a:p>
@@ -10095,7 +10095,7 @@
           <a:p>
             <a:fld id="{33BAEE17-A6F7-44BA-9EC0-76AF5746B1EC}" type="datetime1">
               <a:rPr lang="pl-PL" smtClean="0"/>
-              <a:t>28-04-2021</a:t>
+              <a:t>28.04.2021</a:t>
             </a:fld>
             <a:endParaRPr lang="pl-PL"/>
           </a:p>
@@ -10418,7 +10418,7 @@
           <a:p>
             <a:fld id="{00EA0D49-4272-43DC-939C-32B7EDDCEC36}" type="datetime1">
               <a:rPr lang="pl-PL" smtClean="0"/>
-              <a:t>28-04-2021</a:t>
+              <a:t>28.04.2021</a:t>
             </a:fld>
             <a:endParaRPr lang="pl-PL"/>
           </a:p>
@@ -10807,7 +10807,7 @@
           <a:p>
             <a:fld id="{656722D7-39BE-489F-9F01-09A9E3FDDD2F}" type="datetime1">
               <a:rPr lang="pl-PL" smtClean="0"/>
-              <a:t>28-04-2021</a:t>
+              <a:t>28.04.2021</a:t>
             </a:fld>
             <a:endParaRPr lang="pl-PL"/>
           </a:p>
@@ -11183,7 +11183,7 @@
           <a:p>
             <a:fld id="{F5CF2885-881F-4D9E-AF34-74178AC3655B}" type="datetime1">
               <a:rPr lang="pl-PL" smtClean="0"/>
-              <a:t>28-04-2021</a:t>
+              <a:t>28.04.2021</a:t>
             </a:fld>
             <a:endParaRPr lang="pl-PL"/>
           </a:p>
@@ -11689,7 +11689,7 @@
           <a:p>
             <a:fld id="{FB3149CE-D561-44B8-8BBE-5242EF0871FB}" type="datetime1">
               <a:rPr lang="pl-PL" smtClean="0"/>
-              <a:t>28-04-2021</a:t>
+              <a:t>28.04.2021</a:t>
             </a:fld>
             <a:endParaRPr lang="pl-PL"/>
           </a:p>
@@ -11946,7 +11946,7 @@
           <a:p>
             <a:fld id="{0E1B7B2A-DE0F-42E2-A5FB-41E57F01A0B7}" type="datetime1">
               <a:rPr lang="pl-PL" smtClean="0"/>
-              <a:t>28-04-2021</a:t>
+              <a:t>28.04.2021</a:t>
             </a:fld>
             <a:endParaRPr lang="pl-PL"/>
           </a:p>
@@ -12109,7 +12109,7 @@
           <a:p>
             <a:fld id="{20E46B1F-0039-4D18-A22A-3894F85ECBDD}" type="datetime1">
               <a:rPr lang="pl-PL" smtClean="0"/>
-              <a:t>28-04-2021</a:t>
+              <a:t>28.04.2021</a:t>
             </a:fld>
             <a:endParaRPr lang="pl-PL"/>
           </a:p>
@@ -12499,7 +12499,7 @@
           <a:p>
             <a:fld id="{6D85D433-2300-4442-89E4-6FA629B02900}" type="datetime1">
               <a:rPr lang="pl-PL" smtClean="0"/>
-              <a:t>28-04-2021</a:t>
+              <a:t>28.04.2021</a:t>
             </a:fld>
             <a:endParaRPr lang="pl-PL"/>
           </a:p>
@@ -12908,7 +12908,7 @@
           <a:p>
             <a:fld id="{B17B109A-54FF-4910-950B-A924814B2F81}" type="datetime1">
               <a:rPr lang="pl-PL" smtClean="0"/>
-              <a:t>28-04-2021</a:t>
+              <a:t>28.04.2021</a:t>
             </a:fld>
             <a:endParaRPr lang="pl-PL"/>
           </a:p>
@@ -13152,7 +13152,7 @@
           <a:p>
             <a:fld id="{9ADAB105-627B-4324-A3EB-EA360819ED9B}" type="datetime1">
               <a:rPr lang="pl-PL" smtClean="0"/>
-              <a:t>28-04-2021</a:t>
+              <a:t>28.04.2021</a:t>
             </a:fld>
             <a:endParaRPr lang="pl-PL"/>
           </a:p>
@@ -17764,7 +17764,7 @@
 </file>
 
 <file path=ppt/slides/slide2.xml><?xml version="1.0" encoding="utf-8"?>
-<p:sld xmlns:a="http://schemas.openxmlformats.org/drawingml/2006/main" xmlns:r="http://schemas.openxmlformats.org/officeDocument/2006/relationships" xmlns:p="http://schemas.openxmlformats.org/presentationml/2006/main">
+<p:sld xmlns:a="http://schemas.openxmlformats.org/drawingml/2006/main" xmlns:r="http://schemas.openxmlformats.org/officeDocument/2006/relationships" xmlns:p="http://schemas.openxmlformats.org/presentationml/2006/main" show="0">
   <p:cSld>
     <p:spTree>
       <p:nvGrpSpPr>
@@ -17803,8 +17803,8 @@
           <a:p>
             <a:pPr algn="ctr"/>
             <a:r>
-              <a:rPr lang="pl-PL"/>
-              <a:t>Firma</a:t>
+              <a:rPr lang="pl-PL" dirty="0"/>
+              <a:t>Przedsiębiorstwo</a:t>
             </a:r>
           </a:p>
         </p:txBody>

</xml_diff>

<commit_message>
Wprowadzenie zmian numeracji slajdów
</commit_message>
<xml_diff>
--- a/Prezentacja_29.04.pptx
+++ b/Prezentacja_29.04.pptx
@@ -13959,11 +13959,10 @@
           <a:bodyPr/>
           <a:lstStyle/>
           <a:p>
-            <a:fld id="{73EBA5C1-EA0D-4D38-B474-3131B775EA3E}" type="slidenum">
-              <a:rPr lang="pl-PL" smtClean="0"/>
-              <a:t>10</a:t>
-            </a:fld>
-            <a:endParaRPr lang="pl-PL"/>
+            <a:r>
+              <a:rPr lang="pl-PL" dirty="0"/>
+              <a:t>7</a:t>
+            </a:r>
           </a:p>
         </p:txBody>
       </p:sp>
@@ -14333,24 +14332,14 @@
                 <a:spcPts val="600"/>
               </a:spcAft>
             </a:pPr>
-            <a:fld id="{73EBA5C1-EA0D-4D38-B474-3131B775EA3E}" type="slidenum">
-              <a:rPr lang="pl-PL">
+            <a:r>
+              <a:rPr lang="pl-PL" dirty="0">
                 <a:solidFill>
                   <a:srgbClr val="FFFFFF"/>
                 </a:solidFill>
               </a:rPr>
-              <a:pPr>
-                <a:spcAft>
-                  <a:spcPts val="600"/>
-                </a:spcAft>
-              </a:pPr>
-              <a:t>13</a:t>
-            </a:fld>
-            <a:endParaRPr lang="pl-PL">
-              <a:solidFill>
-                <a:srgbClr val="FFFFFF"/>
-              </a:solidFill>
-            </a:endParaRPr>
+              <a:t>8</a:t>
+            </a:r>
           </a:p>
         </p:txBody>
       </p:sp>
@@ -21163,11 +21152,10 @@
           <a:bodyPr/>
           <a:lstStyle/>
           <a:p>
-            <a:fld id="{73EBA5C1-EA0D-4D38-B474-3131B775EA3E}" type="slidenum">
-              <a:rPr lang="pl-PL" smtClean="0"/>
-              <a:t>20</a:t>
-            </a:fld>
-            <a:endParaRPr lang="pl-PL"/>
+            <a:r>
+              <a:rPr lang="pl-PL" dirty="0"/>
+              <a:t>9</a:t>
+            </a:r>
           </a:p>
         </p:txBody>
       </p:sp>
@@ -21793,11 +21781,10 @@
           <a:bodyPr/>
           <a:lstStyle/>
           <a:p>
-            <a:fld id="{73EBA5C1-EA0D-4D38-B474-3131B775EA3E}" type="slidenum">
-              <a:rPr lang="pl-PL" smtClean="0"/>
-              <a:t>23</a:t>
-            </a:fld>
-            <a:endParaRPr lang="pl-PL"/>
+            <a:r>
+              <a:rPr lang="pl-PL" dirty="0"/>
+              <a:t>10</a:t>
+            </a:r>
           </a:p>
         </p:txBody>
       </p:sp>
@@ -22112,11 +22099,10 @@
           <a:bodyPr/>
           <a:lstStyle/>
           <a:p>
-            <a:fld id="{73EBA5C1-EA0D-4D38-B474-3131B775EA3E}" type="slidenum">
-              <a:rPr lang="pl-PL" smtClean="0"/>
-              <a:t>25</a:t>
-            </a:fld>
-            <a:endParaRPr lang="pl-PL"/>
+            <a:r>
+              <a:rPr lang="pl-PL" dirty="0"/>
+              <a:t>11</a:t>
+            </a:r>
           </a:p>
         </p:txBody>
       </p:sp>
@@ -22329,11 +22315,10 @@
           <a:bodyPr/>
           <a:lstStyle/>
           <a:p>
-            <a:fld id="{73EBA5C1-EA0D-4D38-B474-3131B775EA3E}" type="slidenum">
-              <a:rPr lang="pl-PL" smtClean="0"/>
-              <a:t>26</a:t>
-            </a:fld>
-            <a:endParaRPr lang="pl-PL"/>
+            <a:r>
+              <a:rPr lang="pl-PL" dirty="0"/>
+              <a:t>12</a:t>
+            </a:r>
           </a:p>
         </p:txBody>
       </p:sp>
@@ -22487,11 +22472,10 @@
           <a:bodyPr/>
           <a:lstStyle/>
           <a:p>
-            <a:fld id="{73EBA5C1-EA0D-4D38-B474-3131B775EA3E}" type="slidenum">
-              <a:rPr lang="pl-PL" smtClean="0"/>
-              <a:t>27</a:t>
-            </a:fld>
-            <a:endParaRPr lang="pl-PL"/>
+            <a:r>
+              <a:rPr lang="pl-PL" dirty="0"/>
+              <a:t>13</a:t>
+            </a:r>
           </a:p>
         </p:txBody>
       </p:sp>
@@ -22704,11 +22688,10 @@
           <a:bodyPr/>
           <a:lstStyle/>
           <a:p>
-            <a:fld id="{73EBA5C1-EA0D-4D38-B474-3131B775EA3E}" type="slidenum">
-              <a:rPr lang="pl-PL" smtClean="0"/>
-              <a:t>28</a:t>
-            </a:fld>
-            <a:endParaRPr lang="pl-PL"/>
+            <a:r>
+              <a:rPr lang="pl-PL" dirty="0"/>
+              <a:t>14</a:t>
+            </a:r>
           </a:p>
         </p:txBody>
       </p:sp>
@@ -23430,20 +23413,15 @@
                 <a:spcPts val="600"/>
               </a:spcAft>
             </a:pPr>
-            <a:fld id="{73EBA5C1-EA0D-4D38-B474-3131B775EA3E}" type="slidenum">
-              <a:rPr lang="en-US" sz="1400">
+            <a:r>
+              <a:rPr lang="pl-PL" sz="1400" dirty="0">
                 <a:solidFill>
                   <a:srgbClr val="FFFFFF"/>
                 </a:solidFill>
               </a:rPr>
-              <a:pPr defTabSz="914400">
-                <a:spcAft>
-                  <a:spcPts val="600"/>
-                </a:spcAft>
-              </a:pPr>
-              <a:t>29</a:t>
-            </a:fld>
-            <a:endParaRPr lang="en-US" sz="1400">
+              <a:t>15</a:t>
+            </a:r>
+            <a:endParaRPr lang="en-US" sz="1400" dirty="0">
               <a:solidFill>
                 <a:srgbClr val="FFFFFF"/>
               </a:solidFill>
@@ -23575,11 +23553,10 @@
           <a:bodyPr/>
           <a:lstStyle/>
           <a:p>
-            <a:fld id="{73EBA5C1-EA0D-4D38-B474-3131B775EA3E}" type="slidenum">
-              <a:rPr lang="pl-PL" smtClean="0"/>
-              <a:t>3</a:t>
-            </a:fld>
-            <a:endParaRPr lang="pl-PL"/>
+            <a:r>
+              <a:rPr lang="pl-PL" dirty="0"/>
+              <a:t>2</a:t>
+            </a:r>
           </a:p>
         </p:txBody>
       </p:sp>
@@ -24284,20 +24261,15 @@
                 <a:spcPts val="600"/>
               </a:spcAft>
             </a:pPr>
-            <a:fld id="{73EBA5C1-EA0D-4D38-B474-3131B775EA3E}" type="slidenum">
-              <a:rPr lang="en-US" sz="1400">
+            <a:r>
+              <a:rPr lang="pl-PL" sz="1400" dirty="0">
                 <a:solidFill>
                   <a:srgbClr val="FFFFFF"/>
                 </a:solidFill>
               </a:rPr>
-              <a:pPr defTabSz="914400">
-                <a:spcAft>
-                  <a:spcPts val="600"/>
-                </a:spcAft>
-              </a:pPr>
-              <a:t>30</a:t>
-            </a:fld>
-            <a:endParaRPr lang="en-US" sz="1400">
+              <a:t>16</a:t>
+            </a:r>
+            <a:endParaRPr lang="en-US" sz="1400" dirty="0">
               <a:solidFill>
                 <a:srgbClr val="FFFFFF"/>
               </a:solidFill>
@@ -25737,20 +25709,15 @@
                 <a:spcPts val="600"/>
               </a:spcAft>
             </a:pPr>
-            <a:fld id="{73EBA5C1-EA0D-4D38-B474-3131B775EA3E}" type="slidenum">
-              <a:rPr lang="en-US" sz="1400">
+            <a:r>
+              <a:rPr lang="pl-PL" sz="1400" dirty="0">
                 <a:solidFill>
                   <a:srgbClr val="FFFFFF"/>
                 </a:solidFill>
               </a:rPr>
-              <a:pPr defTabSz="914400">
-                <a:spcAft>
-                  <a:spcPts val="600"/>
-                </a:spcAft>
-              </a:pPr>
-              <a:t>32</a:t>
-            </a:fld>
-            <a:endParaRPr lang="en-US" sz="1400">
+              <a:t>17</a:t>
+            </a:r>
+            <a:endParaRPr lang="en-US" sz="1400" dirty="0">
               <a:solidFill>
                 <a:srgbClr val="FFFFFF"/>
               </a:solidFill>
@@ -26459,20 +26426,15 @@
                 <a:spcPts val="600"/>
               </a:spcAft>
             </a:pPr>
-            <a:fld id="{73EBA5C1-EA0D-4D38-B474-3131B775EA3E}" type="slidenum">
-              <a:rPr lang="en-US" sz="1400">
+            <a:r>
+              <a:rPr lang="pl-PL" sz="1400" dirty="0">
                 <a:solidFill>
                   <a:srgbClr val="FFFFFF"/>
                 </a:solidFill>
               </a:rPr>
-              <a:pPr defTabSz="914400">
-                <a:spcAft>
-                  <a:spcPts val="600"/>
-                </a:spcAft>
-              </a:pPr>
-              <a:t>33</a:t>
-            </a:fld>
-            <a:endParaRPr lang="en-US" sz="1400">
+              <a:t>18</a:t>
+            </a:r>
+            <a:endParaRPr lang="en-US" sz="1400" dirty="0">
               <a:solidFill>
                 <a:srgbClr val="FFFFFF"/>
               </a:solidFill>
@@ -26560,11 +26522,10 @@
           <a:bodyPr/>
           <a:lstStyle/>
           <a:p>
-            <a:fld id="{73EBA5C1-EA0D-4D38-B474-3131B775EA3E}" type="slidenum">
-              <a:rPr lang="pl-PL" smtClean="0"/>
-              <a:t>34</a:t>
-            </a:fld>
-            <a:endParaRPr lang="pl-PL"/>
+            <a:r>
+              <a:rPr lang="pl-PL" dirty="0"/>
+              <a:t>19</a:t>
+            </a:r>
           </a:p>
         </p:txBody>
       </p:sp>
@@ -27308,20 +27269,15 @@
                 <a:spcPts val="600"/>
               </a:spcAft>
             </a:pPr>
-            <a:fld id="{73EBA5C1-EA0D-4D38-B474-3131B775EA3E}" type="slidenum">
-              <a:rPr lang="en-US" sz="1400">
+            <a:r>
+              <a:rPr lang="pl-PL" sz="1400" dirty="0">
                 <a:solidFill>
                   <a:srgbClr val="FFFFFF"/>
                 </a:solidFill>
               </a:rPr>
-              <a:pPr defTabSz="914400">
-                <a:spcAft>
-                  <a:spcPts val="600"/>
-                </a:spcAft>
-              </a:pPr>
-              <a:t>35</a:t>
-            </a:fld>
-            <a:endParaRPr lang="en-US" sz="1400">
+              <a:t>20</a:t>
+            </a:r>
+            <a:endParaRPr lang="en-US" sz="1400" dirty="0">
               <a:solidFill>
                 <a:srgbClr val="FFFFFF"/>
               </a:solidFill>
@@ -28037,20 +27993,15 @@
                 <a:spcPts val="600"/>
               </a:spcAft>
             </a:pPr>
-            <a:fld id="{73EBA5C1-EA0D-4D38-B474-3131B775EA3E}" type="slidenum">
-              <a:rPr lang="en-US" sz="1400">
+            <a:r>
+              <a:rPr lang="pl-PL" sz="1400" dirty="0">
                 <a:solidFill>
                   <a:srgbClr val="FFFFFF"/>
                 </a:solidFill>
               </a:rPr>
-              <a:pPr defTabSz="914400">
-                <a:spcAft>
-                  <a:spcPts val="600"/>
-                </a:spcAft>
-              </a:pPr>
-              <a:t>36</a:t>
-            </a:fld>
-            <a:endParaRPr lang="en-US" sz="1400">
+              <a:t>21</a:t>
+            </a:r>
+            <a:endParaRPr lang="en-US" sz="1400" dirty="0">
               <a:solidFill>
                 <a:srgbClr val="FFFFFF"/>
               </a:solidFill>
@@ -28219,11 +28170,10 @@
           <a:bodyPr/>
           <a:lstStyle/>
           <a:p>
-            <a:fld id="{73EBA5C1-EA0D-4D38-B474-3131B775EA3E}" type="slidenum">
-              <a:rPr lang="pl-PL" smtClean="0"/>
-              <a:t>4</a:t>
-            </a:fld>
-            <a:endParaRPr lang="pl-PL"/>
+            <a:r>
+              <a:rPr lang="pl-PL" dirty="0"/>
+              <a:t>3</a:t>
+            </a:r>
           </a:p>
         </p:txBody>
       </p:sp>
@@ -28306,11 +28256,10 @@
           <a:bodyPr/>
           <a:lstStyle/>
           <a:p>
-            <a:fld id="{73EBA5C1-EA0D-4D38-B474-3131B775EA3E}" type="slidenum">
-              <a:rPr lang="pl-PL" smtClean="0"/>
-              <a:t>5</a:t>
-            </a:fld>
-            <a:endParaRPr lang="pl-PL"/>
+            <a:r>
+              <a:rPr lang="pl-PL" dirty="0"/>
+              <a:t>4</a:t>
+            </a:r>
           </a:p>
         </p:txBody>
       </p:sp>
@@ -28670,11 +28619,10 @@
           <a:bodyPr/>
           <a:lstStyle/>
           <a:p>
-            <a:fld id="{73EBA5C1-EA0D-4D38-B474-3131B775EA3E}" type="slidenum">
-              <a:rPr lang="pl-PL" smtClean="0"/>
-              <a:t>7</a:t>
-            </a:fld>
-            <a:endParaRPr lang="pl-PL"/>
+            <a:r>
+              <a:rPr lang="pl-PL" dirty="0"/>
+              <a:t>5</a:t>
+            </a:r>
           </a:p>
         </p:txBody>
       </p:sp>
@@ -28848,11 +28796,10 @@
           <a:bodyPr/>
           <a:lstStyle/>
           <a:p>
-            <a:fld id="{73EBA5C1-EA0D-4D38-B474-3131B775EA3E}" type="slidenum">
-              <a:rPr lang="pl-PL" smtClean="0"/>
-              <a:t>8</a:t>
-            </a:fld>
-            <a:endParaRPr lang="pl-PL"/>
+            <a:r>
+              <a:rPr lang="pl-PL" dirty="0"/>
+              <a:t>6</a:t>
+            </a:r>
           </a:p>
         </p:txBody>
       </p:sp>

</xml_diff>

<commit_message>
Poprawka w prezentacji i VS
</commit_message>
<xml_diff>
--- a/Prezentacja_29.04.pptx
+++ b/Prezentacja_29.04.pptx
@@ -25023,35 +25023,6 @@
       </p:sp>
       <p:pic>
         <p:nvPicPr>
-          <p:cNvPr id="9" name="Symbol zastępczy zawartości 8">
-            <a:extLst>
-              <a:ext uri="{FF2B5EF4-FFF2-40B4-BE49-F238E27FC236}">
-                <a16:creationId xmlns:a16="http://schemas.microsoft.com/office/drawing/2014/main" id="{E81A251A-3DA2-4749-B7E0-B69ACCD0120E}"/>
-              </a:ext>
-            </a:extLst>
-          </p:cNvPr>
-          <p:cNvPicPr>
-            <a:picLocks noGrp="1" noChangeAspect="1"/>
-          </p:cNvPicPr>
-          <p:nvPr>
-            <p:ph idx="1"/>
-          </p:nvPr>
-        </p:nvPicPr>
-        <p:blipFill>
-          <a:blip r:embed="rId4"/>
-          <a:stretch>
-            <a:fillRect/>
-          </a:stretch>
-        </p:blipFill>
-        <p:spPr>
-          <a:xfrm>
-            <a:off x="302679" y="3294855"/>
-            <a:ext cx="6673156" cy="2295484"/>
-          </a:xfrm>
-        </p:spPr>
-      </p:pic>
-      <p:pic>
-        <p:nvPicPr>
           <p:cNvPr id="12" name="Grafika 11">
             <a:extLst>
               <a:ext uri="{FF2B5EF4-FFF2-40B4-BE49-F238E27FC236}">
@@ -25065,13 +25036,13 @@
           <p:nvPr/>
         </p:nvPicPr>
         <p:blipFill>
-          <a:blip r:embed="rId5">
+          <a:blip r:embed="rId4">
             <a:extLst>
               <a:ext uri="{28A0092B-C50C-407E-A947-70E740481C1C}">
                 <a14:useLocalDpi xmlns:a14="http://schemas.microsoft.com/office/drawing/2010/main" val="0"/>
               </a:ext>
               <a:ext uri="{96DAC541-7B7A-43D3-8B79-37D633B846F1}">
-                <asvg:svgBlip xmlns:asvg="http://schemas.microsoft.com/office/drawing/2016/SVG/main" r:embed="rId6"/>
+                <asvg:svgBlip xmlns:asvg="http://schemas.microsoft.com/office/drawing/2016/SVG/main" r:embed="rId5"/>
               </a:ext>
             </a:extLst>
           </a:blip>
@@ -25087,6 +25058,35 @@
           <a:prstGeom prst="rect">
             <a:avLst/>
           </a:prstGeom>
+        </p:spPr>
+      </p:pic>
+      <p:pic>
+        <p:nvPicPr>
+          <p:cNvPr id="7" name="Symbol zastępczy zawartości 6">
+            <a:extLst>
+              <a:ext uri="{FF2B5EF4-FFF2-40B4-BE49-F238E27FC236}">
+                <a16:creationId xmlns:a16="http://schemas.microsoft.com/office/drawing/2014/main" id="{51924F75-927D-434C-9268-D6BF24BC1D79}"/>
+              </a:ext>
+            </a:extLst>
+          </p:cNvPr>
+          <p:cNvPicPr>
+            <a:picLocks noGrp="1" noChangeAspect="1"/>
+          </p:cNvPicPr>
+          <p:nvPr>
+            <p:ph idx="1"/>
+          </p:nvPr>
+        </p:nvPicPr>
+        <p:blipFill>
+          <a:blip r:embed="rId6"/>
+          <a:stretch>
+            <a:fillRect/>
+          </a:stretch>
+        </p:blipFill>
+        <p:spPr>
+          <a:xfrm>
+            <a:off x="213543" y="2923267"/>
+            <a:ext cx="6796192" cy="2327463"/>
+          </a:xfrm>
         </p:spPr>
       </p:pic>
     </p:spTree>

</xml_diff>